<commit_message>
add extra page layout
</commit_message>
<xml_diff>
--- a/business/PitchDeck/JIbres-PitchDeck-v1.pptx
+++ b/business/PitchDeck/JIbres-PitchDeck-v1.pptx
@@ -5,25 +5,29 @@
     <p:sldMasterId id="2147483714" r:id="rId1"/>
   </p:sldMasterIdLst>
   <p:notesMasterIdLst>
-    <p:notesMasterId r:id="rId15"/>
+    <p:notesMasterId r:id="rId19"/>
   </p:notesMasterIdLst>
   <p:handoutMasterIdLst>
-    <p:handoutMasterId r:id="rId16"/>
+    <p:handoutMasterId r:id="rId20"/>
   </p:handoutMasterIdLst>
   <p:sldIdLst>
     <p:sldId id="262" r:id="rId2"/>
     <p:sldId id="259" r:id="rId3"/>
     <p:sldId id="257" r:id="rId4"/>
-    <p:sldId id="270" r:id="rId5"/>
-    <p:sldId id="258" r:id="rId6"/>
-    <p:sldId id="271" r:id="rId7"/>
-    <p:sldId id="266" r:id="rId8"/>
-    <p:sldId id="269" r:id="rId9"/>
-    <p:sldId id="272" r:id="rId10"/>
-    <p:sldId id="265" r:id="rId11"/>
-    <p:sldId id="273" r:id="rId12"/>
-    <p:sldId id="268" r:id="rId13"/>
-    <p:sldId id="261" r:id="rId14"/>
+    <p:sldId id="277" r:id="rId5"/>
+    <p:sldId id="270" r:id="rId6"/>
+    <p:sldId id="258" r:id="rId7"/>
+    <p:sldId id="271" r:id="rId8"/>
+    <p:sldId id="266" r:id="rId9"/>
+    <p:sldId id="269" r:id="rId10"/>
+    <p:sldId id="272" r:id="rId11"/>
+    <p:sldId id="265" r:id="rId12"/>
+    <p:sldId id="273" r:id="rId13"/>
+    <p:sldId id="275" r:id="rId14"/>
+    <p:sldId id="268" r:id="rId15"/>
+    <p:sldId id="276" r:id="rId16"/>
+    <p:sldId id="274" r:id="rId17"/>
+    <p:sldId id="261" r:id="rId18"/>
   </p:sldIdLst>
   <p:sldSz cx="12192000" cy="6858000"/>
   <p:notesSz cx="6858000" cy="9144000"/>
@@ -33,7 +37,6 @@
         <p:sld r:id="rId2"/>
         <p:sld r:id="rId3"/>
         <p:sld r:id="rId4"/>
-        <p:sld r:id="rId5"/>
         <p:sld r:id="rId6"/>
         <p:sld r:id="rId7"/>
         <p:sld r:id="rId8"/>
@@ -42,24 +45,25 @@
         <p:sld r:id="rId11"/>
         <p:sld r:id="rId12"/>
         <p:sld r:id="rId13"/>
-        <p:sld r:id="rId14"/>
+        <p:sld r:id="rId15"/>
+        <p:sld r:id="rId18"/>
       </p:sldLst>
     </p:custShow>
     <p:custShow name="Demo Day" id="1">
       <p:sldLst>
         <p:sld r:id="rId2"/>
-        <p:sld r:id="rId12"/>
+        <p:sld r:id="rId13"/>
         <p:sld r:id="rId3"/>
         <p:sld r:id="rId4"/>
-        <p:sld r:id="rId5"/>
-        <p:sld r:id="rId7"/>
         <p:sld r:id="rId6"/>
         <p:sld r:id="rId8"/>
+        <p:sld r:id="rId7"/>
         <p:sld r:id="rId9"/>
         <p:sld r:id="rId10"/>
         <p:sld r:id="rId11"/>
-        <p:sld r:id="rId13"/>
-        <p:sld r:id="rId14"/>
+        <p:sld r:id="rId12"/>
+        <p:sld r:id="rId15"/>
+        <p:sld r:id="rId18"/>
       </p:sldLst>
     </p:custShow>
   </p:custShowLst>
@@ -176,6 +180,11 @@
             <p14:sldId id="257"/>
           </p14:sldIdLst>
         </p14:section>
+        <p14:section name="Market Validation" id="{33AA2443-7388-4C85-A494-2C2129BCA270}">
+          <p14:sldIdLst>
+            <p14:sldId id="277"/>
+          </p14:sldIdLst>
+        </p14:section>
         <p14:section name="Demo" id="{40F2F240-9D91-412E-A23A-8E95F7901267}">
           <p14:sldIdLst>
             <p14:sldId id="270"/>
@@ -218,7 +227,14 @@
         </p14:section>
         <p14:section name="Fundraising Information" id="{222D225F-40B8-4430-8E08-05153F3F2DA9}">
           <p14:sldIdLst>
+            <p14:sldId id="275"/>
             <p14:sldId id="268"/>
+            <p14:sldId id="276"/>
+          </p14:sldIdLst>
+        </p14:section>
+        <p14:section name="ThankYou" id="{51284E2B-BF4B-4503-A37B-18509E1F92C9}">
+          <p14:sldIdLst>
+            <p14:sldId id="274"/>
           </p14:sldIdLst>
         </p14:section>
         <p14:section name="Jibres" id="{00CC254F-6A85-49A5-A813-69506AD69DF8}">
@@ -952,7 +968,7 @@
           <a:p>
             <a:fld id="{EC29E1AC-3210-4C03-93DF-294BFDB0FAF7}" type="slidenum">
               <a:rPr lang="en-US" smtClean="0"/>
-              <a:t>11</a:t>
+              <a:t>12</a:t>
             </a:fld>
             <a:endParaRPr lang="en-US"/>
           </a:p>
@@ -962,6 +978,225 @@
     <p:extLst>
       <p:ext uri="{BB962C8B-B14F-4D97-AF65-F5344CB8AC3E}">
         <p14:creationId xmlns:p14="http://schemas.microsoft.com/office/powerpoint/2010/main" val="2773812234"/>
+      </p:ext>
+    </p:extLst>
+  </p:cSld>
+  <p:clrMapOvr>
+    <a:masterClrMapping/>
+  </p:clrMapOvr>
+</p:notes>
+</file>
+
+<file path=ppt/notesSlides/notesSlide3.xml><?xml version="1.0" encoding="utf-8"?>
+<p:notes xmlns:a="http://schemas.openxmlformats.org/drawingml/2006/main" xmlns:r="http://schemas.openxmlformats.org/officeDocument/2006/relationships" xmlns:p="http://schemas.openxmlformats.org/presentationml/2006/main">
+  <p:cSld>
+    <p:spTree>
+      <p:nvGrpSpPr>
+        <p:cNvPr id="1" name=""/>
+        <p:cNvGrpSpPr/>
+        <p:nvPr/>
+      </p:nvGrpSpPr>
+      <p:grpSpPr>
+        <a:xfrm>
+          <a:off x="0" y="0"/>
+          <a:ext cx="0" cy="0"/>
+          <a:chOff x="0" y="0"/>
+          <a:chExt cx="0" cy="0"/>
+        </a:xfrm>
+      </p:grpSpPr>
+      <p:sp>
+        <p:nvSpPr>
+          <p:cNvPr id="2" name="Slide Image Placeholder 1"/>
+          <p:cNvSpPr>
+            <a:spLocks noGrp="1" noRot="1" noChangeAspect="1"/>
+          </p:cNvSpPr>
+          <p:nvPr>
+            <p:ph type="sldImg"/>
+          </p:nvPr>
+        </p:nvSpPr>
+        <p:spPr/>
+      </p:sp>
+      <p:sp>
+        <p:nvSpPr>
+          <p:cNvPr id="3" name="Notes Placeholder 2"/>
+          <p:cNvSpPr>
+            <a:spLocks noGrp="1"/>
+          </p:cNvSpPr>
+          <p:nvPr>
+            <p:ph type="body" idx="1"/>
+          </p:nvPr>
+        </p:nvSpPr>
+        <p:spPr/>
+        <p:txBody>
+          <a:bodyPr/>
+          <a:lstStyle/>
+          <a:p>
+            <a:r>
+              <a:rPr lang="en-US" sz="1200" b="0" i="0" kern="1200" dirty="0">
+                <a:solidFill>
+                  <a:schemeClr val="tx1"/>
+                </a:solidFill>
+                <a:effectLst/>
+                <a:latin typeface="+mn-lt"/>
+                <a:ea typeface="+mn-ea"/>
+                <a:cs typeface="+mn-cs"/>
+              </a:rPr>
+              <a:t>The financials slide is one that investors will spend the most time on. It’s one of the three most important slides in your pitch deck, according to the data in this </a:t>
+            </a:r>
+            <a:r>
+              <a:rPr lang="en-US" sz="1200" b="0" i="0" u="none" strike="noStrike" kern="1200" dirty="0">
+                <a:solidFill>
+                  <a:schemeClr val="tx1"/>
+                </a:solidFill>
+                <a:effectLst/>
+                <a:latin typeface="+mn-lt"/>
+                <a:ea typeface="+mn-ea"/>
+                <a:cs typeface="+mn-cs"/>
+                <a:hlinkClick r:id="rId3"/>
+              </a:rPr>
+              <a:t>Forbes article</a:t>
+            </a:r>
+            <a:r>
+              <a:rPr lang="en-US" sz="1200" b="0" i="0" kern="1200" dirty="0">
+                <a:solidFill>
+                  <a:schemeClr val="tx1"/>
+                </a:solidFill>
+                <a:effectLst/>
+                <a:latin typeface="+mn-lt"/>
+                <a:ea typeface="+mn-ea"/>
+                <a:cs typeface="+mn-cs"/>
+              </a:rPr>
+              <a:t>. Key points include your burn rate, break even point and how many users you need to make a profit.</a:t>
+            </a:r>
+            <a:endParaRPr lang="en-US" dirty="0"/>
+          </a:p>
+        </p:txBody>
+      </p:sp>
+      <p:sp>
+        <p:nvSpPr>
+          <p:cNvPr id="4" name="Slide Number Placeholder 3"/>
+          <p:cNvSpPr>
+            <a:spLocks noGrp="1"/>
+          </p:cNvSpPr>
+          <p:nvPr>
+            <p:ph type="sldNum" sz="quarter" idx="5"/>
+          </p:nvPr>
+        </p:nvSpPr>
+        <p:spPr/>
+        <p:txBody>
+          <a:bodyPr/>
+          <a:lstStyle/>
+          <a:p>
+            <a:fld id="{EC29E1AC-3210-4C03-93DF-294BFDB0FAF7}" type="slidenum">
+              <a:rPr lang="en-US" smtClean="0"/>
+              <a:t>13</a:t>
+            </a:fld>
+            <a:endParaRPr lang="en-US"/>
+          </a:p>
+        </p:txBody>
+      </p:sp>
+    </p:spTree>
+    <p:extLst>
+      <p:ext uri="{BB962C8B-B14F-4D97-AF65-F5344CB8AC3E}">
+        <p14:creationId xmlns:p14="http://schemas.microsoft.com/office/powerpoint/2010/main" val="1515327474"/>
+      </p:ext>
+    </p:extLst>
+  </p:cSld>
+  <p:clrMapOvr>
+    <a:masterClrMapping/>
+  </p:clrMapOvr>
+</p:notes>
+</file>
+
+<file path=ppt/notesSlides/notesSlide4.xml><?xml version="1.0" encoding="utf-8"?>
+<p:notes xmlns:a="http://schemas.openxmlformats.org/drawingml/2006/main" xmlns:r="http://schemas.openxmlformats.org/officeDocument/2006/relationships" xmlns:p="http://schemas.openxmlformats.org/presentationml/2006/main">
+  <p:cSld>
+    <p:spTree>
+      <p:nvGrpSpPr>
+        <p:cNvPr id="1" name=""/>
+        <p:cNvGrpSpPr/>
+        <p:nvPr/>
+      </p:nvGrpSpPr>
+      <p:grpSpPr>
+        <a:xfrm>
+          <a:off x="0" y="0"/>
+          <a:ext cx="0" cy="0"/>
+          <a:chOff x="0" y="0"/>
+          <a:chExt cx="0" cy="0"/>
+        </a:xfrm>
+      </p:grpSpPr>
+      <p:sp>
+        <p:nvSpPr>
+          <p:cNvPr id="2" name="Slide Image Placeholder 1"/>
+          <p:cNvSpPr>
+            <a:spLocks noGrp="1" noRot="1" noChangeAspect="1"/>
+          </p:cNvSpPr>
+          <p:nvPr>
+            <p:ph type="sldImg"/>
+          </p:nvPr>
+        </p:nvSpPr>
+        <p:spPr/>
+      </p:sp>
+      <p:sp>
+        <p:nvSpPr>
+          <p:cNvPr id="3" name="Notes Placeholder 2"/>
+          <p:cNvSpPr>
+            <a:spLocks noGrp="1"/>
+          </p:cNvSpPr>
+          <p:nvPr>
+            <p:ph type="body" idx="1"/>
+          </p:nvPr>
+        </p:nvSpPr>
+        <p:spPr/>
+        <p:txBody>
+          <a:bodyPr/>
+          <a:lstStyle/>
+          <a:p>
+            <a:r>
+              <a:rPr lang="en-US" sz="1200" b="0" i="0" kern="1200" dirty="0">
+                <a:solidFill>
+                  <a:schemeClr val="tx1"/>
+                </a:solidFill>
+                <a:effectLst/>
+                <a:latin typeface="+mn-lt"/>
+                <a:ea typeface="+mn-ea"/>
+                <a:cs typeface="+mn-cs"/>
+              </a:rPr>
+              <a:t>What are you going to do with the money? Spend it on rent or buy up customers and squeeze the competition out of business?</a:t>
+            </a:r>
+          </a:p>
+          <a:p>
+            <a:endParaRPr lang="en-US" dirty="0"/>
+          </a:p>
+        </p:txBody>
+      </p:sp>
+      <p:sp>
+        <p:nvSpPr>
+          <p:cNvPr id="4" name="Slide Number Placeholder 3"/>
+          <p:cNvSpPr>
+            <a:spLocks noGrp="1"/>
+          </p:cNvSpPr>
+          <p:nvPr>
+            <p:ph type="sldNum" sz="quarter" idx="5"/>
+          </p:nvPr>
+        </p:nvSpPr>
+        <p:spPr/>
+        <p:txBody>
+          <a:bodyPr/>
+          <a:lstStyle/>
+          <a:p>
+            <a:fld id="{EC29E1AC-3210-4C03-93DF-294BFDB0FAF7}" type="slidenum">
+              <a:rPr lang="en-US" smtClean="0"/>
+              <a:t>15</a:t>
+            </a:fld>
+            <a:endParaRPr lang="en-US"/>
+          </a:p>
+        </p:txBody>
+      </p:sp>
+    </p:spTree>
+    <p:extLst>
+      <p:ext uri="{BB962C8B-B14F-4D97-AF65-F5344CB8AC3E}">
+        <p14:creationId xmlns:p14="http://schemas.microsoft.com/office/powerpoint/2010/main" val="3536382630"/>
       </p:ext>
     </p:extLst>
   </p:cSld>
@@ -6053,7 +6288,7 @@
           <p:cNvPr id="2" name="Title 1">
             <a:extLst>
               <a:ext uri="{FF2B5EF4-FFF2-40B4-BE49-F238E27FC236}">
-                <a16:creationId xmlns:a16="http://schemas.microsoft.com/office/drawing/2014/main" id="{5D34B8C1-6180-431A-B964-C1F4DCF47BEB}"/>
+                <a16:creationId xmlns:a16="http://schemas.microsoft.com/office/drawing/2014/main" id="{9E452C3F-ED25-483A-94FA-D2CE60013342}"/>
               </a:ext>
             </a:extLst>
           </p:cNvPr>
@@ -6071,7 +6306,7 @@
           <a:p>
             <a:r>
               <a:rPr lang="fa-IR" dirty="0"/>
-              <a:t>تیم</a:t>
+              <a:t>استراتژی بازاریابی</a:t>
             </a:r>
             <a:endParaRPr lang="en-US" dirty="0"/>
           </a:p>
@@ -6082,7 +6317,7 @@
           <p:cNvPr id="3" name="Content Placeholder 2">
             <a:extLst>
               <a:ext uri="{FF2B5EF4-FFF2-40B4-BE49-F238E27FC236}">
-                <a16:creationId xmlns:a16="http://schemas.microsoft.com/office/drawing/2014/main" id="{092DD4A4-12C4-4972-9756-B15D521CB5E2}"/>
+                <a16:creationId xmlns:a16="http://schemas.microsoft.com/office/drawing/2014/main" id="{46F6534D-E736-4D33-B628-2F504052D36C}"/>
               </a:ext>
             </a:extLst>
           </p:cNvPr>
@@ -6105,7 +6340,7 @@
     </p:spTree>
     <p:extLst>
       <p:ext uri="{BB962C8B-B14F-4D97-AF65-F5344CB8AC3E}">
-        <p14:creationId xmlns:p14="http://schemas.microsoft.com/office/powerpoint/2010/main" val="3309526977"/>
+        <p14:creationId xmlns:p14="http://schemas.microsoft.com/office/powerpoint/2010/main" val="951979677"/>
       </p:ext>
     </p:extLst>
   </p:cSld>
@@ -6137,7 +6372,7 @@
           <p:cNvPr id="2" name="Title 1">
             <a:extLst>
               <a:ext uri="{FF2B5EF4-FFF2-40B4-BE49-F238E27FC236}">
-                <a16:creationId xmlns:a16="http://schemas.microsoft.com/office/drawing/2014/main" id="{4AA22767-FAF5-42FE-B0B3-0078F8DFEA8D}"/>
+                <a16:creationId xmlns:a16="http://schemas.microsoft.com/office/drawing/2014/main" id="{5D34B8C1-6180-431A-B964-C1F4DCF47BEB}"/>
               </a:ext>
             </a:extLst>
           </p:cNvPr>
@@ -6155,7 +6390,7 @@
           <a:p>
             <a:r>
               <a:rPr lang="fa-IR" dirty="0"/>
-              <a:t>چشم انداز</a:t>
+              <a:t>تیم</a:t>
             </a:r>
             <a:endParaRPr lang="en-US" dirty="0"/>
           </a:p>
@@ -6166,7 +6401,7 @@
           <p:cNvPr id="3" name="Content Placeholder 2">
             <a:extLst>
               <a:ext uri="{FF2B5EF4-FFF2-40B4-BE49-F238E27FC236}">
-                <a16:creationId xmlns:a16="http://schemas.microsoft.com/office/drawing/2014/main" id="{464B4C08-6DC1-4F90-8085-F78FF2E008CF}"/>
+                <a16:creationId xmlns:a16="http://schemas.microsoft.com/office/drawing/2014/main" id="{092DD4A4-12C4-4972-9756-B15D521CB5E2}"/>
               </a:ext>
             </a:extLst>
           </p:cNvPr>
@@ -6189,7 +6424,7 @@
     </p:spTree>
     <p:extLst>
       <p:ext uri="{BB962C8B-B14F-4D97-AF65-F5344CB8AC3E}">
-        <p14:creationId xmlns:p14="http://schemas.microsoft.com/office/powerpoint/2010/main" val="3819861127"/>
+        <p14:creationId xmlns:p14="http://schemas.microsoft.com/office/powerpoint/2010/main" val="3309526977"/>
       </p:ext>
     </p:extLst>
   </p:cSld>
@@ -6221,6 +6456,174 @@
           <p:cNvPr id="2" name="Title 1">
             <a:extLst>
               <a:ext uri="{FF2B5EF4-FFF2-40B4-BE49-F238E27FC236}">
+                <a16:creationId xmlns:a16="http://schemas.microsoft.com/office/drawing/2014/main" id="{4AA22767-FAF5-42FE-B0B3-0078F8DFEA8D}"/>
+              </a:ext>
+            </a:extLst>
+          </p:cNvPr>
+          <p:cNvSpPr>
+            <a:spLocks noGrp="1"/>
+          </p:cNvSpPr>
+          <p:nvPr>
+            <p:ph type="title"/>
+          </p:nvPr>
+        </p:nvSpPr>
+        <p:spPr/>
+        <p:txBody>
+          <a:bodyPr/>
+          <a:lstStyle/>
+          <a:p>
+            <a:r>
+              <a:rPr lang="fa-IR" dirty="0"/>
+              <a:t>چشم انداز</a:t>
+            </a:r>
+            <a:endParaRPr lang="en-US" dirty="0"/>
+          </a:p>
+        </p:txBody>
+      </p:sp>
+      <p:sp>
+        <p:nvSpPr>
+          <p:cNvPr id="3" name="Content Placeholder 2">
+            <a:extLst>
+              <a:ext uri="{FF2B5EF4-FFF2-40B4-BE49-F238E27FC236}">
+                <a16:creationId xmlns:a16="http://schemas.microsoft.com/office/drawing/2014/main" id="{464B4C08-6DC1-4F90-8085-F78FF2E008CF}"/>
+              </a:ext>
+            </a:extLst>
+          </p:cNvPr>
+          <p:cNvSpPr>
+            <a:spLocks noGrp="1"/>
+          </p:cNvSpPr>
+          <p:nvPr>
+            <p:ph idx="1"/>
+          </p:nvPr>
+        </p:nvSpPr>
+        <p:spPr/>
+        <p:txBody>
+          <a:bodyPr/>
+          <a:lstStyle/>
+          <a:p>
+            <a:endParaRPr lang="en-US"/>
+          </a:p>
+        </p:txBody>
+      </p:sp>
+    </p:spTree>
+    <p:extLst>
+      <p:ext uri="{BB962C8B-B14F-4D97-AF65-F5344CB8AC3E}">
+        <p14:creationId xmlns:p14="http://schemas.microsoft.com/office/powerpoint/2010/main" val="3819861127"/>
+      </p:ext>
+    </p:extLst>
+  </p:cSld>
+  <p:clrMapOvr>
+    <a:masterClrMapping/>
+  </p:clrMapOvr>
+</p:sld>
+</file>
+
+<file path=ppt/slides/slide13.xml><?xml version="1.0" encoding="utf-8"?>
+<p:sld xmlns:a="http://schemas.openxmlformats.org/drawingml/2006/main" xmlns:r="http://schemas.openxmlformats.org/officeDocument/2006/relationships" xmlns:p="http://schemas.openxmlformats.org/presentationml/2006/main">
+  <p:cSld>
+    <p:spTree>
+      <p:nvGrpSpPr>
+        <p:cNvPr id="1" name=""/>
+        <p:cNvGrpSpPr/>
+        <p:nvPr/>
+      </p:nvGrpSpPr>
+      <p:grpSpPr>
+        <a:xfrm>
+          <a:off x="0" y="0"/>
+          <a:ext cx="0" cy="0"/>
+          <a:chOff x="0" y="0"/>
+          <a:chExt cx="0" cy="0"/>
+        </a:xfrm>
+      </p:grpSpPr>
+      <p:sp>
+        <p:nvSpPr>
+          <p:cNvPr id="2" name="Title 1">
+            <a:extLst>
+              <a:ext uri="{FF2B5EF4-FFF2-40B4-BE49-F238E27FC236}">
+                <a16:creationId xmlns:a16="http://schemas.microsoft.com/office/drawing/2014/main" id="{AB6F361B-7244-4C25-AFDB-1BFA5464214E}"/>
+              </a:ext>
+            </a:extLst>
+          </p:cNvPr>
+          <p:cNvSpPr>
+            <a:spLocks noGrp="1"/>
+          </p:cNvSpPr>
+          <p:nvPr>
+            <p:ph type="title"/>
+          </p:nvPr>
+        </p:nvSpPr>
+        <p:spPr/>
+        <p:txBody>
+          <a:bodyPr/>
+          <a:lstStyle/>
+          <a:p>
+            <a:r>
+              <a:rPr lang="fa-IR" dirty="0"/>
+              <a:t>پیش بینی مالی</a:t>
+            </a:r>
+            <a:endParaRPr lang="en-US" dirty="0"/>
+          </a:p>
+        </p:txBody>
+      </p:sp>
+      <p:sp>
+        <p:nvSpPr>
+          <p:cNvPr id="3" name="Content Placeholder 2">
+            <a:extLst>
+              <a:ext uri="{FF2B5EF4-FFF2-40B4-BE49-F238E27FC236}">
+                <a16:creationId xmlns:a16="http://schemas.microsoft.com/office/drawing/2014/main" id="{59D86E9E-6883-496F-925A-355E3D0A4AB2}"/>
+              </a:ext>
+            </a:extLst>
+          </p:cNvPr>
+          <p:cNvSpPr>
+            <a:spLocks noGrp="1"/>
+          </p:cNvSpPr>
+          <p:nvPr>
+            <p:ph idx="1"/>
+          </p:nvPr>
+        </p:nvSpPr>
+        <p:spPr/>
+        <p:txBody>
+          <a:bodyPr/>
+          <a:lstStyle/>
+          <a:p>
+            <a:endParaRPr lang="en-US" dirty="0"/>
+          </a:p>
+        </p:txBody>
+      </p:sp>
+    </p:spTree>
+    <p:extLst>
+      <p:ext uri="{BB962C8B-B14F-4D97-AF65-F5344CB8AC3E}">
+        <p14:creationId xmlns:p14="http://schemas.microsoft.com/office/powerpoint/2010/main" val="1751857419"/>
+      </p:ext>
+    </p:extLst>
+  </p:cSld>
+  <p:clrMapOvr>
+    <a:masterClrMapping/>
+  </p:clrMapOvr>
+</p:sld>
+</file>
+
+<file path=ppt/slides/slide14.xml><?xml version="1.0" encoding="utf-8"?>
+<p:sld xmlns:a="http://schemas.openxmlformats.org/drawingml/2006/main" xmlns:r="http://schemas.openxmlformats.org/officeDocument/2006/relationships" xmlns:p="http://schemas.openxmlformats.org/presentationml/2006/main">
+  <p:cSld>
+    <p:spTree>
+      <p:nvGrpSpPr>
+        <p:cNvPr id="1" name=""/>
+        <p:cNvGrpSpPr/>
+        <p:nvPr/>
+      </p:nvGrpSpPr>
+      <p:grpSpPr>
+        <a:xfrm>
+          <a:off x="0" y="0"/>
+          <a:ext cx="0" cy="0"/>
+          <a:chOff x="0" y="0"/>
+          <a:chExt cx="0" cy="0"/>
+        </a:xfrm>
+      </p:grpSpPr>
+      <p:sp>
+        <p:nvSpPr>
+          <p:cNvPr id="2" name="Title 1">
+            <a:extLst>
+              <a:ext uri="{FF2B5EF4-FFF2-40B4-BE49-F238E27FC236}">
                 <a16:creationId xmlns:a16="http://schemas.microsoft.com/office/drawing/2014/main" id="{30E6AE9E-A8AD-4894-BC43-63F3564DE479}"/>
               </a:ext>
             </a:extLst>
@@ -6283,7 +6686,190 @@
 </p:sld>
 </file>
 
-<file path=ppt/slides/slide13.xml><?xml version="1.0" encoding="utf-8"?>
+<file path=ppt/slides/slide15.xml><?xml version="1.0" encoding="utf-8"?>
+<p:sld xmlns:a="http://schemas.openxmlformats.org/drawingml/2006/main" xmlns:r="http://schemas.openxmlformats.org/officeDocument/2006/relationships" xmlns:p="http://schemas.openxmlformats.org/presentationml/2006/main">
+  <p:cSld>
+    <p:spTree>
+      <p:nvGrpSpPr>
+        <p:cNvPr id="1" name=""/>
+        <p:cNvGrpSpPr/>
+        <p:nvPr/>
+      </p:nvGrpSpPr>
+      <p:grpSpPr>
+        <a:xfrm>
+          <a:off x="0" y="0"/>
+          <a:ext cx="0" cy="0"/>
+          <a:chOff x="0" y="0"/>
+          <a:chExt cx="0" cy="0"/>
+        </a:xfrm>
+      </p:grpSpPr>
+      <p:sp>
+        <p:nvSpPr>
+          <p:cNvPr id="2" name="Title 1">
+            <a:extLst>
+              <a:ext uri="{FF2B5EF4-FFF2-40B4-BE49-F238E27FC236}">
+                <a16:creationId xmlns:a16="http://schemas.microsoft.com/office/drawing/2014/main" id="{4A502359-CFFA-40E0-900B-A1FB45DF9BC8}"/>
+              </a:ext>
+            </a:extLst>
+          </p:cNvPr>
+          <p:cNvSpPr>
+            <a:spLocks noGrp="1"/>
+          </p:cNvSpPr>
+          <p:nvPr>
+            <p:ph type="title"/>
+          </p:nvPr>
+        </p:nvSpPr>
+        <p:spPr/>
+        <p:txBody>
+          <a:bodyPr/>
+          <a:lstStyle/>
+          <a:p>
+            <a:r>
+              <a:rPr lang="fa-IR" dirty="0"/>
+              <a:t>محل استفاده از سرمایه تامین شده</a:t>
+            </a:r>
+            <a:endParaRPr lang="en-US" dirty="0"/>
+          </a:p>
+        </p:txBody>
+      </p:sp>
+      <p:sp>
+        <p:nvSpPr>
+          <p:cNvPr id="3" name="Content Placeholder 2">
+            <a:extLst>
+              <a:ext uri="{FF2B5EF4-FFF2-40B4-BE49-F238E27FC236}">
+                <a16:creationId xmlns:a16="http://schemas.microsoft.com/office/drawing/2014/main" id="{2754D455-BEBD-4CC9-A815-4C111FA323E9}"/>
+              </a:ext>
+            </a:extLst>
+          </p:cNvPr>
+          <p:cNvSpPr>
+            <a:spLocks noGrp="1"/>
+          </p:cNvSpPr>
+          <p:nvPr>
+            <p:ph idx="1"/>
+          </p:nvPr>
+        </p:nvSpPr>
+        <p:spPr/>
+        <p:txBody>
+          <a:bodyPr/>
+          <a:lstStyle/>
+          <a:p>
+            <a:endParaRPr lang="en-US"/>
+          </a:p>
+        </p:txBody>
+      </p:sp>
+    </p:spTree>
+    <p:extLst>
+      <p:ext uri="{BB962C8B-B14F-4D97-AF65-F5344CB8AC3E}">
+        <p14:creationId xmlns:p14="http://schemas.microsoft.com/office/powerpoint/2010/main" val="2230933723"/>
+      </p:ext>
+    </p:extLst>
+  </p:cSld>
+  <p:clrMapOvr>
+    <a:masterClrMapping/>
+  </p:clrMapOvr>
+</p:sld>
+</file>
+
+<file path=ppt/slides/slide16.xml><?xml version="1.0" encoding="utf-8"?>
+<p:sld xmlns:a="http://schemas.openxmlformats.org/drawingml/2006/main" xmlns:r="http://schemas.openxmlformats.org/officeDocument/2006/relationships" xmlns:p="http://schemas.openxmlformats.org/presentationml/2006/main">
+  <p:cSld>
+    <p:spTree>
+      <p:nvGrpSpPr>
+        <p:cNvPr id="1" name=""/>
+        <p:cNvGrpSpPr/>
+        <p:nvPr/>
+      </p:nvGrpSpPr>
+      <p:grpSpPr>
+        <a:xfrm>
+          <a:off x="0" y="0"/>
+          <a:ext cx="0" cy="0"/>
+          <a:chOff x="0" y="0"/>
+          <a:chExt cx="0" cy="0"/>
+        </a:xfrm>
+      </p:grpSpPr>
+      <p:sp>
+        <p:nvSpPr>
+          <p:cNvPr id="2" name="Title 1">
+            <a:extLst>
+              <a:ext uri="{FF2B5EF4-FFF2-40B4-BE49-F238E27FC236}">
+                <a16:creationId xmlns:a16="http://schemas.microsoft.com/office/drawing/2014/main" id="{68CF4F0C-D55A-4293-A3D0-E7A9B00C04D1}"/>
+              </a:ext>
+            </a:extLst>
+          </p:cNvPr>
+          <p:cNvSpPr>
+            <a:spLocks noGrp="1"/>
+          </p:cNvSpPr>
+          <p:nvPr>
+            <p:ph type="title"/>
+          </p:nvPr>
+        </p:nvSpPr>
+        <p:spPr/>
+        <p:txBody>
+          <a:bodyPr/>
+          <a:lstStyle/>
+          <a:p>
+            <a:r>
+              <a:rPr lang="fa-IR" dirty="0"/>
+              <a:t>سپاس</a:t>
+            </a:r>
+            <a:endParaRPr lang="en-US" dirty="0"/>
+          </a:p>
+        </p:txBody>
+      </p:sp>
+      <p:sp>
+        <p:nvSpPr>
+          <p:cNvPr id="3" name="Content Placeholder 2">
+            <a:extLst>
+              <a:ext uri="{FF2B5EF4-FFF2-40B4-BE49-F238E27FC236}">
+                <a16:creationId xmlns:a16="http://schemas.microsoft.com/office/drawing/2014/main" id="{5D9013ED-7863-46BD-AAB7-9699CA9C9EA2}"/>
+              </a:ext>
+            </a:extLst>
+          </p:cNvPr>
+          <p:cNvSpPr>
+            <a:spLocks noGrp="1"/>
+          </p:cNvSpPr>
+          <p:nvPr>
+            <p:ph idx="1"/>
+          </p:nvPr>
+        </p:nvSpPr>
+        <p:spPr/>
+        <p:txBody>
+          <a:bodyPr/>
+          <a:lstStyle/>
+          <a:p>
+            <a:r>
+              <a:rPr lang="fa-IR" dirty="0"/>
+              <a:t>درصد</a:t>
+            </a:r>
+          </a:p>
+          <a:p>
+            <a:r>
+              <a:rPr lang="fa-IR" dirty="0"/>
+              <a:t>مبلغ</a:t>
+            </a:r>
+          </a:p>
+          <a:p>
+            <a:r>
+              <a:rPr lang="fa-IR" dirty="0"/>
+              <a:t>سایر سرمایه‌گذاران</a:t>
+            </a:r>
+          </a:p>
+        </p:txBody>
+      </p:sp>
+    </p:spTree>
+    <p:extLst>
+      <p:ext uri="{BB962C8B-B14F-4D97-AF65-F5344CB8AC3E}">
+        <p14:creationId xmlns:p14="http://schemas.microsoft.com/office/powerpoint/2010/main" val="73181294"/>
+      </p:ext>
+    </p:extLst>
+  </p:cSld>
+  <p:clrMapOvr>
+    <a:masterClrMapping/>
+  </p:clrMapOvr>
+</p:sld>
+</file>
+
+<file path=ppt/slides/slide17.xml><?xml version="1.0" encoding="utf-8"?>
 <p:sld xmlns:a="http://schemas.openxmlformats.org/drawingml/2006/main" xmlns:r="http://schemas.openxmlformats.org/officeDocument/2006/relationships" xmlns:p="http://schemas.openxmlformats.org/presentationml/2006/main">
   <p:cSld>
     <p:spTree>
@@ -6519,7 +7105,7 @@
           <p:cNvPr id="2" name="Title 1">
             <a:extLst>
               <a:ext uri="{FF2B5EF4-FFF2-40B4-BE49-F238E27FC236}">
-                <a16:creationId xmlns:a16="http://schemas.microsoft.com/office/drawing/2014/main" id="{60117D4C-CC92-44AD-9C90-C33F0A725232}"/>
+                <a16:creationId xmlns:a16="http://schemas.microsoft.com/office/drawing/2014/main" id="{E6206EEC-326E-44DB-AB86-A5680D5E7517}"/>
               </a:ext>
             </a:extLst>
           </p:cNvPr>
@@ -6537,7 +7123,7 @@
           <a:p>
             <a:r>
               <a:rPr lang="fa-IR" dirty="0"/>
-              <a:t>دموی محصول</a:t>
+              <a:t>اعتبارسنجی بازار</a:t>
             </a:r>
             <a:endParaRPr lang="en-US" dirty="0"/>
           </a:p>
@@ -6548,7 +7134,7 @@
           <p:cNvPr id="3" name="Content Placeholder 2">
             <a:extLst>
               <a:ext uri="{FF2B5EF4-FFF2-40B4-BE49-F238E27FC236}">
-                <a16:creationId xmlns:a16="http://schemas.microsoft.com/office/drawing/2014/main" id="{D281949B-4E50-4E45-A287-8E59954A83B0}"/>
+                <a16:creationId xmlns:a16="http://schemas.microsoft.com/office/drawing/2014/main" id="{75367ABD-D08C-4BD8-A9D8-F8C1EB607050}"/>
               </a:ext>
             </a:extLst>
           </p:cNvPr>
@@ -6564,14 +7150,20 @@
           <a:bodyPr/>
           <a:lstStyle/>
           <a:p>
-            <a:endParaRPr lang="en-US"/>
+            <a:r>
+              <a:rPr lang="fa-IR" dirty="0"/>
+              <a:t>چرا الان؟</a:t>
+            </a:r>
+          </a:p>
+          <a:p>
+            <a:endParaRPr lang="en-US" dirty="0"/>
           </a:p>
         </p:txBody>
       </p:sp>
     </p:spTree>
     <p:extLst>
       <p:ext uri="{BB962C8B-B14F-4D97-AF65-F5344CB8AC3E}">
-        <p14:creationId xmlns:p14="http://schemas.microsoft.com/office/powerpoint/2010/main" val="2509938767"/>
+        <p14:creationId xmlns:p14="http://schemas.microsoft.com/office/powerpoint/2010/main" val="3322250093"/>
       </p:ext>
     </p:extLst>
   </p:cSld>
@@ -6603,7 +7195,7 @@
           <p:cNvPr id="2" name="Title 1">
             <a:extLst>
               <a:ext uri="{FF2B5EF4-FFF2-40B4-BE49-F238E27FC236}">
-                <a16:creationId xmlns:a16="http://schemas.microsoft.com/office/drawing/2014/main" id="{A55E623B-4760-4F62-AB7A-4FB209399CE6}"/>
+                <a16:creationId xmlns:a16="http://schemas.microsoft.com/office/drawing/2014/main" id="{60117D4C-CC92-44AD-9C90-C33F0A725232}"/>
               </a:ext>
             </a:extLst>
           </p:cNvPr>
@@ -6621,7 +7213,7 @@
           <a:p>
             <a:r>
               <a:rPr lang="fa-IR" dirty="0"/>
-              <a:t>حجم بازار</a:t>
+              <a:t>دموی محصول</a:t>
             </a:r>
             <a:endParaRPr lang="en-US" dirty="0"/>
           </a:p>
@@ -6632,7 +7224,7 @@
           <p:cNvPr id="3" name="Content Placeholder 2">
             <a:extLst>
               <a:ext uri="{FF2B5EF4-FFF2-40B4-BE49-F238E27FC236}">
-                <a16:creationId xmlns:a16="http://schemas.microsoft.com/office/drawing/2014/main" id="{625CBF74-0A34-4DD1-A217-7A71D7E2FE04}"/>
+                <a16:creationId xmlns:a16="http://schemas.microsoft.com/office/drawing/2014/main" id="{D281949B-4E50-4E45-A287-8E59954A83B0}"/>
               </a:ext>
             </a:extLst>
           </p:cNvPr>
@@ -6655,7 +7247,7 @@
     </p:spTree>
     <p:extLst>
       <p:ext uri="{BB962C8B-B14F-4D97-AF65-F5344CB8AC3E}">
-        <p14:creationId xmlns:p14="http://schemas.microsoft.com/office/powerpoint/2010/main" val="1448984731"/>
+        <p14:creationId xmlns:p14="http://schemas.microsoft.com/office/powerpoint/2010/main" val="2509938767"/>
       </p:ext>
     </p:extLst>
   </p:cSld>
@@ -6687,7 +7279,7 @@
           <p:cNvPr id="2" name="Title 1">
             <a:extLst>
               <a:ext uri="{FF2B5EF4-FFF2-40B4-BE49-F238E27FC236}">
-                <a16:creationId xmlns:a16="http://schemas.microsoft.com/office/drawing/2014/main" id="{78999E65-B826-4419-A372-7178F0A2FF18}"/>
+                <a16:creationId xmlns:a16="http://schemas.microsoft.com/office/drawing/2014/main" id="{A55E623B-4760-4F62-AB7A-4FB209399CE6}"/>
               </a:ext>
             </a:extLst>
           </p:cNvPr>
@@ -6705,7 +7297,7 @@
           <a:p>
             <a:r>
               <a:rPr lang="fa-IR" dirty="0"/>
-              <a:t>بیزینس مدل فری‌میوم</a:t>
+              <a:t>حجم بازار</a:t>
             </a:r>
             <a:endParaRPr lang="en-US" dirty="0"/>
           </a:p>
@@ -6716,7 +7308,7 @@
           <p:cNvPr id="3" name="Content Placeholder 2">
             <a:extLst>
               <a:ext uri="{FF2B5EF4-FFF2-40B4-BE49-F238E27FC236}">
-                <a16:creationId xmlns:a16="http://schemas.microsoft.com/office/drawing/2014/main" id="{5D06C720-2A35-4AE3-9E85-7EF30AB81A20}"/>
+                <a16:creationId xmlns:a16="http://schemas.microsoft.com/office/drawing/2014/main" id="{625CBF74-0A34-4DD1-A217-7A71D7E2FE04}"/>
               </a:ext>
             </a:extLst>
           </p:cNvPr>
@@ -6739,7 +7331,7 @@
     </p:spTree>
     <p:extLst>
       <p:ext uri="{BB962C8B-B14F-4D97-AF65-F5344CB8AC3E}">
-        <p14:creationId xmlns:p14="http://schemas.microsoft.com/office/powerpoint/2010/main" val="2921887442"/>
+        <p14:creationId xmlns:p14="http://schemas.microsoft.com/office/powerpoint/2010/main" val="1448984731"/>
       </p:ext>
     </p:extLst>
   </p:cSld>
@@ -6771,7 +7363,7 @@
           <p:cNvPr id="2" name="Title 1">
             <a:extLst>
               <a:ext uri="{FF2B5EF4-FFF2-40B4-BE49-F238E27FC236}">
-                <a16:creationId xmlns:a16="http://schemas.microsoft.com/office/drawing/2014/main" id="{9F9067C3-8489-4637-B0E1-62E01A9DF117}"/>
+                <a16:creationId xmlns:a16="http://schemas.microsoft.com/office/drawing/2014/main" id="{78999E65-B826-4419-A372-7178F0A2FF18}"/>
               </a:ext>
             </a:extLst>
           </p:cNvPr>
@@ -6789,7 +7381,7 @@
           <a:p>
             <a:r>
               <a:rPr lang="fa-IR" dirty="0"/>
-              <a:t>رقبا</a:t>
+              <a:t>بیزینس مدل فری‌میوم</a:t>
             </a:r>
             <a:endParaRPr lang="en-US" dirty="0"/>
           </a:p>
@@ -6800,7 +7392,7 @@
           <p:cNvPr id="3" name="Content Placeholder 2">
             <a:extLst>
               <a:ext uri="{FF2B5EF4-FFF2-40B4-BE49-F238E27FC236}">
-                <a16:creationId xmlns:a16="http://schemas.microsoft.com/office/drawing/2014/main" id="{B04D06BC-3FD3-4B50-807E-200EE28669A2}"/>
+                <a16:creationId xmlns:a16="http://schemas.microsoft.com/office/drawing/2014/main" id="{5D06C720-2A35-4AE3-9E85-7EF30AB81A20}"/>
               </a:ext>
             </a:extLst>
           </p:cNvPr>
@@ -6823,7 +7415,7 @@
     </p:spTree>
     <p:extLst>
       <p:ext uri="{BB962C8B-B14F-4D97-AF65-F5344CB8AC3E}">
-        <p14:creationId xmlns:p14="http://schemas.microsoft.com/office/powerpoint/2010/main" val="2836734986"/>
+        <p14:creationId xmlns:p14="http://schemas.microsoft.com/office/powerpoint/2010/main" val="2921887442"/>
       </p:ext>
     </p:extLst>
   </p:cSld>
@@ -6855,7 +7447,7 @@
           <p:cNvPr id="2" name="Title 1">
             <a:extLst>
               <a:ext uri="{FF2B5EF4-FFF2-40B4-BE49-F238E27FC236}">
-                <a16:creationId xmlns:a16="http://schemas.microsoft.com/office/drawing/2014/main" id="{84B747BF-7704-454D-89C6-8AD163CBED44}"/>
+                <a16:creationId xmlns:a16="http://schemas.microsoft.com/office/drawing/2014/main" id="{9F9067C3-8489-4637-B0E1-62E01A9DF117}"/>
               </a:ext>
             </a:extLst>
           </p:cNvPr>
@@ -6873,7 +7465,7 @@
           <a:p>
             <a:r>
               <a:rPr lang="fa-IR" dirty="0"/>
-              <a:t>مزیت رقابتی</a:t>
+              <a:t>رقبا</a:t>
             </a:r>
             <a:endParaRPr lang="en-US" dirty="0"/>
           </a:p>
@@ -6884,7 +7476,7 @@
           <p:cNvPr id="3" name="Content Placeholder 2">
             <a:extLst>
               <a:ext uri="{FF2B5EF4-FFF2-40B4-BE49-F238E27FC236}">
-                <a16:creationId xmlns:a16="http://schemas.microsoft.com/office/drawing/2014/main" id="{E54C571F-BC54-41C3-80D4-2B49DEB9574A}"/>
+                <a16:creationId xmlns:a16="http://schemas.microsoft.com/office/drawing/2014/main" id="{B04D06BC-3FD3-4B50-807E-200EE28669A2}"/>
               </a:ext>
             </a:extLst>
           </p:cNvPr>
@@ -6900,30 +7492,14 @@
           <a:bodyPr/>
           <a:lstStyle/>
           <a:p>
-            <a:r>
-              <a:rPr lang="fa-IR" dirty="0"/>
-              <a:t>مزیت رقابتی</a:t>
-            </a:r>
-          </a:p>
-          <a:p>
-            <a:r>
-              <a:rPr lang="fa-IR" dirty="0"/>
-              <a:t>بیزینس مدل یا روش کسب درآمد</a:t>
-            </a:r>
-          </a:p>
-          <a:p>
-            <a:r>
-              <a:rPr lang="fa-IR" dirty="0"/>
-              <a:t>مارکتینگ و روش فروش</a:t>
-            </a:r>
-            <a:endParaRPr lang="en-US" dirty="0"/>
+            <a:endParaRPr lang="en-US"/>
           </a:p>
         </p:txBody>
       </p:sp>
     </p:spTree>
     <p:extLst>
       <p:ext uri="{BB962C8B-B14F-4D97-AF65-F5344CB8AC3E}">
-        <p14:creationId xmlns:p14="http://schemas.microsoft.com/office/powerpoint/2010/main" val="3074796233"/>
+        <p14:creationId xmlns:p14="http://schemas.microsoft.com/office/powerpoint/2010/main" val="2836734986"/>
       </p:ext>
     </p:extLst>
   </p:cSld>
@@ -6955,7 +7531,7 @@
           <p:cNvPr id="2" name="Title 1">
             <a:extLst>
               <a:ext uri="{FF2B5EF4-FFF2-40B4-BE49-F238E27FC236}">
-                <a16:creationId xmlns:a16="http://schemas.microsoft.com/office/drawing/2014/main" id="{9E452C3F-ED25-483A-94FA-D2CE60013342}"/>
+                <a16:creationId xmlns:a16="http://schemas.microsoft.com/office/drawing/2014/main" id="{84B747BF-7704-454D-89C6-8AD163CBED44}"/>
               </a:ext>
             </a:extLst>
           </p:cNvPr>
@@ -6973,7 +7549,7 @@
           <a:p>
             <a:r>
               <a:rPr lang="fa-IR" dirty="0"/>
-              <a:t>ورود به بازار</a:t>
+              <a:t>مزیت رقابتی</a:t>
             </a:r>
             <a:endParaRPr lang="en-US" dirty="0"/>
           </a:p>
@@ -6984,7 +7560,7 @@
           <p:cNvPr id="3" name="Content Placeholder 2">
             <a:extLst>
               <a:ext uri="{FF2B5EF4-FFF2-40B4-BE49-F238E27FC236}">
-                <a16:creationId xmlns:a16="http://schemas.microsoft.com/office/drawing/2014/main" id="{46F6534D-E736-4D33-B628-2F504052D36C}"/>
+                <a16:creationId xmlns:a16="http://schemas.microsoft.com/office/drawing/2014/main" id="{E54C571F-BC54-41C3-80D4-2B49DEB9574A}"/>
               </a:ext>
             </a:extLst>
           </p:cNvPr>
@@ -7000,14 +7576,30 @@
           <a:bodyPr/>
           <a:lstStyle/>
           <a:p>
-            <a:endParaRPr lang="en-US"/>
+            <a:r>
+              <a:rPr lang="fa-IR" dirty="0"/>
+              <a:t>مزیت رقابتی</a:t>
+            </a:r>
+          </a:p>
+          <a:p>
+            <a:r>
+              <a:rPr lang="fa-IR" dirty="0"/>
+              <a:t>بیزینس مدل یا روش کسب درآمد</a:t>
+            </a:r>
+          </a:p>
+          <a:p>
+            <a:r>
+              <a:rPr lang="fa-IR" dirty="0"/>
+              <a:t>مارکتینگ و روش فروش</a:t>
+            </a:r>
+            <a:endParaRPr lang="en-US" dirty="0"/>
           </a:p>
         </p:txBody>
       </p:sp>
     </p:spTree>
     <p:extLst>
       <p:ext uri="{BB962C8B-B14F-4D97-AF65-F5344CB8AC3E}">
-        <p14:creationId xmlns:p14="http://schemas.microsoft.com/office/powerpoint/2010/main" val="951979677"/>
+        <p14:creationId xmlns:p14="http://schemas.microsoft.com/office/powerpoint/2010/main" val="3074796233"/>
       </p:ext>
     </p:extLst>
   </p:cSld>

</xml_diff>

<commit_message>
add long term slide
</commit_message>
<xml_diff>
--- a/business/PitchDeck/JIbres-PitchDeck-v1.pptx
+++ b/business/PitchDeck/JIbres-PitchDeck-v1.pptx
@@ -5,10 +5,10 @@
     <p:sldMasterId id="2147483714" r:id="rId1"/>
   </p:sldMasterIdLst>
   <p:notesMasterIdLst>
-    <p:notesMasterId r:id="rId25"/>
+    <p:notesMasterId r:id="rId26"/>
   </p:notesMasterIdLst>
   <p:handoutMasterIdLst>
-    <p:handoutMasterId r:id="rId26"/>
+    <p:handoutMasterId r:id="rId27"/>
   </p:handoutMasterIdLst>
   <p:sldIdLst>
     <p:sldId id="262" r:id="rId2"/>
@@ -21,19 +21,20 @@
     <p:sldId id="271" r:id="rId9"/>
     <p:sldId id="266" r:id="rId10"/>
     <p:sldId id="269" r:id="rId11"/>
-    <p:sldId id="281" r:id="rId12"/>
-    <p:sldId id="272" r:id="rId13"/>
-    <p:sldId id="265" r:id="rId14"/>
-    <p:sldId id="273" r:id="rId15"/>
-    <p:sldId id="275" r:id="rId16"/>
-    <p:sldId id="268" r:id="rId17"/>
-    <p:sldId id="276" r:id="rId18"/>
-    <p:sldId id="274" r:id="rId19"/>
-    <p:sldId id="279" r:id="rId20"/>
-    <p:sldId id="283" r:id="rId21"/>
-    <p:sldId id="284" r:id="rId22"/>
-    <p:sldId id="286" r:id="rId23"/>
-    <p:sldId id="261" r:id="rId24"/>
+    <p:sldId id="287" r:id="rId12"/>
+    <p:sldId id="281" r:id="rId13"/>
+    <p:sldId id="272" r:id="rId14"/>
+    <p:sldId id="265" r:id="rId15"/>
+    <p:sldId id="273" r:id="rId16"/>
+    <p:sldId id="275" r:id="rId17"/>
+    <p:sldId id="268" r:id="rId18"/>
+    <p:sldId id="276" r:id="rId19"/>
+    <p:sldId id="274" r:id="rId20"/>
+    <p:sldId id="279" r:id="rId21"/>
+    <p:sldId id="283" r:id="rId22"/>
+    <p:sldId id="284" r:id="rId23"/>
+    <p:sldId id="286" r:id="rId24"/>
+    <p:sldId id="261" r:id="rId25"/>
   </p:sldIdLst>
   <p:sldSz cx="12192000" cy="6858000"/>
   <p:notesSz cx="6858000" cy="9144000"/>
@@ -47,27 +48,27 @@
         <p:sld r:id="rId9"/>
         <p:sld r:id="rId10"/>
         <p:sld r:id="rId11"/>
-        <p:sld r:id="rId13"/>
         <p:sld r:id="rId14"/>
         <p:sld r:id="rId15"/>
-        <p:sld r:id="rId17"/>
-        <p:sld r:id="rId24"/>
+        <p:sld r:id="rId16"/>
+        <p:sld r:id="rId18"/>
+        <p:sld r:id="rId25"/>
       </p:sldLst>
     </p:custShow>
     <p:custShow name="Demo Day" id="1">
       <p:sldLst>
         <p:sld r:id="rId2"/>
-        <p:sld r:id="rId15"/>
+        <p:sld r:id="rId16"/>
         <p:sld r:id="rId3"/>
         <p:sld r:id="rId5"/>
         <p:sld r:id="rId9"/>
         <p:sld r:id="rId6"/>
         <p:sld r:id="rId10"/>
         <p:sld r:id="rId11"/>
-        <p:sld r:id="rId13"/>
         <p:sld r:id="rId14"/>
-        <p:sld r:id="rId17"/>
-        <p:sld r:id="rId24"/>
+        <p:sld r:id="rId15"/>
+        <p:sld r:id="rId18"/>
+        <p:sld r:id="rId25"/>
       </p:sldLst>
     </p:custShow>
   </p:custShowLst>
@@ -212,6 +213,7 @@
         <p14:section name="Underlying Magic" id="{25DF5541-CEF0-45A4-ADBF-419CCD04F1F4}">
           <p14:sldIdLst>
             <p14:sldId id="269"/>
+            <p14:sldId id="287"/>
             <p14:sldId id="281"/>
           </p14:sldIdLst>
         </p14:section>
@@ -1368,53 +1370,12 @@
         <c:scaling>
           <c:orientation val="minMax"/>
         </c:scaling>
-        <c:delete val="0"/>
+        <c:delete val="1"/>
         <c:axPos val="l"/>
-        <c:majorGridlines>
-          <c:spPr>
-            <a:ln w="9525" cap="flat" cmpd="sng" algn="ctr">
-              <a:solidFill>
-                <a:schemeClr val="tx1">
-                  <a:lumMod val="15000"/>
-                  <a:lumOff val="85000"/>
-                </a:schemeClr>
-              </a:solidFill>
-              <a:round/>
-            </a:ln>
-            <a:effectLst/>
-          </c:spPr>
-        </c:majorGridlines>
         <c:numFmt formatCode="_(* #,##0_);_(* \(#,##0\);_(* &quot;-&quot;??_);_(@_)" sourceLinked="1"/>
         <c:majorTickMark val="none"/>
         <c:minorTickMark val="none"/>
         <c:tickLblPos val="nextTo"/>
-        <c:spPr>
-          <a:noFill/>
-          <a:ln>
-            <a:noFill/>
-          </a:ln>
-          <a:effectLst/>
-        </c:spPr>
-        <c:txPr>
-          <a:bodyPr rot="-60000000" spcFirstLastPara="1" vertOverflow="ellipsis" vert="horz" wrap="square" anchor="ctr" anchorCtr="1"/>
-          <a:lstStyle/>
-          <a:p>
-            <a:pPr>
-              <a:defRPr sz="900" b="0" i="0" u="none" strike="noStrike" kern="1200" baseline="0">
-                <a:solidFill>
-                  <a:schemeClr val="tx1">
-                    <a:lumMod val="65000"/>
-                    <a:lumOff val="35000"/>
-                  </a:schemeClr>
-                </a:solidFill>
-                <a:latin typeface="+mn-lt"/>
-                <a:ea typeface="+mn-ea"/>
-                <a:cs typeface="+mn-cs"/>
-              </a:defRPr>
-            </a:pPr>
-            <a:endParaRPr lang="en-US"/>
-          </a:p>
-        </c:txPr>
         <c:crossAx val="2063771200"/>
         <c:crosses val="autoZero"/>
         <c:crossBetween val="between"/>
@@ -1452,6 +1413,506 @@
     <a:p>
       <a:pPr>
         <a:defRPr/>
+      </a:pPr>
+      <a:endParaRPr lang="en-US"/>
+    </a:p>
+  </c:txPr>
+  <c:externalData r:id="rId3">
+    <c:autoUpdate val="0"/>
+  </c:externalData>
+</c:chartSpace>
+</file>
+
+<file path=ppt/charts/chart4.xml><?xml version="1.0" encoding="utf-8"?>
+<c:chartSpace xmlns:c="http://schemas.openxmlformats.org/drawingml/2006/chart" xmlns:a="http://schemas.openxmlformats.org/drawingml/2006/main" xmlns:r="http://schemas.openxmlformats.org/officeDocument/2006/relationships" xmlns:c16r2="http://schemas.microsoft.com/office/drawing/2015/06/chart">
+  <c:date1904 val="0"/>
+  <c:lang val="en-US"/>
+  <c:roundedCorners val="0"/>
+  <mc:AlternateContent xmlns:mc="http://schemas.openxmlformats.org/markup-compatibility/2006">
+    <mc:Choice xmlns:c14="http://schemas.microsoft.com/office/drawing/2007/8/2/chart" Requires="c14">
+      <c14:style val="102"/>
+    </mc:Choice>
+    <mc:Fallback>
+      <c:style val="2"/>
+    </mc:Fallback>
+  </mc:AlternateContent>
+  <c:chart>
+    <c:title>
+      <c:tx>
+        <c:rich>
+          <a:bodyPr rot="0" spcFirstLastPara="1" vertOverflow="ellipsis" vert="horz" wrap="square" anchor="ctr" anchorCtr="1"/>
+          <a:lstStyle/>
+          <a:p>
+            <a:pPr>
+              <a:defRPr sz="1400" b="0" i="0" u="none" strike="noStrike" kern="1200" spc="0" baseline="0">
+                <a:solidFill>
+                  <a:schemeClr val="tx1">
+                    <a:lumMod val="65000"/>
+                    <a:lumOff val="35000"/>
+                  </a:schemeClr>
+                </a:solidFill>
+                <a:latin typeface="IRANYekan" panose="020B0506030804020204" pitchFamily="34" charset="-78"/>
+                <a:ea typeface="+mn-ea"/>
+                <a:cs typeface="IRANYekan" panose="020B0506030804020204" pitchFamily="34" charset="-78"/>
+              </a:defRPr>
+            </a:pPr>
+            <a:r>
+              <a:rPr lang="fa-IR"/>
+              <a:t>محل</a:t>
+            </a:r>
+            <a:r>
+              <a:rPr lang="fa-IR" baseline="0"/>
+              <a:t> هزینه سرمایه جذب شده جیبرس</a:t>
+            </a:r>
+            <a:endParaRPr lang="fa-IR"/>
+          </a:p>
+        </c:rich>
+      </c:tx>
+      <c:overlay val="0"/>
+      <c:spPr>
+        <a:noFill/>
+        <a:ln>
+          <a:noFill/>
+        </a:ln>
+        <a:effectLst/>
+      </c:spPr>
+      <c:txPr>
+        <a:bodyPr rot="0" spcFirstLastPara="1" vertOverflow="ellipsis" vert="horz" wrap="square" anchor="ctr" anchorCtr="1"/>
+        <a:lstStyle/>
+        <a:p>
+          <a:pPr>
+            <a:defRPr sz="1400" b="0" i="0" u="none" strike="noStrike" kern="1200" spc="0" baseline="0">
+              <a:solidFill>
+                <a:schemeClr val="tx1">
+                  <a:lumMod val="65000"/>
+                  <a:lumOff val="35000"/>
+                </a:schemeClr>
+              </a:solidFill>
+              <a:latin typeface="IRANYekan" panose="020B0506030804020204" pitchFamily="34" charset="-78"/>
+              <a:ea typeface="+mn-ea"/>
+              <a:cs typeface="IRANYekan" panose="020B0506030804020204" pitchFamily="34" charset="-78"/>
+            </a:defRPr>
+          </a:pPr>
+          <a:endParaRPr lang="en-US"/>
+        </a:p>
+      </c:txPr>
+    </c:title>
+    <c:autoTitleDeleted val="0"/>
+    <c:plotArea>
+      <c:layout/>
+      <c:pieChart>
+        <c:varyColors val="1"/>
+        <c:ser>
+          <c:idx val="0"/>
+          <c:order val="0"/>
+          <c:tx>
+            <c:strRef>
+              <c:f>Sheet1!$C$1</c:f>
+              <c:strCache>
+                <c:ptCount val="1"/>
+                <c:pt idx="0">
+                  <c:v>مبالغ پیش‌بینی شده به میلیون تومان</c:v>
+                </c:pt>
+              </c:strCache>
+            </c:strRef>
+          </c:tx>
+          <c:dPt>
+            <c:idx val="0"/>
+            <c:bubble3D val="0"/>
+            <c:spPr>
+              <a:solidFill>
+                <a:schemeClr val="accent1"/>
+              </a:solidFill>
+              <a:ln w="19050">
+                <a:solidFill>
+                  <a:schemeClr val="lt1"/>
+                </a:solidFill>
+              </a:ln>
+              <a:effectLst/>
+            </c:spPr>
+            <c:extLst>
+              <c:ext xmlns:c16="http://schemas.microsoft.com/office/drawing/2014/chart" uri="{C3380CC4-5D6E-409C-BE32-E72D297353CC}">
+                <c16:uniqueId val="{00000001-A88A-4E5B-BEAD-BE028B47C985}"/>
+              </c:ext>
+            </c:extLst>
+          </c:dPt>
+          <c:dPt>
+            <c:idx val="1"/>
+            <c:bubble3D val="0"/>
+            <c:spPr>
+              <a:solidFill>
+                <a:schemeClr val="accent2"/>
+              </a:solidFill>
+              <a:ln w="19050">
+                <a:solidFill>
+                  <a:schemeClr val="lt1"/>
+                </a:solidFill>
+              </a:ln>
+              <a:effectLst/>
+            </c:spPr>
+            <c:extLst>
+              <c:ext xmlns:c16="http://schemas.microsoft.com/office/drawing/2014/chart" uri="{C3380CC4-5D6E-409C-BE32-E72D297353CC}">
+                <c16:uniqueId val="{00000003-A88A-4E5B-BEAD-BE028B47C985}"/>
+              </c:ext>
+            </c:extLst>
+          </c:dPt>
+          <c:dPt>
+            <c:idx val="2"/>
+            <c:bubble3D val="0"/>
+            <c:spPr>
+              <a:solidFill>
+                <a:schemeClr val="accent3"/>
+              </a:solidFill>
+              <a:ln w="19050">
+                <a:solidFill>
+                  <a:schemeClr val="lt1"/>
+                </a:solidFill>
+              </a:ln>
+              <a:effectLst/>
+            </c:spPr>
+            <c:extLst>
+              <c:ext xmlns:c16="http://schemas.microsoft.com/office/drawing/2014/chart" uri="{C3380CC4-5D6E-409C-BE32-E72D297353CC}">
+                <c16:uniqueId val="{00000005-A88A-4E5B-BEAD-BE028B47C985}"/>
+              </c:ext>
+            </c:extLst>
+          </c:dPt>
+          <c:dPt>
+            <c:idx val="3"/>
+            <c:bubble3D val="0"/>
+            <c:spPr>
+              <a:solidFill>
+                <a:schemeClr val="accent4"/>
+              </a:solidFill>
+              <a:ln w="19050">
+                <a:solidFill>
+                  <a:schemeClr val="lt1"/>
+                </a:solidFill>
+              </a:ln>
+              <a:effectLst/>
+            </c:spPr>
+            <c:extLst>
+              <c:ext xmlns:c16="http://schemas.microsoft.com/office/drawing/2014/chart" uri="{C3380CC4-5D6E-409C-BE32-E72D297353CC}">
+                <c16:uniqueId val="{00000007-A88A-4E5B-BEAD-BE028B47C985}"/>
+              </c:ext>
+            </c:extLst>
+          </c:dPt>
+          <c:dPt>
+            <c:idx val="4"/>
+            <c:bubble3D val="0"/>
+            <c:spPr>
+              <a:solidFill>
+                <a:schemeClr val="accent5"/>
+              </a:solidFill>
+              <a:ln w="19050">
+                <a:solidFill>
+                  <a:schemeClr val="lt1"/>
+                </a:solidFill>
+              </a:ln>
+              <a:effectLst/>
+            </c:spPr>
+            <c:extLst>
+              <c:ext xmlns:c16="http://schemas.microsoft.com/office/drawing/2014/chart" uri="{C3380CC4-5D6E-409C-BE32-E72D297353CC}">
+                <c16:uniqueId val="{00000009-A88A-4E5B-BEAD-BE028B47C985}"/>
+              </c:ext>
+            </c:extLst>
+          </c:dPt>
+          <c:dPt>
+            <c:idx val="5"/>
+            <c:bubble3D val="0"/>
+            <c:spPr>
+              <a:solidFill>
+                <a:schemeClr val="accent6"/>
+              </a:solidFill>
+              <a:ln w="19050">
+                <a:solidFill>
+                  <a:schemeClr val="lt1"/>
+                </a:solidFill>
+              </a:ln>
+              <a:effectLst/>
+            </c:spPr>
+            <c:extLst>
+              <c:ext xmlns:c16="http://schemas.microsoft.com/office/drawing/2014/chart" uri="{C3380CC4-5D6E-409C-BE32-E72D297353CC}">
+                <c16:uniqueId val="{0000000B-A88A-4E5B-BEAD-BE028B47C985}"/>
+              </c:ext>
+            </c:extLst>
+          </c:dPt>
+          <c:dPt>
+            <c:idx val="6"/>
+            <c:bubble3D val="0"/>
+            <c:spPr>
+              <a:solidFill>
+                <a:schemeClr val="accent1">
+                  <a:lumMod val="60000"/>
+                </a:schemeClr>
+              </a:solidFill>
+              <a:ln w="19050">
+                <a:solidFill>
+                  <a:schemeClr val="lt1"/>
+                </a:solidFill>
+              </a:ln>
+              <a:effectLst/>
+            </c:spPr>
+            <c:extLst>
+              <c:ext xmlns:c16="http://schemas.microsoft.com/office/drawing/2014/chart" uri="{C3380CC4-5D6E-409C-BE32-E72D297353CC}">
+                <c16:uniqueId val="{0000000D-A88A-4E5B-BEAD-BE028B47C985}"/>
+              </c:ext>
+            </c:extLst>
+          </c:dPt>
+          <c:dPt>
+            <c:idx val="7"/>
+            <c:bubble3D val="0"/>
+            <c:spPr>
+              <a:solidFill>
+                <a:schemeClr val="accent2">
+                  <a:lumMod val="60000"/>
+                </a:schemeClr>
+              </a:solidFill>
+              <a:ln w="19050">
+                <a:solidFill>
+                  <a:schemeClr val="lt1"/>
+                </a:solidFill>
+              </a:ln>
+              <a:effectLst/>
+            </c:spPr>
+            <c:extLst>
+              <c:ext xmlns:c16="http://schemas.microsoft.com/office/drawing/2014/chart" uri="{C3380CC4-5D6E-409C-BE32-E72D297353CC}">
+                <c16:uniqueId val="{0000000F-A88A-4E5B-BEAD-BE028B47C985}"/>
+              </c:ext>
+            </c:extLst>
+          </c:dPt>
+          <c:dPt>
+            <c:idx val="8"/>
+            <c:bubble3D val="0"/>
+            <c:spPr>
+              <a:solidFill>
+                <a:schemeClr val="accent3">
+                  <a:lumMod val="60000"/>
+                </a:schemeClr>
+              </a:solidFill>
+              <a:ln w="19050">
+                <a:solidFill>
+                  <a:schemeClr val="lt1"/>
+                </a:solidFill>
+              </a:ln>
+              <a:effectLst/>
+            </c:spPr>
+            <c:extLst>
+              <c:ext xmlns:c16="http://schemas.microsoft.com/office/drawing/2014/chart" uri="{C3380CC4-5D6E-409C-BE32-E72D297353CC}">
+                <c16:uniqueId val="{00000011-A88A-4E5B-BEAD-BE028B47C985}"/>
+              </c:ext>
+            </c:extLst>
+          </c:dPt>
+          <c:dLbls>
+            <c:spPr>
+              <a:noFill/>
+              <a:ln>
+                <a:noFill/>
+              </a:ln>
+              <a:effectLst/>
+            </c:spPr>
+            <c:txPr>
+              <a:bodyPr rot="0" spcFirstLastPara="1" vertOverflow="ellipsis" vert="horz" wrap="square" lIns="38100" tIns="19050" rIns="38100" bIns="19050" anchor="ctr" anchorCtr="1">
+                <a:spAutoFit/>
+              </a:bodyPr>
+              <a:lstStyle/>
+              <a:p>
+                <a:pPr>
+                  <a:defRPr sz="900" b="0" i="0" u="none" strike="noStrike" kern="1200" baseline="0">
+                    <a:solidFill>
+                      <a:schemeClr val="tx1">
+                        <a:lumMod val="75000"/>
+                        <a:lumOff val="25000"/>
+                      </a:schemeClr>
+                    </a:solidFill>
+                    <a:latin typeface="IRANYekan" panose="020B0506030804020204" pitchFamily="34" charset="-78"/>
+                    <a:ea typeface="+mn-ea"/>
+                    <a:cs typeface="IRANYekan" panose="020B0506030804020204" pitchFamily="34" charset="-78"/>
+                  </a:defRPr>
+                </a:pPr>
+                <a:endParaRPr lang="en-US"/>
+              </a:p>
+            </c:txPr>
+            <c:dLblPos val="outEnd"/>
+            <c:showLegendKey val="0"/>
+            <c:showVal val="0"/>
+            <c:showCatName val="0"/>
+            <c:showSerName val="0"/>
+            <c:showPercent val="1"/>
+            <c:showBubbleSize val="0"/>
+            <c:showLeaderLines val="1"/>
+            <c:leaderLines>
+              <c:spPr>
+                <a:ln w="9525" cap="flat" cmpd="sng" algn="ctr">
+                  <a:solidFill>
+                    <a:schemeClr val="tx1">
+                      <a:lumMod val="35000"/>
+                      <a:lumOff val="65000"/>
+                    </a:schemeClr>
+                  </a:solidFill>
+                  <a:round/>
+                </a:ln>
+                <a:effectLst/>
+              </c:spPr>
+            </c:leaderLines>
+            <c:extLst>
+              <c:ext xmlns:c15="http://schemas.microsoft.com/office/drawing/2012/chart" uri="{CE6537A1-D6FC-4f65-9D91-7224C49458BB}"/>
+            </c:extLst>
+          </c:dLbls>
+          <c:cat>
+            <c:strRef>
+              <c:f>Sheet1!$B$2:$B$10</c:f>
+              <c:strCache>
+                <c:ptCount val="9"/>
+                <c:pt idx="0">
+                  <c:v>نیروی انسانی</c:v>
+                </c:pt>
+                <c:pt idx="1">
+                  <c:v>تبلیغات و بازاریابی</c:v>
+                </c:pt>
+                <c:pt idx="2">
+                  <c:v>سرور</c:v>
+                </c:pt>
+                <c:pt idx="3">
+                  <c:v>کولوکیشن دیتاسنتر ۲ سال</c:v>
+                </c:pt>
+                <c:pt idx="4">
+                  <c:v>پیش‌بینی نشده</c:v>
+                </c:pt>
+                <c:pt idx="5">
+                  <c:v>دفتر شرکت</c:v>
+                </c:pt>
+                <c:pt idx="6">
+                  <c:v>سیستم و تجهیزات دفتری</c:v>
+                </c:pt>
+                <c:pt idx="7">
+                  <c:v>سرمایه در گردش</c:v>
+                </c:pt>
+                <c:pt idx="8">
+                  <c:v>بکاپ و سرور خارج ایران</c:v>
+                </c:pt>
+              </c:strCache>
+            </c:strRef>
+          </c:cat>
+          <c:val>
+            <c:numRef>
+              <c:f>Sheet1!$C$2:$C$10</c:f>
+              <c:numCache>
+                <c:formatCode>General</c:formatCode>
+                <c:ptCount val="9"/>
+                <c:pt idx="0">
+                  <c:v>1800</c:v>
+                </c:pt>
+                <c:pt idx="1">
+                  <c:v>700</c:v>
+                </c:pt>
+                <c:pt idx="2">
+                  <c:v>600</c:v>
+                </c:pt>
+                <c:pt idx="3">
+                  <c:v>500</c:v>
+                </c:pt>
+                <c:pt idx="4">
+                  <c:v>500</c:v>
+                </c:pt>
+                <c:pt idx="5">
+                  <c:v>400</c:v>
+                </c:pt>
+                <c:pt idx="6">
+                  <c:v>300</c:v>
+                </c:pt>
+                <c:pt idx="7">
+                  <c:v>100</c:v>
+                </c:pt>
+                <c:pt idx="8">
+                  <c:v>100</c:v>
+                </c:pt>
+              </c:numCache>
+            </c:numRef>
+          </c:val>
+          <c:extLst>
+            <c:ext xmlns:c16="http://schemas.microsoft.com/office/drawing/2014/chart" uri="{C3380CC4-5D6E-409C-BE32-E72D297353CC}">
+              <c16:uniqueId val="{00000012-A88A-4E5B-BEAD-BE028B47C985}"/>
+            </c:ext>
+          </c:extLst>
+        </c:ser>
+        <c:dLbls>
+          <c:dLblPos val="bestFit"/>
+          <c:showLegendKey val="0"/>
+          <c:showVal val="1"/>
+          <c:showCatName val="0"/>
+          <c:showSerName val="0"/>
+          <c:showPercent val="0"/>
+          <c:showBubbleSize val="0"/>
+          <c:showLeaderLines val="1"/>
+        </c:dLbls>
+        <c:firstSliceAng val="0"/>
+      </c:pieChart>
+      <c:spPr>
+        <a:noFill/>
+        <a:ln>
+          <a:noFill/>
+        </a:ln>
+        <a:effectLst/>
+      </c:spPr>
+    </c:plotArea>
+    <c:legend>
+      <c:legendPos val="l"/>
+      <c:overlay val="0"/>
+      <c:spPr>
+        <a:noFill/>
+        <a:ln>
+          <a:noFill/>
+        </a:ln>
+        <a:effectLst/>
+      </c:spPr>
+      <c:txPr>
+        <a:bodyPr rot="0" spcFirstLastPara="1" vertOverflow="ellipsis" vert="horz" wrap="square" anchor="ctr" anchorCtr="1"/>
+        <a:lstStyle/>
+        <a:p>
+          <a:pPr>
+            <a:defRPr sz="900" b="0" i="0" u="none" strike="noStrike" kern="1200" baseline="0">
+              <a:solidFill>
+                <a:schemeClr val="tx1">
+                  <a:lumMod val="65000"/>
+                  <a:lumOff val="35000"/>
+                </a:schemeClr>
+              </a:solidFill>
+              <a:latin typeface="IRANYekan" panose="020B0506030804020204" pitchFamily="34" charset="-78"/>
+              <a:ea typeface="+mn-ea"/>
+              <a:cs typeface="IRANYekan" panose="020B0506030804020204" pitchFamily="34" charset="-78"/>
+            </a:defRPr>
+          </a:pPr>
+          <a:endParaRPr lang="en-US"/>
+        </a:p>
+      </c:txPr>
+    </c:legend>
+    <c:plotVisOnly val="1"/>
+    <c:dispBlanksAs val="gap"/>
+    <c:extLst>
+      <c:ext xmlns:c16r3="http://schemas.microsoft.com/office/drawing/2017/03/chart" uri="{56B9EC1D-385E-4148-901F-78D8002777C0}">
+        <c16r3:dataDisplayOptions16>
+          <c16r3:dispNaAsBlank val="1"/>
+        </c16r3:dataDisplayOptions16>
+      </c:ext>
+    </c:extLst>
+    <c:showDLblsOverMax val="0"/>
+  </c:chart>
+  <c:spPr>
+    <a:noFill/>
+    <a:ln>
+      <a:noFill/>
+    </a:ln>
+    <a:effectLst/>
+  </c:spPr>
+  <c:txPr>
+    <a:bodyPr/>
+    <a:lstStyle/>
+    <a:p>
+      <a:pPr>
+        <a:defRPr>
+          <a:latin typeface="IRANYekan" panose="020B0506030804020204" pitchFamily="34" charset="-78"/>
+          <a:cs typeface="IRANYekan" panose="020B0506030804020204" pitchFamily="34" charset="-78"/>
+        </a:defRPr>
       </a:pPr>
       <a:endParaRPr lang="en-US"/>
     </a:p>
@@ -1552,6 +2013,46 @@
   </cs:variation>
   <cs:variation>
     <a:tint val="80000"/>
+  </cs:variation>
+</cs:colorStyle>
+</file>
+
+<file path=ppt/charts/colors4.xml><?xml version="1.0" encoding="utf-8"?>
+<cs:colorStyle xmlns:cs="http://schemas.microsoft.com/office/drawing/2012/chartStyle" xmlns:a="http://schemas.openxmlformats.org/drawingml/2006/main" meth="cycle" id="10">
+  <a:schemeClr val="accent1"/>
+  <a:schemeClr val="accent2"/>
+  <a:schemeClr val="accent3"/>
+  <a:schemeClr val="accent4"/>
+  <a:schemeClr val="accent5"/>
+  <a:schemeClr val="accent6"/>
+  <cs:variation/>
+  <cs:variation>
+    <a:lumMod val="60000"/>
+  </cs:variation>
+  <cs:variation>
+    <a:lumMod val="80000"/>
+    <a:lumOff val="20000"/>
+  </cs:variation>
+  <cs:variation>
+    <a:lumMod val="80000"/>
+  </cs:variation>
+  <cs:variation>
+    <a:lumMod val="60000"/>
+    <a:lumOff val="40000"/>
+  </cs:variation>
+  <cs:variation>
+    <a:lumMod val="50000"/>
+  </cs:variation>
+  <cs:variation>
+    <a:lumMod val="70000"/>
+    <a:lumOff val="30000"/>
+  </cs:variation>
+  <cs:variation>
+    <a:lumMod val="70000"/>
+  </cs:variation>
+  <cs:variation>
+    <a:lumMod val="50000"/>
+    <a:lumOff val="50000"/>
   </cs:variation>
 </cs:colorStyle>
 </file>
@@ -3022,6 +3523,525 @@
             <a:lumOff val="85000"/>
           </a:schemeClr>
         </a:solidFill>
+      </a:ln>
+    </cs:spPr>
+  </cs:upBar>
+  <cs:valueAxis>
+    <cs:lnRef idx="0"/>
+    <cs:fillRef idx="0"/>
+    <cs:effectRef idx="0"/>
+    <cs:fontRef idx="minor">
+      <a:schemeClr val="tx1">
+        <a:lumMod val="65000"/>
+        <a:lumOff val="35000"/>
+      </a:schemeClr>
+    </cs:fontRef>
+    <cs:defRPr sz="900" kern="1200"/>
+  </cs:valueAxis>
+  <cs:wall>
+    <cs:lnRef idx="0"/>
+    <cs:fillRef idx="0"/>
+    <cs:effectRef idx="0"/>
+    <cs:fontRef idx="minor">
+      <a:schemeClr val="tx1"/>
+    </cs:fontRef>
+    <cs:spPr>
+      <a:noFill/>
+      <a:ln>
+        <a:noFill/>
+      </a:ln>
+    </cs:spPr>
+  </cs:wall>
+</cs:chartStyle>
+</file>
+
+<file path=ppt/charts/style4.xml><?xml version="1.0" encoding="utf-8"?>
+<cs:chartStyle xmlns:cs="http://schemas.microsoft.com/office/drawing/2012/chartStyle" xmlns:a="http://schemas.openxmlformats.org/drawingml/2006/main" id="251">
+  <cs:axisTitle>
+    <cs:lnRef idx="0"/>
+    <cs:fillRef idx="0"/>
+    <cs:effectRef idx="0"/>
+    <cs:fontRef idx="minor">
+      <a:schemeClr val="tx1">
+        <a:lumMod val="65000"/>
+        <a:lumOff val="35000"/>
+      </a:schemeClr>
+    </cs:fontRef>
+    <cs:defRPr sz="1000" kern="1200"/>
+  </cs:axisTitle>
+  <cs:categoryAxis>
+    <cs:lnRef idx="0"/>
+    <cs:fillRef idx="0"/>
+    <cs:effectRef idx="0"/>
+    <cs:fontRef idx="minor">
+      <a:schemeClr val="tx1">
+        <a:lumMod val="65000"/>
+        <a:lumOff val="35000"/>
+      </a:schemeClr>
+    </cs:fontRef>
+    <cs:spPr>
+      <a:ln w="9525" cap="flat" cmpd="sng" algn="ctr">
+        <a:solidFill>
+          <a:schemeClr val="tx1">
+            <a:lumMod val="15000"/>
+            <a:lumOff val="85000"/>
+          </a:schemeClr>
+        </a:solidFill>
+        <a:round/>
+      </a:ln>
+    </cs:spPr>
+    <cs:defRPr sz="900" kern="1200"/>
+  </cs:categoryAxis>
+  <cs:chartArea mods="allowNoFillOverride allowNoLineOverride">
+    <cs:lnRef idx="0"/>
+    <cs:fillRef idx="0"/>
+    <cs:effectRef idx="0"/>
+    <cs:fontRef idx="minor">
+      <a:schemeClr val="tx1"/>
+    </cs:fontRef>
+    <cs:spPr>
+      <a:solidFill>
+        <a:schemeClr val="bg1"/>
+      </a:solidFill>
+      <a:ln w="9525" cap="flat" cmpd="sng" algn="ctr">
+        <a:solidFill>
+          <a:schemeClr val="tx1">
+            <a:lumMod val="15000"/>
+            <a:lumOff val="85000"/>
+          </a:schemeClr>
+        </a:solidFill>
+        <a:round/>
+      </a:ln>
+    </cs:spPr>
+    <cs:defRPr sz="900" kern="1200"/>
+  </cs:chartArea>
+  <cs:dataLabel>
+    <cs:lnRef idx="0"/>
+    <cs:fillRef idx="0"/>
+    <cs:effectRef idx="0"/>
+    <cs:fontRef idx="minor">
+      <a:schemeClr val="tx1">
+        <a:lumMod val="75000"/>
+        <a:lumOff val="25000"/>
+      </a:schemeClr>
+    </cs:fontRef>
+    <cs:defRPr sz="900" kern="1200"/>
+  </cs:dataLabel>
+  <cs:dataLabelCallout>
+    <cs:lnRef idx="0"/>
+    <cs:fillRef idx="0"/>
+    <cs:effectRef idx="0"/>
+    <cs:fontRef idx="minor">
+      <a:schemeClr val="dk1">
+        <a:lumMod val="65000"/>
+        <a:lumOff val="35000"/>
+      </a:schemeClr>
+    </cs:fontRef>
+    <cs:spPr>
+      <a:solidFill>
+        <a:schemeClr val="lt1"/>
+      </a:solidFill>
+      <a:ln>
+        <a:solidFill>
+          <a:schemeClr val="dk1">
+            <a:lumMod val="25000"/>
+            <a:lumOff val="75000"/>
+          </a:schemeClr>
+        </a:solidFill>
+      </a:ln>
+    </cs:spPr>
+    <cs:defRPr sz="900" kern="1200"/>
+    <cs:bodyPr rot="0" spcFirstLastPara="1" vertOverflow="clip" horzOverflow="clip" vert="horz" wrap="square" lIns="36576" tIns="18288" rIns="36576" bIns="18288" anchor="ctr" anchorCtr="1">
+      <a:spAutoFit/>
+    </cs:bodyPr>
+  </cs:dataLabelCallout>
+  <cs:dataPoint>
+    <cs:lnRef idx="0"/>
+    <cs:fillRef idx="1">
+      <cs:styleClr val="auto"/>
+    </cs:fillRef>
+    <cs:effectRef idx="0"/>
+    <cs:fontRef idx="minor">
+      <a:schemeClr val="tx1"/>
+    </cs:fontRef>
+    <cs:spPr>
+      <a:ln w="19050">
+        <a:solidFill>
+          <a:schemeClr val="lt1"/>
+        </a:solidFill>
+      </a:ln>
+    </cs:spPr>
+  </cs:dataPoint>
+  <cs:dataPoint3D>
+    <cs:lnRef idx="0"/>
+    <cs:fillRef idx="1">
+      <cs:styleClr val="auto"/>
+    </cs:fillRef>
+    <cs:effectRef idx="0"/>
+    <cs:fontRef idx="minor">
+      <a:schemeClr val="tx1"/>
+    </cs:fontRef>
+    <cs:spPr>
+      <a:ln w="25400">
+        <a:solidFill>
+          <a:schemeClr val="lt1"/>
+        </a:solidFill>
+      </a:ln>
+    </cs:spPr>
+  </cs:dataPoint3D>
+  <cs:dataPointLine>
+    <cs:lnRef idx="0">
+      <cs:styleClr val="auto"/>
+    </cs:lnRef>
+    <cs:fillRef idx="0"/>
+    <cs:effectRef idx="0"/>
+    <cs:fontRef idx="minor">
+      <a:schemeClr val="tx1"/>
+    </cs:fontRef>
+    <cs:spPr>
+      <a:ln w="28575" cap="rnd">
+        <a:solidFill>
+          <a:schemeClr val="phClr"/>
+        </a:solidFill>
+        <a:round/>
+      </a:ln>
+    </cs:spPr>
+  </cs:dataPointLine>
+  <cs:dataPointMarker>
+    <cs:lnRef idx="0">
+      <cs:styleClr val="auto"/>
+    </cs:lnRef>
+    <cs:fillRef idx="1">
+      <cs:styleClr val="auto"/>
+    </cs:fillRef>
+    <cs:effectRef idx="0"/>
+    <cs:fontRef idx="minor">
+      <a:schemeClr val="tx1"/>
+    </cs:fontRef>
+    <cs:spPr>
+      <a:ln w="9525">
+        <a:solidFill>
+          <a:schemeClr val="phClr"/>
+        </a:solidFill>
+      </a:ln>
+    </cs:spPr>
+  </cs:dataPointMarker>
+  <cs:dataPointMarkerLayout symbol="circle" size="5"/>
+  <cs:dataPointWireframe>
+    <cs:lnRef idx="0">
+      <cs:styleClr val="auto"/>
+    </cs:lnRef>
+    <cs:fillRef idx="0"/>
+    <cs:effectRef idx="0"/>
+    <cs:fontRef idx="minor">
+      <a:schemeClr val="tx1"/>
+    </cs:fontRef>
+    <cs:spPr>
+      <a:ln w="9525" cap="rnd">
+        <a:solidFill>
+          <a:schemeClr val="phClr"/>
+        </a:solidFill>
+        <a:round/>
+      </a:ln>
+    </cs:spPr>
+  </cs:dataPointWireframe>
+  <cs:dataTable>
+    <cs:lnRef idx="0"/>
+    <cs:fillRef idx="0"/>
+    <cs:effectRef idx="0"/>
+    <cs:fontRef idx="minor">
+      <a:schemeClr val="tx1">
+        <a:lumMod val="65000"/>
+        <a:lumOff val="35000"/>
+      </a:schemeClr>
+    </cs:fontRef>
+    <cs:spPr>
+      <a:noFill/>
+      <a:ln w="9525" cap="flat" cmpd="sng" algn="ctr">
+        <a:solidFill>
+          <a:schemeClr val="tx1">
+            <a:lumMod val="15000"/>
+            <a:lumOff val="85000"/>
+          </a:schemeClr>
+        </a:solidFill>
+        <a:round/>
+      </a:ln>
+    </cs:spPr>
+    <cs:defRPr sz="900" kern="1200"/>
+  </cs:dataTable>
+  <cs:downBar>
+    <cs:lnRef idx="0"/>
+    <cs:fillRef idx="0"/>
+    <cs:effectRef idx="0"/>
+    <cs:fontRef idx="minor">
+      <a:schemeClr val="tx1"/>
+    </cs:fontRef>
+    <cs:spPr>
+      <a:solidFill>
+        <a:schemeClr val="dk1">
+          <a:lumMod val="75000"/>
+          <a:lumOff val="25000"/>
+        </a:schemeClr>
+      </a:solidFill>
+      <a:ln w="9525" cap="flat" cmpd="sng" algn="ctr">
+        <a:solidFill>
+          <a:schemeClr val="tx1">
+            <a:lumMod val="65000"/>
+            <a:lumOff val="35000"/>
+          </a:schemeClr>
+        </a:solidFill>
+        <a:round/>
+      </a:ln>
+    </cs:spPr>
+  </cs:downBar>
+  <cs:dropLine>
+    <cs:lnRef idx="0"/>
+    <cs:fillRef idx="0"/>
+    <cs:effectRef idx="0"/>
+    <cs:fontRef idx="minor">
+      <a:schemeClr val="tx1"/>
+    </cs:fontRef>
+    <cs:spPr>
+      <a:ln w="9525" cap="flat" cmpd="sng" algn="ctr">
+        <a:solidFill>
+          <a:schemeClr val="tx1">
+            <a:lumMod val="35000"/>
+            <a:lumOff val="65000"/>
+          </a:schemeClr>
+        </a:solidFill>
+        <a:round/>
+      </a:ln>
+    </cs:spPr>
+  </cs:dropLine>
+  <cs:errorBar>
+    <cs:lnRef idx="0"/>
+    <cs:fillRef idx="0"/>
+    <cs:effectRef idx="0"/>
+    <cs:fontRef idx="minor">
+      <a:schemeClr val="tx1"/>
+    </cs:fontRef>
+    <cs:spPr>
+      <a:ln w="9525" cap="flat" cmpd="sng" algn="ctr">
+        <a:solidFill>
+          <a:schemeClr val="tx1">
+            <a:lumMod val="65000"/>
+            <a:lumOff val="35000"/>
+          </a:schemeClr>
+        </a:solidFill>
+        <a:round/>
+      </a:ln>
+    </cs:spPr>
+  </cs:errorBar>
+  <cs:floor>
+    <cs:lnRef idx="0"/>
+    <cs:fillRef idx="0"/>
+    <cs:effectRef idx="0"/>
+    <cs:fontRef idx="minor">
+      <a:schemeClr val="tx1"/>
+    </cs:fontRef>
+    <cs:spPr>
+      <a:noFill/>
+      <a:ln>
+        <a:noFill/>
+      </a:ln>
+    </cs:spPr>
+  </cs:floor>
+  <cs:gridlineMajor>
+    <cs:lnRef idx="0"/>
+    <cs:fillRef idx="0"/>
+    <cs:effectRef idx="0"/>
+    <cs:fontRef idx="minor">
+      <a:schemeClr val="tx1"/>
+    </cs:fontRef>
+    <cs:spPr>
+      <a:ln w="9525" cap="flat" cmpd="sng" algn="ctr">
+        <a:solidFill>
+          <a:schemeClr val="tx1">
+            <a:lumMod val="15000"/>
+            <a:lumOff val="85000"/>
+          </a:schemeClr>
+        </a:solidFill>
+        <a:round/>
+      </a:ln>
+    </cs:spPr>
+  </cs:gridlineMajor>
+  <cs:gridlineMinor>
+    <cs:lnRef idx="0"/>
+    <cs:fillRef idx="0"/>
+    <cs:effectRef idx="0"/>
+    <cs:fontRef idx="minor">
+      <a:schemeClr val="tx1"/>
+    </cs:fontRef>
+    <cs:spPr>
+      <a:ln w="9525" cap="flat" cmpd="sng" algn="ctr">
+        <a:solidFill>
+          <a:schemeClr val="tx1">
+            <a:lumMod val="5000"/>
+            <a:lumOff val="95000"/>
+          </a:schemeClr>
+        </a:solidFill>
+        <a:round/>
+      </a:ln>
+    </cs:spPr>
+  </cs:gridlineMinor>
+  <cs:hiLoLine>
+    <cs:lnRef idx="0"/>
+    <cs:fillRef idx="0"/>
+    <cs:effectRef idx="0"/>
+    <cs:fontRef idx="minor">
+      <a:schemeClr val="tx1"/>
+    </cs:fontRef>
+    <cs:spPr>
+      <a:ln w="9525" cap="flat" cmpd="sng" algn="ctr">
+        <a:solidFill>
+          <a:schemeClr val="tx1">
+            <a:lumMod val="50000"/>
+            <a:lumOff val="50000"/>
+          </a:schemeClr>
+        </a:solidFill>
+        <a:round/>
+      </a:ln>
+    </cs:spPr>
+  </cs:hiLoLine>
+  <cs:leaderLine>
+    <cs:lnRef idx="0"/>
+    <cs:fillRef idx="0"/>
+    <cs:effectRef idx="0"/>
+    <cs:fontRef idx="minor">
+      <a:schemeClr val="tx1"/>
+    </cs:fontRef>
+    <cs:spPr>
+      <a:ln w="9525" cap="flat" cmpd="sng" algn="ctr">
+        <a:solidFill>
+          <a:schemeClr val="tx1">
+            <a:lumMod val="35000"/>
+            <a:lumOff val="65000"/>
+          </a:schemeClr>
+        </a:solidFill>
+        <a:round/>
+      </a:ln>
+    </cs:spPr>
+  </cs:leaderLine>
+  <cs:legend>
+    <cs:lnRef idx="0"/>
+    <cs:fillRef idx="0"/>
+    <cs:effectRef idx="0"/>
+    <cs:fontRef idx="minor">
+      <a:schemeClr val="tx1">
+        <a:lumMod val="65000"/>
+        <a:lumOff val="35000"/>
+      </a:schemeClr>
+    </cs:fontRef>
+    <cs:defRPr sz="900" kern="1200"/>
+  </cs:legend>
+  <cs:plotArea mods="allowNoFillOverride allowNoLineOverride">
+    <cs:lnRef idx="0"/>
+    <cs:fillRef idx="0"/>
+    <cs:effectRef idx="0"/>
+    <cs:fontRef idx="minor">
+      <a:schemeClr val="tx1"/>
+    </cs:fontRef>
+  </cs:plotArea>
+  <cs:plotArea3D mods="allowNoFillOverride allowNoLineOverride">
+    <cs:lnRef idx="0"/>
+    <cs:fillRef idx="0"/>
+    <cs:effectRef idx="0"/>
+    <cs:fontRef idx="minor">
+      <a:schemeClr val="tx1"/>
+    </cs:fontRef>
+  </cs:plotArea3D>
+  <cs:seriesAxis>
+    <cs:lnRef idx="0"/>
+    <cs:fillRef idx="0"/>
+    <cs:effectRef idx="0"/>
+    <cs:fontRef idx="minor">
+      <a:schemeClr val="tx1">
+        <a:lumMod val="65000"/>
+        <a:lumOff val="35000"/>
+      </a:schemeClr>
+    </cs:fontRef>
+    <cs:defRPr sz="900" kern="1200"/>
+  </cs:seriesAxis>
+  <cs:seriesLine>
+    <cs:lnRef idx="0"/>
+    <cs:fillRef idx="0"/>
+    <cs:effectRef idx="0"/>
+    <cs:fontRef idx="minor">
+      <a:schemeClr val="tx1"/>
+    </cs:fontRef>
+    <cs:spPr>
+      <a:ln w="9525" cap="flat" cmpd="sng" algn="ctr">
+        <a:solidFill>
+          <a:schemeClr val="tx1">
+            <a:lumMod val="35000"/>
+            <a:lumOff val="65000"/>
+          </a:schemeClr>
+        </a:solidFill>
+        <a:round/>
+      </a:ln>
+    </cs:spPr>
+  </cs:seriesLine>
+  <cs:title>
+    <cs:lnRef idx="0"/>
+    <cs:fillRef idx="0"/>
+    <cs:effectRef idx="0"/>
+    <cs:fontRef idx="minor">
+      <a:schemeClr val="tx1">
+        <a:lumMod val="65000"/>
+        <a:lumOff val="35000"/>
+      </a:schemeClr>
+    </cs:fontRef>
+    <cs:defRPr sz="1400" b="0" kern="1200" spc="0" baseline="0"/>
+  </cs:title>
+  <cs:trendline>
+    <cs:lnRef idx="0">
+      <cs:styleClr val="auto"/>
+    </cs:lnRef>
+    <cs:fillRef idx="0"/>
+    <cs:effectRef idx="0"/>
+    <cs:fontRef idx="minor">
+      <a:schemeClr val="tx1"/>
+    </cs:fontRef>
+    <cs:spPr>
+      <a:ln w="19050" cap="rnd">
+        <a:solidFill>
+          <a:schemeClr val="phClr"/>
+        </a:solidFill>
+        <a:prstDash val="sysDot"/>
+      </a:ln>
+    </cs:spPr>
+  </cs:trendline>
+  <cs:trendlineLabel>
+    <cs:lnRef idx="0"/>
+    <cs:fillRef idx="0"/>
+    <cs:effectRef idx="0"/>
+    <cs:fontRef idx="minor">
+      <a:schemeClr val="tx1">
+        <a:lumMod val="65000"/>
+        <a:lumOff val="35000"/>
+      </a:schemeClr>
+    </cs:fontRef>
+    <cs:defRPr sz="900" kern="1200"/>
+  </cs:trendlineLabel>
+  <cs:upBar>
+    <cs:lnRef idx="0"/>
+    <cs:fillRef idx="0"/>
+    <cs:effectRef idx="0"/>
+    <cs:fontRef idx="minor">
+      <a:schemeClr val="tx1"/>
+    </cs:fontRef>
+    <cs:spPr>
+      <a:solidFill>
+        <a:schemeClr val="lt1"/>
+      </a:solidFill>
+      <a:ln w="9525" cap="flat" cmpd="sng" algn="ctr">
+        <a:solidFill>
+          <a:schemeClr val="tx1">
+            <a:lumMod val="65000"/>
+            <a:lumOff val="35000"/>
+          </a:schemeClr>
+        </a:solidFill>
+        <a:round/>
       </a:ln>
     </cs:spPr>
   </cs:upBar>
@@ -11510,8 +12530,8 @@
       </dsp:nvSpPr>
       <dsp:spPr>
         <a:xfrm rot="16200000">
-          <a:off x="1168316" y="-1117994"/>
-          <a:ext cx="394375" cy="2731008"/>
+          <a:off x="1269916" y="-1219594"/>
+          <a:ext cx="394375" cy="2934208"/>
         </a:xfrm>
         <a:prstGeom prst="round2SameRect">
           <a:avLst/>
@@ -11579,7 +12599,7 @@
       </dsp:txBody>
       <dsp:txXfrm rot="5400000">
         <a:off x="19252" y="69574"/>
-        <a:ext cx="2711756" cy="355871"/>
+        <a:ext cx="2914956" cy="355871"/>
       </dsp:txXfrm>
     </dsp:sp>
     <dsp:sp modelId="{AFAF1B8D-B6E7-4E57-B97F-4B35F86A8683}">
@@ -11589,8 +12609,8 @@
       </dsp:nvSpPr>
       <dsp:spPr>
         <a:xfrm>
-          <a:off x="2731008" y="1024"/>
-          <a:ext cx="1536192" cy="492969"/>
+          <a:off x="2934208" y="1024"/>
+          <a:ext cx="1650492" cy="492969"/>
         </a:xfrm>
         <a:prstGeom prst="roundRect">
           <a:avLst/>
@@ -11631,12 +12651,12 @@
         </a:fontRef>
       </dsp:style>
       <dsp:txBody>
-        <a:bodyPr spcFirstLastPara="0" vert="horz" wrap="square" lIns="49530" tIns="24765" rIns="49530" bIns="24765" numCol="1" spcCol="1270" anchor="ctr" anchorCtr="0">
+        <a:bodyPr spcFirstLastPara="0" vert="horz" wrap="square" lIns="53340" tIns="26670" rIns="53340" bIns="26670" numCol="1" spcCol="1270" anchor="ctr" anchorCtr="0">
           <a:noAutofit/>
         </a:bodyPr>
         <a:lstStyle/>
         <a:p>
-          <a:pPr marL="0" lvl="0" indent="0" algn="ctr" defTabSz="577850">
+          <a:pPr marL="0" lvl="0" indent="0" algn="ctr" defTabSz="622300">
             <a:lnSpc>
               <a:spcPct val="90000"/>
             </a:lnSpc>
@@ -11649,15 +12669,15 @@
             <a:buNone/>
           </a:pPr>
           <a:r>
-            <a:rPr lang="fa-IR" sz="1300" kern="1200" dirty="0"/>
+            <a:rPr lang="fa-IR" sz="1400" kern="1200" dirty="0"/>
             <a:t>تعداد کل محصولات</a:t>
           </a:r>
-          <a:endParaRPr lang="en-US" sz="1300" kern="1200" dirty="0"/>
+          <a:endParaRPr lang="en-US" sz="1400" kern="1200" dirty="0"/>
         </a:p>
       </dsp:txBody>
       <dsp:txXfrm>
-        <a:off x="2755073" y="25089"/>
-        <a:ext cx="1488062" cy="444839"/>
+        <a:off x="2958273" y="25089"/>
+        <a:ext cx="1602362" cy="444839"/>
       </dsp:txXfrm>
     </dsp:sp>
     <dsp:sp modelId="{EFED500B-58B7-4168-930C-84D4911901E1}">
@@ -11667,8 +12687,8 @@
       </dsp:nvSpPr>
       <dsp:spPr>
         <a:xfrm rot="16200000">
-          <a:off x="1168316" y="-600376"/>
-          <a:ext cx="394375" cy="2731008"/>
+          <a:off x="1269916" y="-701975"/>
+          <a:ext cx="394375" cy="2934208"/>
         </a:xfrm>
         <a:prstGeom prst="round2SameRect">
           <a:avLst/>
@@ -11735,8 +12755,8 @@
         </a:p>
       </dsp:txBody>
       <dsp:txXfrm rot="5400000">
-        <a:off x="19252" y="587192"/>
-        <a:ext cx="2711756" cy="355871"/>
+        <a:off x="19252" y="587193"/>
+        <a:ext cx="2914956" cy="355871"/>
       </dsp:txXfrm>
     </dsp:sp>
     <dsp:sp modelId="{9ECA73F4-8A09-4668-B118-3B8FC09F03ED}">
@@ -11746,8 +12766,8 @@
       </dsp:nvSpPr>
       <dsp:spPr>
         <a:xfrm>
-          <a:off x="2731008" y="518643"/>
-          <a:ext cx="1536192" cy="492969"/>
+          <a:off x="2934208" y="518643"/>
+          <a:ext cx="1650492" cy="492969"/>
         </a:xfrm>
         <a:prstGeom prst="roundRect">
           <a:avLst/>
@@ -11788,12 +12808,12 @@
         </a:fontRef>
       </dsp:style>
       <dsp:txBody>
-        <a:bodyPr spcFirstLastPara="0" vert="horz" wrap="square" lIns="49530" tIns="24765" rIns="49530" bIns="24765" numCol="1" spcCol="1270" anchor="ctr" anchorCtr="0">
+        <a:bodyPr spcFirstLastPara="0" vert="horz" wrap="square" lIns="53340" tIns="26670" rIns="53340" bIns="26670" numCol="1" spcCol="1270" anchor="ctr" anchorCtr="0">
           <a:noAutofit/>
         </a:bodyPr>
         <a:lstStyle/>
         <a:p>
-          <a:pPr marL="0" lvl="0" indent="0" algn="ctr" defTabSz="577850">
+          <a:pPr marL="0" lvl="0" indent="0" algn="ctr" defTabSz="622300">
             <a:lnSpc>
               <a:spcPct val="90000"/>
             </a:lnSpc>
@@ -11806,15 +12826,15 @@
             <a:buNone/>
           </a:pPr>
           <a:r>
-            <a:rPr lang="fa-IR" sz="1300" kern="1200"/>
+            <a:rPr lang="fa-IR" sz="1400" kern="1200"/>
             <a:t>تعداد کل فاکتورها</a:t>
           </a:r>
-          <a:endParaRPr lang="en-US" sz="1300" kern="1200" dirty="0"/>
+          <a:endParaRPr lang="en-US" sz="1400" kern="1200" dirty="0"/>
         </a:p>
       </dsp:txBody>
       <dsp:txXfrm>
-        <a:off x="2755073" y="542708"/>
-        <a:ext cx="1488062" cy="444839"/>
+        <a:off x="2958273" y="542708"/>
+        <a:ext cx="1602362" cy="444839"/>
       </dsp:txXfrm>
     </dsp:sp>
     <dsp:sp modelId="{ED93BD0B-1783-4AD7-84F9-25523B1941C1}">
@@ -11824,8 +12844,8 @@
       </dsp:nvSpPr>
       <dsp:spPr>
         <a:xfrm rot="16200000">
-          <a:off x="1168316" y="-82757"/>
-          <a:ext cx="394375" cy="2731008"/>
+          <a:off x="1269916" y="-184357"/>
+          <a:ext cx="394375" cy="2934208"/>
         </a:xfrm>
         <a:prstGeom prst="round2SameRect">
           <a:avLst/>
@@ -11893,7 +12913,7 @@
       </dsp:txBody>
       <dsp:txXfrm rot="5400000">
         <a:off x="19252" y="1104811"/>
-        <a:ext cx="2711756" cy="355871"/>
+        <a:ext cx="2914956" cy="355871"/>
       </dsp:txXfrm>
     </dsp:sp>
     <dsp:sp modelId="{9DB16810-82A4-4AED-B5DD-B623E2064468}">
@@ -11903,8 +12923,8 @@
       </dsp:nvSpPr>
       <dsp:spPr>
         <a:xfrm>
-          <a:off x="2731008" y="1036261"/>
-          <a:ext cx="1536192" cy="492969"/>
+          <a:off x="2934208" y="1036261"/>
+          <a:ext cx="1650492" cy="492969"/>
         </a:xfrm>
         <a:prstGeom prst="roundRect">
           <a:avLst/>
@@ -11945,12 +12965,12 @@
         </a:fontRef>
       </dsp:style>
       <dsp:txBody>
-        <a:bodyPr spcFirstLastPara="0" vert="horz" wrap="square" lIns="49530" tIns="24765" rIns="49530" bIns="24765" numCol="1" spcCol="1270" anchor="ctr" anchorCtr="0">
+        <a:bodyPr spcFirstLastPara="0" vert="horz" wrap="square" lIns="53340" tIns="26670" rIns="53340" bIns="26670" numCol="1" spcCol="1270" anchor="ctr" anchorCtr="0">
           <a:noAutofit/>
         </a:bodyPr>
         <a:lstStyle/>
         <a:p>
-          <a:pPr marL="0" lvl="0" indent="0" algn="ctr" defTabSz="577850">
+          <a:pPr marL="0" lvl="0" indent="0" algn="ctr" defTabSz="622300">
             <a:lnSpc>
               <a:spcPct val="90000"/>
             </a:lnSpc>
@@ -11963,15 +12983,15 @@
             <a:buNone/>
           </a:pPr>
           <a:r>
-            <a:rPr lang="fa-IR" sz="1300" kern="1200" dirty="0"/>
+            <a:rPr lang="fa-IR" sz="1400" kern="1200" dirty="0"/>
             <a:t>جمع کل فروش</a:t>
           </a:r>
-          <a:endParaRPr lang="en-US" sz="1300" kern="1200" dirty="0"/>
+          <a:endParaRPr lang="en-US" sz="1400" kern="1200" dirty="0"/>
         </a:p>
       </dsp:txBody>
       <dsp:txXfrm>
-        <a:off x="2755073" y="1060326"/>
-        <a:ext cx="1488062" cy="444839"/>
+        <a:off x="2958273" y="1060326"/>
+        <a:ext cx="1602362" cy="444839"/>
       </dsp:txXfrm>
     </dsp:sp>
     <dsp:sp modelId="{5B3E4F1C-5E19-4B23-8FFD-5B2203BCAFC7}">
@@ -11981,8 +13001,8 @@
       </dsp:nvSpPr>
       <dsp:spPr>
         <a:xfrm rot="16200000">
-          <a:off x="1168316" y="434860"/>
-          <a:ext cx="394375" cy="2731008"/>
+          <a:off x="1269916" y="333261"/>
+          <a:ext cx="394375" cy="2934208"/>
         </a:xfrm>
         <a:prstGeom prst="round2SameRect">
           <a:avLst/>
@@ -12053,8 +13073,8 @@
         </a:p>
       </dsp:txBody>
       <dsp:txXfrm rot="5400000">
-        <a:off x="19252" y="1622428"/>
-        <a:ext cx="2711756" cy="355871"/>
+        <a:off x="19252" y="1622429"/>
+        <a:ext cx="2914956" cy="355871"/>
       </dsp:txXfrm>
     </dsp:sp>
     <dsp:sp modelId="{E330E993-8214-4602-8195-133D882DF2BA}">
@@ -12064,8 +13084,8 @@
       </dsp:nvSpPr>
       <dsp:spPr>
         <a:xfrm>
-          <a:off x="2731008" y="1553880"/>
-          <a:ext cx="1536192" cy="492969"/>
+          <a:off x="2934208" y="1553880"/>
+          <a:ext cx="1650492" cy="492969"/>
         </a:xfrm>
         <a:prstGeom prst="roundRect">
           <a:avLst/>
@@ -12149,8 +13169,8 @@
         </a:p>
       </dsp:txBody>
       <dsp:txXfrm>
-        <a:off x="2755073" y="1577945"/>
-        <a:ext cx="1488062" cy="444839"/>
+        <a:off x="2958273" y="1577945"/>
+        <a:ext cx="1602362" cy="444839"/>
       </dsp:txXfrm>
     </dsp:sp>
   </dsp:spTree>
@@ -17013,7 +18033,7 @@
           <a:p>
             <a:fld id="{EC29E1AC-3210-4C03-93DF-294BFDB0FAF7}" type="slidenum">
               <a:rPr lang="en-US" smtClean="0"/>
-              <a:t>17</a:t>
+              <a:t>18</a:t>
             </a:fld>
             <a:endParaRPr lang="en-US"/>
           </a:p>
@@ -18108,7 +19128,7 @@
           <a:p>
             <a:fld id="{EC29E1AC-3210-4C03-93DF-294BFDB0FAF7}" type="slidenum">
               <a:rPr lang="en-US" smtClean="0"/>
-              <a:t>14</a:t>
+              <a:t>15</a:t>
             </a:fld>
             <a:endParaRPr lang="en-US"/>
           </a:p>
@@ -18229,7 +19249,7 @@
           <a:p>
             <a:fld id="{EC29E1AC-3210-4C03-93DF-294BFDB0FAF7}" type="slidenum">
               <a:rPr lang="en-US" smtClean="0"/>
-              <a:t>15</a:t>
+              <a:t>16</a:t>
             </a:fld>
             <a:endParaRPr lang="en-US"/>
           </a:p>
@@ -25072,6 +26092,25 @@
             </a:r>
             <a:endParaRPr lang="en-US" dirty="0"/>
           </a:p>
+          <a:p>
+            <a:r>
+              <a:rPr lang="fa-IR" dirty="0"/>
+              <a:t>تکنولوژی فوق‌العاده</a:t>
+            </a:r>
+          </a:p>
+          <a:p>
+            <a:r>
+              <a:rPr lang="fa-IR" dirty="0"/>
+              <a:t>دیزاین زیبا</a:t>
+            </a:r>
+          </a:p>
+          <a:p>
+            <a:r>
+              <a:rPr lang="fa-IR" dirty="0"/>
+              <a:t>راه‌اندازی آسان</a:t>
+            </a:r>
+            <a:endParaRPr lang="en-US" dirty="0"/>
+          </a:p>
         </p:txBody>
       </p:sp>
     </p:spTree>
@@ -25100,6 +26139,227 @@
 </file>
 
 <file path=ppt/slides/slide11.xml><?xml version="1.0" encoding="utf-8"?>
+<p:sld xmlns:a="http://schemas.openxmlformats.org/drawingml/2006/main" xmlns:r="http://schemas.openxmlformats.org/officeDocument/2006/relationships" xmlns:p="http://schemas.openxmlformats.org/presentationml/2006/main">
+  <p:cSld>
+    <p:spTree>
+      <p:nvGrpSpPr>
+        <p:cNvPr id="1" name=""/>
+        <p:cNvGrpSpPr/>
+        <p:nvPr/>
+      </p:nvGrpSpPr>
+      <p:grpSpPr>
+        <a:xfrm>
+          <a:off x="0" y="0"/>
+          <a:ext cx="0" cy="0"/>
+          <a:chOff x="0" y="0"/>
+          <a:chExt cx="0" cy="0"/>
+        </a:xfrm>
+      </p:grpSpPr>
+      <p:sp>
+        <p:nvSpPr>
+          <p:cNvPr id="2" name="Title 1">
+            <a:extLst>
+              <a:ext uri="{FF2B5EF4-FFF2-40B4-BE49-F238E27FC236}">
+                <a16:creationId xmlns:a16="http://schemas.microsoft.com/office/drawing/2014/main" id="{C5FB20BA-1E8D-4DE4-8D09-0D945BB1EE39}"/>
+              </a:ext>
+            </a:extLst>
+          </p:cNvPr>
+          <p:cNvSpPr>
+            <a:spLocks noGrp="1"/>
+          </p:cNvSpPr>
+          <p:nvPr>
+            <p:ph type="title"/>
+          </p:nvPr>
+        </p:nvSpPr>
+        <p:spPr/>
+        <p:txBody>
+          <a:bodyPr/>
+          <a:lstStyle/>
+          <a:p>
+            <a:r>
+              <a:rPr lang="fa-IR" dirty="0"/>
+              <a:t>نکات برجسته برای سرمایه‌گذاری</a:t>
+            </a:r>
+            <a:endParaRPr lang="en-US" dirty="0"/>
+          </a:p>
+        </p:txBody>
+      </p:sp>
+      <p:sp>
+        <p:nvSpPr>
+          <p:cNvPr id="3" name="Content Placeholder 2">
+            <a:extLst>
+              <a:ext uri="{FF2B5EF4-FFF2-40B4-BE49-F238E27FC236}">
+                <a16:creationId xmlns:a16="http://schemas.microsoft.com/office/drawing/2014/main" id="{B3F64DA5-30CA-4E94-A790-EC93772596FC}"/>
+              </a:ext>
+            </a:extLst>
+          </p:cNvPr>
+          <p:cNvSpPr>
+            <a:spLocks noGrp="1"/>
+          </p:cNvSpPr>
+          <p:nvPr>
+            <p:ph idx="1"/>
+          </p:nvPr>
+        </p:nvSpPr>
+        <p:spPr/>
+        <p:txBody>
+          <a:bodyPr>
+            <a:normAutofit fontScale="85000" lnSpcReduction="20000"/>
+          </a:bodyPr>
+          <a:lstStyle/>
+          <a:p>
+            <a:pPr marL="45720" indent="0">
+              <a:buNone/>
+            </a:pPr>
+            <a:r>
+              <a:rPr lang="fa-IR" dirty="0">
+                <a:cs typeface="+mj-cs"/>
+              </a:rPr>
+              <a:t>مقیاس‌پذیر</a:t>
+            </a:r>
+          </a:p>
+          <a:p>
+            <a:pPr marL="45720" indent="0">
+              <a:lnSpc>
+                <a:spcPct val="100000"/>
+              </a:lnSpc>
+              <a:buNone/>
+            </a:pPr>
+            <a:r>
+              <a:rPr lang="fa-IR" dirty="0"/>
+              <a:t>جیبرس محصولی با کیفیت عالی است و قابلیت جهانی شدن را به‌دلیل معماری برتر داراست.</a:t>
+            </a:r>
+            <a:endParaRPr lang="en-US" dirty="0"/>
+          </a:p>
+          <a:p>
+            <a:pPr marL="45720" indent="0">
+              <a:lnSpc>
+                <a:spcPct val="100000"/>
+              </a:lnSpc>
+              <a:buNone/>
+            </a:pPr>
+            <a:endParaRPr lang="fa-IR" sz="700" dirty="0"/>
+          </a:p>
+          <a:p>
+            <a:pPr marL="45720" indent="0">
+              <a:buNone/>
+            </a:pPr>
+            <a:r>
+              <a:rPr lang="fa-IR" dirty="0">
+                <a:cs typeface="+mj-cs"/>
+              </a:rPr>
+              <a:t>استراتژی رشد متفاوت</a:t>
+            </a:r>
+          </a:p>
+          <a:p>
+            <a:pPr marL="45720" indent="0">
+              <a:lnSpc>
+                <a:spcPct val="100000"/>
+              </a:lnSpc>
+              <a:buNone/>
+            </a:pPr>
+            <a:r>
+              <a:rPr lang="fa-IR" dirty="0"/>
+              <a:t>قابلیت رشد فوق‌العاده به‌دلیل استراتژی فری‌میوم و موفقیت در دستیابی به مشتری</a:t>
+            </a:r>
+            <a:endParaRPr lang="en-US" dirty="0"/>
+          </a:p>
+          <a:p>
+            <a:pPr marL="45720" indent="0">
+              <a:lnSpc>
+                <a:spcPct val="100000"/>
+              </a:lnSpc>
+              <a:buNone/>
+            </a:pPr>
+            <a:endParaRPr lang="fa-IR" sz="700" dirty="0"/>
+          </a:p>
+          <a:p>
+            <a:pPr marL="45720" indent="0">
+              <a:buNone/>
+            </a:pPr>
+            <a:r>
+              <a:rPr lang="fa-IR" dirty="0">
+                <a:cs typeface="+mj-cs"/>
+              </a:rPr>
+              <a:t>فرصت بی‌نظیر</a:t>
+            </a:r>
+          </a:p>
+          <a:p>
+            <a:pPr marL="45720" indent="0">
+              <a:lnSpc>
+                <a:spcPct val="100000"/>
+              </a:lnSpc>
+              <a:buNone/>
+            </a:pPr>
+            <a:r>
+              <a:rPr lang="fa-IR" dirty="0"/>
+              <a:t>محصولی خاص در حوزه فین‌تک و تجارت الکترونیک با قابلیت رشد بی‌نهایت</a:t>
+            </a:r>
+            <a:endParaRPr lang="en-US" dirty="0"/>
+          </a:p>
+          <a:p>
+            <a:pPr marL="45720" indent="0">
+              <a:lnSpc>
+                <a:spcPct val="100000"/>
+              </a:lnSpc>
+              <a:buNone/>
+            </a:pPr>
+            <a:endParaRPr lang="fa-IR" sz="600" dirty="0"/>
+          </a:p>
+          <a:p>
+            <a:pPr marL="45720" indent="0">
+              <a:lnSpc>
+                <a:spcPct val="100000"/>
+              </a:lnSpc>
+              <a:buNone/>
+            </a:pPr>
+            <a:r>
+              <a:rPr lang="fa-IR" sz="2100" dirty="0">
+                <a:cs typeface="+mj-cs"/>
+              </a:rPr>
+              <a:t>چشم‌انداز</a:t>
+            </a:r>
+          </a:p>
+          <a:p>
+            <a:pPr marL="45720" indent="0">
+              <a:lnSpc>
+                <a:spcPct val="100000"/>
+              </a:lnSpc>
+              <a:buNone/>
+            </a:pPr>
+            <a:r>
+              <a:rPr lang="fa-IR" dirty="0"/>
+              <a:t>برنامه‌ریزی و نگاه بلندمدت به محصول و تیم فنی مسلط بر توسعه محصول</a:t>
+            </a:r>
+            <a:endParaRPr lang="en-US" dirty="0"/>
+          </a:p>
+        </p:txBody>
+      </p:sp>
+    </p:spTree>
+    <p:extLst>
+      <p:ext uri="{BB962C8B-B14F-4D97-AF65-F5344CB8AC3E}">
+        <p14:creationId xmlns:p14="http://schemas.microsoft.com/office/powerpoint/2010/main" val="2072010956"/>
+      </p:ext>
+    </p:extLst>
+  </p:cSld>
+  <p:clrMapOvr>
+    <a:masterClrMapping/>
+  </p:clrMapOvr>
+  <mc:AlternateContent xmlns:mc="http://schemas.openxmlformats.org/markup-compatibility/2006" xmlns:p159="http://schemas.microsoft.com/office/powerpoint/2015/09/main">
+    <mc:Choice Requires="p159">
+      <p:transition>
+        <p159:morph option="byWord"/>
+      </p:transition>
+    </mc:Choice>
+    <mc:Fallback xmlns="">
+      <p:transition>
+        <p:fade/>
+      </p:transition>
+    </mc:Fallback>
+  </mc:AlternateContent>
+</p:sld>
+</file>
+
+<file path=ppt/slides/slide12.xml><?xml version="1.0" encoding="utf-8"?>
 <p:sld xmlns:a="http://schemas.openxmlformats.org/drawingml/2006/main" xmlns:r="http://schemas.openxmlformats.org/officeDocument/2006/relationships" xmlns:p="http://schemas.openxmlformats.org/presentationml/2006/main">
   <p:cSld>
     <p:spTree>
@@ -25161,12 +26421,1696 @@
             <p:ph idx="1"/>
           </p:nvPr>
         </p:nvSpPr>
-        <p:spPr/>
+        <p:spPr>
+          <a:xfrm>
+            <a:off x="7618071" y="2902767"/>
+            <a:ext cx="3503321" cy="2774133"/>
+          </a:xfrm>
+        </p:spPr>
         <p:txBody>
-          <a:bodyPr/>
+          <a:bodyPr>
+            <a:normAutofit/>
+          </a:bodyPr>
           <a:lstStyle/>
           <a:p>
-            <a:endParaRPr lang="en-US"/>
+            <a:pPr marL="45720" indent="0">
+              <a:buNone/>
+            </a:pPr>
+            <a:r>
+              <a:rPr lang="fa-IR" sz="2400" dirty="0">
+                <a:solidFill>
+                  <a:schemeClr val="accent3"/>
+                </a:solidFill>
+                <a:cs typeface="+mj-cs"/>
+              </a:rPr>
+              <a:t>امکانات اصلی</a:t>
+            </a:r>
+          </a:p>
+          <a:p>
+            <a:pPr marL="45720" indent="0">
+              <a:spcBef>
+                <a:spcPts val="0"/>
+              </a:spcBef>
+              <a:buNone/>
+            </a:pPr>
+            <a:r>
+              <a:rPr lang="fa-IR" sz="1600" dirty="0">
+                <a:solidFill>
+                  <a:srgbClr val="8F8F8F"/>
+                </a:solidFill>
+              </a:rPr>
+              <a:t>توسعه پلتفرم</a:t>
+            </a:r>
+          </a:p>
+          <a:p>
+            <a:pPr marL="45720" indent="0">
+              <a:spcBef>
+                <a:spcPts val="0"/>
+              </a:spcBef>
+              <a:buNone/>
+            </a:pPr>
+            <a:r>
+              <a:rPr lang="fa-IR" sz="1600" dirty="0">
+                <a:solidFill>
+                  <a:srgbClr val="8F8F8F"/>
+                </a:solidFill>
+              </a:rPr>
+              <a:t>تهیه آموزش‌های متنوع و کامل</a:t>
+            </a:r>
+          </a:p>
+          <a:p>
+            <a:pPr marL="45720" indent="0">
+              <a:spcBef>
+                <a:spcPts val="0"/>
+              </a:spcBef>
+              <a:buNone/>
+            </a:pPr>
+            <a:r>
+              <a:rPr lang="fa-IR" sz="1600" dirty="0">
+                <a:solidFill>
+                  <a:srgbClr val="8F8F8F"/>
+                </a:solidFill>
+              </a:rPr>
+              <a:t>یکپارچگی بیشتر با سرویس‌های دیگران</a:t>
+            </a:r>
+          </a:p>
+          <a:p>
+            <a:pPr marL="45720" indent="0">
+              <a:spcBef>
+                <a:spcPts val="0"/>
+              </a:spcBef>
+              <a:buNone/>
+            </a:pPr>
+            <a:r>
+              <a:rPr lang="fa-IR" sz="1600" dirty="0">
+                <a:solidFill>
+                  <a:srgbClr val="8F8F8F"/>
+                </a:solidFill>
+              </a:rPr>
+              <a:t>افزایش کانال‌های فروش</a:t>
+            </a:r>
+            <a:endParaRPr lang="fa-IR" sz="1800" dirty="0">
+              <a:solidFill>
+                <a:srgbClr val="8F8F8F"/>
+              </a:solidFill>
+            </a:endParaRPr>
+          </a:p>
+          <a:p>
+            <a:pPr marL="45720" indent="0">
+              <a:spcBef>
+                <a:spcPts val="0"/>
+              </a:spcBef>
+              <a:buNone/>
+            </a:pPr>
+            <a:r>
+              <a:rPr lang="fa-IR" sz="1600" dirty="0">
+                <a:solidFill>
+                  <a:srgbClr val="8F8F8F"/>
+                </a:solidFill>
+              </a:rPr>
+              <a:t>معرفی برند جیبرس</a:t>
+            </a:r>
+          </a:p>
+          <a:p>
+            <a:pPr marL="45720" indent="0">
+              <a:spcBef>
+                <a:spcPts val="0"/>
+              </a:spcBef>
+              <a:buNone/>
+            </a:pPr>
+            <a:endParaRPr lang="en-US" sz="1800" dirty="0">
+              <a:solidFill>
+                <a:srgbClr val="8F8F8F"/>
+              </a:solidFill>
+            </a:endParaRPr>
+          </a:p>
+        </p:txBody>
+      </p:sp>
+      <p:cxnSp>
+        <p:nvCxnSpPr>
+          <p:cNvPr id="5" name="Straight Arrow Connector 4">
+            <a:extLst>
+              <a:ext uri="{FF2B5EF4-FFF2-40B4-BE49-F238E27FC236}">
+                <a16:creationId xmlns:a16="http://schemas.microsoft.com/office/drawing/2014/main" id="{6C174267-5237-4EDE-B01D-8E1C5F4B4A49}"/>
+              </a:ext>
+            </a:extLst>
+          </p:cNvPr>
+          <p:cNvCxnSpPr>
+            <a:cxnSpLocks/>
+          </p:cNvCxnSpPr>
+          <p:nvPr/>
+        </p:nvCxnSpPr>
+        <p:spPr>
+          <a:xfrm flipH="1" flipV="1">
+            <a:off x="1056004" y="3162300"/>
+            <a:ext cx="10080000" cy="2774133"/>
+          </a:xfrm>
+          <a:prstGeom prst="straightConnector1">
+            <a:avLst/>
+          </a:prstGeom>
+          <a:ln w="38100">
+            <a:tailEnd type="triangle"/>
+          </a:ln>
+        </p:spPr>
+        <p:style>
+          <a:lnRef idx="1">
+            <a:schemeClr val="accent1"/>
+          </a:lnRef>
+          <a:fillRef idx="0">
+            <a:schemeClr val="accent1"/>
+          </a:fillRef>
+          <a:effectRef idx="0">
+            <a:schemeClr val="accent1"/>
+          </a:effectRef>
+          <a:fontRef idx="minor">
+            <a:schemeClr val="tx1"/>
+          </a:fontRef>
+        </p:style>
+      </p:cxnSp>
+      <p:sp>
+        <p:nvSpPr>
+          <p:cNvPr id="7" name="Content Placeholder 2">
+            <a:extLst>
+              <a:ext uri="{FF2B5EF4-FFF2-40B4-BE49-F238E27FC236}">
+                <a16:creationId xmlns:a16="http://schemas.microsoft.com/office/drawing/2014/main" id="{B6750083-1AEE-4095-A0FF-3D40F3539DFA}"/>
+              </a:ext>
+            </a:extLst>
+          </p:cNvPr>
+          <p:cNvSpPr txBox="1">
+            <a:spLocks/>
+          </p:cNvSpPr>
+          <p:nvPr/>
+        </p:nvSpPr>
+        <p:spPr>
+          <a:xfrm>
+            <a:off x="3962384" y="1911740"/>
+            <a:ext cx="3223904" cy="2712908"/>
+          </a:xfrm>
+          <a:prstGeom prst="rect">
+            <a:avLst/>
+          </a:prstGeom>
+        </p:spPr>
+        <p:txBody>
+          <a:bodyPr vert="horz" lIns="91440" tIns="45720" rIns="91440" bIns="45720" rtlCol="0">
+            <a:normAutofit/>
+          </a:bodyPr>
+          <a:lstStyle>
+            <a:lvl1pPr marL="228600" indent="-182880" algn="r" defTabSz="914400" rtl="1" eaLnBrk="1" latinLnBrk="0" hangingPunct="1">
+              <a:lnSpc>
+                <a:spcPct val="150000"/>
+              </a:lnSpc>
+              <a:spcBef>
+                <a:spcPts val="1400"/>
+              </a:spcBef>
+              <a:buClr>
+                <a:srgbClr val="777777"/>
+              </a:buClr>
+              <a:buSzPct val="80000"/>
+              <a:buFont typeface="Wingdings" panose="05000000000000000000" pitchFamily="2" charset="2"/>
+              <a:buChar char="§"/>
+              <a:defRPr sz="2200" kern="1200">
+                <a:solidFill>
+                  <a:srgbClr val="333333"/>
+                </a:solidFill>
+                <a:latin typeface="+mn-lt"/>
+                <a:ea typeface="+mn-ea"/>
+                <a:cs typeface="+mn-cs"/>
+              </a:defRPr>
+            </a:lvl1pPr>
+            <a:lvl2pPr marL="457200" indent="-182880" algn="r" defTabSz="914400" rtl="1" eaLnBrk="1" latinLnBrk="0" hangingPunct="1">
+              <a:lnSpc>
+                <a:spcPct val="150000"/>
+              </a:lnSpc>
+              <a:spcBef>
+                <a:spcPts val="200"/>
+              </a:spcBef>
+              <a:spcAft>
+                <a:spcPts val="400"/>
+              </a:spcAft>
+              <a:buClr>
+                <a:srgbClr val="777777"/>
+              </a:buClr>
+              <a:buSzPct val="80000"/>
+              <a:buFont typeface="Wingdings" panose="05000000000000000000" pitchFamily="2" charset="2"/>
+              <a:buChar char="§"/>
+              <a:defRPr sz="2000" kern="1200">
+                <a:solidFill>
+                  <a:srgbClr val="333333"/>
+                </a:solidFill>
+                <a:latin typeface="+mn-lt"/>
+                <a:ea typeface="+mn-ea"/>
+                <a:cs typeface="+mn-cs"/>
+              </a:defRPr>
+            </a:lvl2pPr>
+            <a:lvl3pPr marL="731520" indent="-182880" algn="r" defTabSz="914400" rtl="1" eaLnBrk="1" latinLnBrk="0" hangingPunct="1">
+              <a:lnSpc>
+                <a:spcPct val="150000"/>
+              </a:lnSpc>
+              <a:spcBef>
+                <a:spcPts val="200"/>
+              </a:spcBef>
+              <a:spcAft>
+                <a:spcPts val="400"/>
+              </a:spcAft>
+              <a:buClr>
+                <a:srgbClr val="777777"/>
+              </a:buClr>
+              <a:buSzPct val="80000"/>
+              <a:buFont typeface="Wingdings" panose="05000000000000000000" pitchFamily="2" charset="2"/>
+              <a:buChar char="§"/>
+              <a:defRPr sz="1800" kern="1200">
+                <a:solidFill>
+                  <a:srgbClr val="333333"/>
+                </a:solidFill>
+                <a:latin typeface="+mn-lt"/>
+                <a:ea typeface="+mn-ea"/>
+                <a:cs typeface="+mn-cs"/>
+              </a:defRPr>
+            </a:lvl3pPr>
+            <a:lvl4pPr marL="1005840" indent="-182880" algn="r" defTabSz="914400" rtl="1" eaLnBrk="1" latinLnBrk="0" hangingPunct="1">
+              <a:lnSpc>
+                <a:spcPct val="150000"/>
+              </a:lnSpc>
+              <a:spcBef>
+                <a:spcPts val="200"/>
+              </a:spcBef>
+              <a:spcAft>
+                <a:spcPts val="400"/>
+              </a:spcAft>
+              <a:buClr>
+                <a:srgbClr val="777777"/>
+              </a:buClr>
+              <a:buSzPct val="80000"/>
+              <a:buFont typeface="Wingdings" panose="05000000000000000000" pitchFamily="2" charset="2"/>
+              <a:buChar char="§"/>
+              <a:defRPr sz="1600" kern="1200">
+                <a:solidFill>
+                  <a:srgbClr val="333333"/>
+                </a:solidFill>
+                <a:latin typeface="+mn-lt"/>
+                <a:ea typeface="+mn-ea"/>
+                <a:cs typeface="+mn-cs"/>
+              </a:defRPr>
+            </a:lvl4pPr>
+            <a:lvl5pPr marL="1280160" indent="-182880" algn="r" defTabSz="914400" rtl="1" eaLnBrk="1" latinLnBrk="0" hangingPunct="1">
+              <a:lnSpc>
+                <a:spcPct val="150000"/>
+              </a:lnSpc>
+              <a:spcBef>
+                <a:spcPts val="200"/>
+              </a:spcBef>
+              <a:spcAft>
+                <a:spcPts val="400"/>
+              </a:spcAft>
+              <a:buClr>
+                <a:srgbClr val="777777"/>
+              </a:buClr>
+              <a:buSzPct val="80000"/>
+              <a:buFont typeface="Wingdings" panose="05000000000000000000" pitchFamily="2" charset="2"/>
+              <a:buChar char="§"/>
+              <a:defRPr sz="1600" kern="1200">
+                <a:solidFill>
+                  <a:srgbClr val="333333"/>
+                </a:solidFill>
+                <a:latin typeface="+mn-lt"/>
+                <a:ea typeface="+mn-ea"/>
+                <a:cs typeface="+mn-cs"/>
+              </a:defRPr>
+            </a:lvl5pPr>
+            <a:lvl6pPr marL="1600000" indent="-228600" algn="l" defTabSz="914400" rtl="0" eaLnBrk="1" latinLnBrk="0" hangingPunct="1">
+              <a:lnSpc>
+                <a:spcPct val="90000"/>
+              </a:lnSpc>
+              <a:spcBef>
+                <a:spcPts val="200"/>
+              </a:spcBef>
+              <a:spcAft>
+                <a:spcPts val="400"/>
+              </a:spcAft>
+              <a:buClr>
+                <a:schemeClr val="accent1"/>
+              </a:buClr>
+              <a:buSzPct val="80000"/>
+              <a:buFont typeface="Corbel" pitchFamily="34" charset="0"/>
+              <a:buChar char="•"/>
+              <a:defRPr sz="1600" kern="1200">
+                <a:solidFill>
+                  <a:schemeClr val="accent1"/>
+                </a:solidFill>
+                <a:latin typeface="+mn-lt"/>
+                <a:ea typeface="+mn-ea"/>
+                <a:cs typeface="+mn-cs"/>
+              </a:defRPr>
+            </a:lvl6pPr>
+            <a:lvl7pPr marL="1900000" indent="-228600" algn="l" defTabSz="914400" rtl="0" eaLnBrk="1" latinLnBrk="0" hangingPunct="1">
+              <a:lnSpc>
+                <a:spcPct val="90000"/>
+              </a:lnSpc>
+              <a:spcBef>
+                <a:spcPts val="200"/>
+              </a:spcBef>
+              <a:spcAft>
+                <a:spcPts val="400"/>
+              </a:spcAft>
+              <a:buClr>
+                <a:schemeClr val="accent1"/>
+              </a:buClr>
+              <a:buSzPct val="80000"/>
+              <a:buFont typeface="Corbel" pitchFamily="34" charset="0"/>
+              <a:buChar char="•"/>
+              <a:defRPr sz="1600" kern="1200">
+                <a:solidFill>
+                  <a:schemeClr val="accent1"/>
+                </a:solidFill>
+                <a:latin typeface="+mn-lt"/>
+                <a:ea typeface="+mn-ea"/>
+                <a:cs typeface="+mn-cs"/>
+              </a:defRPr>
+            </a:lvl7pPr>
+            <a:lvl8pPr marL="2200000" indent="-228600" algn="l" defTabSz="914400" rtl="0" eaLnBrk="1" latinLnBrk="0" hangingPunct="1">
+              <a:lnSpc>
+                <a:spcPct val="90000"/>
+              </a:lnSpc>
+              <a:spcBef>
+                <a:spcPts val="200"/>
+              </a:spcBef>
+              <a:spcAft>
+                <a:spcPts val="400"/>
+              </a:spcAft>
+              <a:buClr>
+                <a:schemeClr val="accent1"/>
+              </a:buClr>
+              <a:buSzPct val="80000"/>
+              <a:buFont typeface="Corbel" pitchFamily="34" charset="0"/>
+              <a:buChar char="•"/>
+              <a:defRPr sz="1600" kern="1200">
+                <a:solidFill>
+                  <a:schemeClr val="accent1"/>
+                </a:solidFill>
+                <a:latin typeface="+mn-lt"/>
+                <a:ea typeface="+mn-ea"/>
+                <a:cs typeface="+mn-cs"/>
+              </a:defRPr>
+            </a:lvl8pPr>
+            <a:lvl9pPr marL="2500000" indent="-228600" algn="l" defTabSz="914400" rtl="0" eaLnBrk="1" latinLnBrk="0" hangingPunct="1">
+              <a:lnSpc>
+                <a:spcPct val="90000"/>
+              </a:lnSpc>
+              <a:spcBef>
+                <a:spcPts val="200"/>
+              </a:spcBef>
+              <a:spcAft>
+                <a:spcPts val="400"/>
+              </a:spcAft>
+              <a:buClr>
+                <a:schemeClr val="accent1"/>
+              </a:buClr>
+              <a:buSzPct val="80000"/>
+              <a:buFont typeface="Corbel" pitchFamily="34" charset="0"/>
+              <a:buChar char="•"/>
+              <a:defRPr sz="1600" kern="1200">
+                <a:solidFill>
+                  <a:schemeClr val="accent1"/>
+                </a:solidFill>
+                <a:latin typeface="+mn-lt"/>
+                <a:ea typeface="+mn-ea"/>
+                <a:cs typeface="+mn-cs"/>
+              </a:defRPr>
+            </a:lvl9pPr>
+          </a:lstStyle>
+          <a:p>
+            <a:pPr marL="45720" indent="0">
+              <a:buFont typeface="Wingdings" panose="05000000000000000000" pitchFamily="2" charset="2"/>
+              <a:buNone/>
+            </a:pPr>
+            <a:r>
+              <a:rPr lang="fa-IR" sz="2400" dirty="0">
+                <a:solidFill>
+                  <a:schemeClr val="accent3"/>
+                </a:solidFill>
+                <a:cs typeface="+mj-cs"/>
+              </a:rPr>
+              <a:t>توسعه</a:t>
+            </a:r>
+          </a:p>
+          <a:p>
+            <a:pPr marL="45720" indent="0">
+              <a:spcBef>
+                <a:spcPts val="0"/>
+              </a:spcBef>
+              <a:buNone/>
+            </a:pPr>
+            <a:r>
+              <a:rPr lang="fa-IR" sz="1600" dirty="0">
+                <a:solidFill>
+                  <a:srgbClr val="8F8F8F"/>
+                </a:solidFill>
+              </a:rPr>
+              <a:t>نسخه آفلاین</a:t>
+            </a:r>
+          </a:p>
+          <a:p>
+            <a:pPr marL="45720" indent="0">
+              <a:spcBef>
+                <a:spcPts val="0"/>
+              </a:spcBef>
+              <a:buNone/>
+            </a:pPr>
+            <a:r>
+              <a:rPr lang="fa-IR" sz="1600" dirty="0">
+                <a:solidFill>
+                  <a:srgbClr val="8F8F8F"/>
+                </a:solidFill>
+              </a:rPr>
+              <a:t>ارتقای سایت‌ساز</a:t>
+            </a:r>
+          </a:p>
+          <a:p>
+            <a:pPr marL="45720" indent="0">
+              <a:spcBef>
+                <a:spcPts val="0"/>
+              </a:spcBef>
+              <a:buNone/>
+            </a:pPr>
+            <a:r>
+              <a:rPr lang="fa-IR" sz="1600" dirty="0">
+                <a:solidFill>
+                  <a:srgbClr val="8F8F8F"/>
+                </a:solidFill>
+              </a:rPr>
+              <a:t>ورود فعال به بازارهای جهانی</a:t>
+            </a:r>
+          </a:p>
+          <a:p>
+            <a:pPr marL="45720" indent="0">
+              <a:spcBef>
+                <a:spcPts val="0"/>
+              </a:spcBef>
+              <a:buNone/>
+            </a:pPr>
+            <a:r>
+              <a:rPr lang="fa-IR" sz="1600" dirty="0">
+                <a:solidFill>
+                  <a:srgbClr val="8F8F8F"/>
+                </a:solidFill>
+              </a:rPr>
+              <a:t>گسترش مشتریان سازمانی</a:t>
+            </a:r>
+          </a:p>
+          <a:p>
+            <a:pPr marL="45720" indent="0">
+              <a:spcBef>
+                <a:spcPts val="0"/>
+              </a:spcBef>
+              <a:buNone/>
+            </a:pPr>
+            <a:r>
+              <a:rPr lang="fa-IR" sz="1600" dirty="0">
+                <a:solidFill>
+                  <a:srgbClr val="8F8F8F"/>
+                </a:solidFill>
+              </a:rPr>
+              <a:t>اپ آی‌اواس</a:t>
+            </a:r>
+            <a:endParaRPr lang="en-US" sz="1600" dirty="0">
+              <a:solidFill>
+                <a:srgbClr val="8F8F8F"/>
+              </a:solidFill>
+            </a:endParaRPr>
+          </a:p>
+        </p:txBody>
+      </p:sp>
+      <p:sp>
+        <p:nvSpPr>
+          <p:cNvPr id="8" name="Content Placeholder 2">
+            <a:extLst>
+              <a:ext uri="{FF2B5EF4-FFF2-40B4-BE49-F238E27FC236}">
+                <a16:creationId xmlns:a16="http://schemas.microsoft.com/office/drawing/2014/main" id="{0589A73B-6EA1-4BB4-A952-FE02B8F862A4}"/>
+              </a:ext>
+            </a:extLst>
+          </p:cNvPr>
+          <p:cNvSpPr txBox="1">
+            <a:spLocks/>
+          </p:cNvSpPr>
+          <p:nvPr/>
+        </p:nvSpPr>
+        <p:spPr>
+          <a:xfrm>
+            <a:off x="306697" y="1206500"/>
+            <a:ext cx="3223904" cy="2575479"/>
+          </a:xfrm>
+          <a:prstGeom prst="rect">
+            <a:avLst/>
+          </a:prstGeom>
+        </p:spPr>
+        <p:txBody>
+          <a:bodyPr vert="horz" lIns="91440" tIns="45720" rIns="91440" bIns="45720" rtlCol="0">
+            <a:normAutofit/>
+          </a:bodyPr>
+          <a:lstStyle>
+            <a:lvl1pPr marL="228600" indent="-182880" algn="r" defTabSz="914400" rtl="1" eaLnBrk="1" latinLnBrk="0" hangingPunct="1">
+              <a:lnSpc>
+                <a:spcPct val="150000"/>
+              </a:lnSpc>
+              <a:spcBef>
+                <a:spcPts val="1400"/>
+              </a:spcBef>
+              <a:buClr>
+                <a:srgbClr val="777777"/>
+              </a:buClr>
+              <a:buSzPct val="80000"/>
+              <a:buFont typeface="Wingdings" panose="05000000000000000000" pitchFamily="2" charset="2"/>
+              <a:buChar char="§"/>
+              <a:defRPr sz="2200" kern="1200">
+                <a:solidFill>
+                  <a:srgbClr val="333333"/>
+                </a:solidFill>
+                <a:latin typeface="+mn-lt"/>
+                <a:ea typeface="+mn-ea"/>
+                <a:cs typeface="+mn-cs"/>
+              </a:defRPr>
+            </a:lvl1pPr>
+            <a:lvl2pPr marL="457200" indent="-182880" algn="r" defTabSz="914400" rtl="1" eaLnBrk="1" latinLnBrk="0" hangingPunct="1">
+              <a:lnSpc>
+                <a:spcPct val="150000"/>
+              </a:lnSpc>
+              <a:spcBef>
+                <a:spcPts val="200"/>
+              </a:spcBef>
+              <a:spcAft>
+                <a:spcPts val="400"/>
+              </a:spcAft>
+              <a:buClr>
+                <a:srgbClr val="777777"/>
+              </a:buClr>
+              <a:buSzPct val="80000"/>
+              <a:buFont typeface="Wingdings" panose="05000000000000000000" pitchFamily="2" charset="2"/>
+              <a:buChar char="§"/>
+              <a:defRPr sz="2000" kern="1200">
+                <a:solidFill>
+                  <a:srgbClr val="333333"/>
+                </a:solidFill>
+                <a:latin typeface="+mn-lt"/>
+                <a:ea typeface="+mn-ea"/>
+                <a:cs typeface="+mn-cs"/>
+              </a:defRPr>
+            </a:lvl2pPr>
+            <a:lvl3pPr marL="731520" indent="-182880" algn="r" defTabSz="914400" rtl="1" eaLnBrk="1" latinLnBrk="0" hangingPunct="1">
+              <a:lnSpc>
+                <a:spcPct val="150000"/>
+              </a:lnSpc>
+              <a:spcBef>
+                <a:spcPts val="200"/>
+              </a:spcBef>
+              <a:spcAft>
+                <a:spcPts val="400"/>
+              </a:spcAft>
+              <a:buClr>
+                <a:srgbClr val="777777"/>
+              </a:buClr>
+              <a:buSzPct val="80000"/>
+              <a:buFont typeface="Wingdings" panose="05000000000000000000" pitchFamily="2" charset="2"/>
+              <a:buChar char="§"/>
+              <a:defRPr sz="1800" kern="1200">
+                <a:solidFill>
+                  <a:srgbClr val="333333"/>
+                </a:solidFill>
+                <a:latin typeface="+mn-lt"/>
+                <a:ea typeface="+mn-ea"/>
+                <a:cs typeface="+mn-cs"/>
+              </a:defRPr>
+            </a:lvl3pPr>
+            <a:lvl4pPr marL="1005840" indent="-182880" algn="r" defTabSz="914400" rtl="1" eaLnBrk="1" latinLnBrk="0" hangingPunct="1">
+              <a:lnSpc>
+                <a:spcPct val="150000"/>
+              </a:lnSpc>
+              <a:spcBef>
+                <a:spcPts val="200"/>
+              </a:spcBef>
+              <a:spcAft>
+                <a:spcPts val="400"/>
+              </a:spcAft>
+              <a:buClr>
+                <a:srgbClr val="777777"/>
+              </a:buClr>
+              <a:buSzPct val="80000"/>
+              <a:buFont typeface="Wingdings" panose="05000000000000000000" pitchFamily="2" charset="2"/>
+              <a:buChar char="§"/>
+              <a:defRPr sz="1600" kern="1200">
+                <a:solidFill>
+                  <a:srgbClr val="333333"/>
+                </a:solidFill>
+                <a:latin typeface="+mn-lt"/>
+                <a:ea typeface="+mn-ea"/>
+                <a:cs typeface="+mn-cs"/>
+              </a:defRPr>
+            </a:lvl4pPr>
+            <a:lvl5pPr marL="1280160" indent="-182880" algn="r" defTabSz="914400" rtl="1" eaLnBrk="1" latinLnBrk="0" hangingPunct="1">
+              <a:lnSpc>
+                <a:spcPct val="150000"/>
+              </a:lnSpc>
+              <a:spcBef>
+                <a:spcPts val="200"/>
+              </a:spcBef>
+              <a:spcAft>
+                <a:spcPts val="400"/>
+              </a:spcAft>
+              <a:buClr>
+                <a:srgbClr val="777777"/>
+              </a:buClr>
+              <a:buSzPct val="80000"/>
+              <a:buFont typeface="Wingdings" panose="05000000000000000000" pitchFamily="2" charset="2"/>
+              <a:buChar char="§"/>
+              <a:defRPr sz="1600" kern="1200">
+                <a:solidFill>
+                  <a:srgbClr val="333333"/>
+                </a:solidFill>
+                <a:latin typeface="+mn-lt"/>
+                <a:ea typeface="+mn-ea"/>
+                <a:cs typeface="+mn-cs"/>
+              </a:defRPr>
+            </a:lvl5pPr>
+            <a:lvl6pPr marL="1600000" indent="-228600" algn="l" defTabSz="914400" rtl="0" eaLnBrk="1" latinLnBrk="0" hangingPunct="1">
+              <a:lnSpc>
+                <a:spcPct val="90000"/>
+              </a:lnSpc>
+              <a:spcBef>
+                <a:spcPts val="200"/>
+              </a:spcBef>
+              <a:spcAft>
+                <a:spcPts val="400"/>
+              </a:spcAft>
+              <a:buClr>
+                <a:schemeClr val="accent1"/>
+              </a:buClr>
+              <a:buSzPct val="80000"/>
+              <a:buFont typeface="Corbel" pitchFamily="34" charset="0"/>
+              <a:buChar char="•"/>
+              <a:defRPr sz="1600" kern="1200">
+                <a:solidFill>
+                  <a:schemeClr val="accent1"/>
+                </a:solidFill>
+                <a:latin typeface="+mn-lt"/>
+                <a:ea typeface="+mn-ea"/>
+                <a:cs typeface="+mn-cs"/>
+              </a:defRPr>
+            </a:lvl6pPr>
+            <a:lvl7pPr marL="1900000" indent="-228600" algn="l" defTabSz="914400" rtl="0" eaLnBrk="1" latinLnBrk="0" hangingPunct="1">
+              <a:lnSpc>
+                <a:spcPct val="90000"/>
+              </a:lnSpc>
+              <a:spcBef>
+                <a:spcPts val="200"/>
+              </a:spcBef>
+              <a:spcAft>
+                <a:spcPts val="400"/>
+              </a:spcAft>
+              <a:buClr>
+                <a:schemeClr val="accent1"/>
+              </a:buClr>
+              <a:buSzPct val="80000"/>
+              <a:buFont typeface="Corbel" pitchFamily="34" charset="0"/>
+              <a:buChar char="•"/>
+              <a:defRPr sz="1600" kern="1200">
+                <a:solidFill>
+                  <a:schemeClr val="accent1"/>
+                </a:solidFill>
+                <a:latin typeface="+mn-lt"/>
+                <a:ea typeface="+mn-ea"/>
+                <a:cs typeface="+mn-cs"/>
+              </a:defRPr>
+            </a:lvl7pPr>
+            <a:lvl8pPr marL="2200000" indent="-228600" algn="l" defTabSz="914400" rtl="0" eaLnBrk="1" latinLnBrk="0" hangingPunct="1">
+              <a:lnSpc>
+                <a:spcPct val="90000"/>
+              </a:lnSpc>
+              <a:spcBef>
+                <a:spcPts val="200"/>
+              </a:spcBef>
+              <a:spcAft>
+                <a:spcPts val="400"/>
+              </a:spcAft>
+              <a:buClr>
+                <a:schemeClr val="accent1"/>
+              </a:buClr>
+              <a:buSzPct val="80000"/>
+              <a:buFont typeface="Corbel" pitchFamily="34" charset="0"/>
+              <a:buChar char="•"/>
+              <a:defRPr sz="1600" kern="1200">
+                <a:solidFill>
+                  <a:schemeClr val="accent1"/>
+                </a:solidFill>
+                <a:latin typeface="+mn-lt"/>
+                <a:ea typeface="+mn-ea"/>
+                <a:cs typeface="+mn-cs"/>
+              </a:defRPr>
+            </a:lvl8pPr>
+            <a:lvl9pPr marL="2500000" indent="-228600" algn="l" defTabSz="914400" rtl="0" eaLnBrk="1" latinLnBrk="0" hangingPunct="1">
+              <a:lnSpc>
+                <a:spcPct val="90000"/>
+              </a:lnSpc>
+              <a:spcBef>
+                <a:spcPts val="200"/>
+              </a:spcBef>
+              <a:spcAft>
+                <a:spcPts val="400"/>
+              </a:spcAft>
+              <a:buClr>
+                <a:schemeClr val="accent1"/>
+              </a:buClr>
+              <a:buSzPct val="80000"/>
+              <a:buFont typeface="Corbel" pitchFamily="34" charset="0"/>
+              <a:buChar char="•"/>
+              <a:defRPr sz="1600" kern="1200">
+                <a:solidFill>
+                  <a:schemeClr val="accent1"/>
+                </a:solidFill>
+                <a:latin typeface="+mn-lt"/>
+                <a:ea typeface="+mn-ea"/>
+                <a:cs typeface="+mn-cs"/>
+              </a:defRPr>
+            </a:lvl9pPr>
+          </a:lstStyle>
+          <a:p>
+            <a:pPr marL="45720" indent="0">
+              <a:buFont typeface="Wingdings" panose="05000000000000000000" pitchFamily="2" charset="2"/>
+              <a:buNone/>
+            </a:pPr>
+            <a:r>
+              <a:rPr lang="fa-IR" sz="2400" dirty="0">
+                <a:solidFill>
+                  <a:schemeClr val="accent3"/>
+                </a:solidFill>
+                <a:cs typeface="+mj-cs"/>
+              </a:rPr>
+              <a:t>آینده</a:t>
+            </a:r>
+          </a:p>
+          <a:p>
+            <a:pPr marL="45720" indent="0">
+              <a:spcBef>
+                <a:spcPts val="0"/>
+              </a:spcBef>
+              <a:buNone/>
+            </a:pPr>
+            <a:r>
+              <a:rPr lang="fa-IR" sz="1600" dirty="0">
+                <a:solidFill>
+                  <a:srgbClr val="8F8F8F"/>
+                </a:solidFill>
+              </a:rPr>
+              <a:t>بازارچه جیبرس</a:t>
+            </a:r>
+          </a:p>
+          <a:p>
+            <a:pPr marL="45720" indent="0">
+              <a:spcBef>
+                <a:spcPts val="0"/>
+              </a:spcBef>
+              <a:buNone/>
+            </a:pPr>
+            <a:r>
+              <a:rPr lang="fa-IR" sz="1600" dirty="0">
+                <a:solidFill>
+                  <a:srgbClr val="8F8F8F"/>
+                </a:solidFill>
+              </a:rPr>
+              <a:t>شبکه پرداخت داخلی</a:t>
+            </a:r>
+          </a:p>
+          <a:p>
+            <a:pPr marL="45720" indent="0">
+              <a:spcBef>
+                <a:spcPts val="0"/>
+              </a:spcBef>
+              <a:buNone/>
+            </a:pPr>
+            <a:r>
+              <a:rPr lang="fa-IR" sz="1600" dirty="0">
+                <a:solidFill>
+                  <a:srgbClr val="8F8F8F"/>
+                </a:solidFill>
+              </a:rPr>
+              <a:t>افزایش کانال‌های فروش</a:t>
+            </a:r>
+          </a:p>
+          <a:p>
+            <a:pPr marL="45720" indent="0">
+              <a:spcBef>
+                <a:spcPts val="0"/>
+              </a:spcBef>
+              <a:buNone/>
+            </a:pPr>
+            <a:r>
+              <a:rPr lang="fa-IR" sz="1600" dirty="0">
+                <a:solidFill>
+                  <a:srgbClr val="8F8F8F"/>
+                </a:solidFill>
+              </a:rPr>
+              <a:t>بازارچه‌ساز</a:t>
+            </a:r>
+            <a:endParaRPr lang="en-US" sz="1600" dirty="0">
+              <a:solidFill>
+                <a:srgbClr val="8F8F8F"/>
+              </a:solidFill>
+            </a:endParaRPr>
+          </a:p>
+        </p:txBody>
+      </p:sp>
+      <p:sp>
+        <p:nvSpPr>
+          <p:cNvPr id="9" name="Content Placeholder 2">
+            <a:extLst>
+              <a:ext uri="{FF2B5EF4-FFF2-40B4-BE49-F238E27FC236}">
+                <a16:creationId xmlns:a16="http://schemas.microsoft.com/office/drawing/2014/main" id="{CC8C04BB-2DCB-45EE-BF8A-84629B7B828A}"/>
+              </a:ext>
+            </a:extLst>
+          </p:cNvPr>
+          <p:cNvSpPr txBox="1">
+            <a:spLocks/>
+          </p:cNvSpPr>
+          <p:nvPr/>
+        </p:nvSpPr>
+        <p:spPr>
+          <a:xfrm>
+            <a:off x="8953500" y="5884642"/>
+            <a:ext cx="2318380" cy="566958"/>
+          </a:xfrm>
+          <a:prstGeom prst="rect">
+            <a:avLst/>
+          </a:prstGeom>
+        </p:spPr>
+        <p:txBody>
+          <a:bodyPr vert="horz" lIns="91440" tIns="45720" rIns="91440" bIns="45720" rtlCol="0">
+            <a:normAutofit/>
+          </a:bodyPr>
+          <a:lstStyle>
+            <a:lvl1pPr marL="228600" indent="-182880" algn="r" defTabSz="914400" rtl="1" eaLnBrk="1" latinLnBrk="0" hangingPunct="1">
+              <a:lnSpc>
+                <a:spcPct val="150000"/>
+              </a:lnSpc>
+              <a:spcBef>
+                <a:spcPts val="1400"/>
+              </a:spcBef>
+              <a:buClr>
+                <a:srgbClr val="777777"/>
+              </a:buClr>
+              <a:buSzPct val="80000"/>
+              <a:buFont typeface="Wingdings" panose="05000000000000000000" pitchFamily="2" charset="2"/>
+              <a:buChar char="§"/>
+              <a:defRPr sz="2200" kern="1200">
+                <a:solidFill>
+                  <a:srgbClr val="333333"/>
+                </a:solidFill>
+                <a:latin typeface="+mn-lt"/>
+                <a:ea typeface="+mn-ea"/>
+                <a:cs typeface="+mn-cs"/>
+              </a:defRPr>
+            </a:lvl1pPr>
+            <a:lvl2pPr marL="457200" indent="-182880" algn="r" defTabSz="914400" rtl="1" eaLnBrk="1" latinLnBrk="0" hangingPunct="1">
+              <a:lnSpc>
+                <a:spcPct val="150000"/>
+              </a:lnSpc>
+              <a:spcBef>
+                <a:spcPts val="200"/>
+              </a:spcBef>
+              <a:spcAft>
+                <a:spcPts val="400"/>
+              </a:spcAft>
+              <a:buClr>
+                <a:srgbClr val="777777"/>
+              </a:buClr>
+              <a:buSzPct val="80000"/>
+              <a:buFont typeface="Wingdings" panose="05000000000000000000" pitchFamily="2" charset="2"/>
+              <a:buChar char="§"/>
+              <a:defRPr sz="2000" kern="1200">
+                <a:solidFill>
+                  <a:srgbClr val="333333"/>
+                </a:solidFill>
+                <a:latin typeface="+mn-lt"/>
+                <a:ea typeface="+mn-ea"/>
+                <a:cs typeface="+mn-cs"/>
+              </a:defRPr>
+            </a:lvl2pPr>
+            <a:lvl3pPr marL="731520" indent="-182880" algn="r" defTabSz="914400" rtl="1" eaLnBrk="1" latinLnBrk="0" hangingPunct="1">
+              <a:lnSpc>
+                <a:spcPct val="150000"/>
+              </a:lnSpc>
+              <a:spcBef>
+                <a:spcPts val="200"/>
+              </a:spcBef>
+              <a:spcAft>
+                <a:spcPts val="400"/>
+              </a:spcAft>
+              <a:buClr>
+                <a:srgbClr val="777777"/>
+              </a:buClr>
+              <a:buSzPct val="80000"/>
+              <a:buFont typeface="Wingdings" panose="05000000000000000000" pitchFamily="2" charset="2"/>
+              <a:buChar char="§"/>
+              <a:defRPr sz="1800" kern="1200">
+                <a:solidFill>
+                  <a:srgbClr val="333333"/>
+                </a:solidFill>
+                <a:latin typeface="+mn-lt"/>
+                <a:ea typeface="+mn-ea"/>
+                <a:cs typeface="+mn-cs"/>
+              </a:defRPr>
+            </a:lvl3pPr>
+            <a:lvl4pPr marL="1005840" indent="-182880" algn="r" defTabSz="914400" rtl="1" eaLnBrk="1" latinLnBrk="0" hangingPunct="1">
+              <a:lnSpc>
+                <a:spcPct val="150000"/>
+              </a:lnSpc>
+              <a:spcBef>
+                <a:spcPts val="200"/>
+              </a:spcBef>
+              <a:spcAft>
+                <a:spcPts val="400"/>
+              </a:spcAft>
+              <a:buClr>
+                <a:srgbClr val="777777"/>
+              </a:buClr>
+              <a:buSzPct val="80000"/>
+              <a:buFont typeface="Wingdings" panose="05000000000000000000" pitchFamily="2" charset="2"/>
+              <a:buChar char="§"/>
+              <a:defRPr sz="1600" kern="1200">
+                <a:solidFill>
+                  <a:srgbClr val="333333"/>
+                </a:solidFill>
+                <a:latin typeface="+mn-lt"/>
+                <a:ea typeface="+mn-ea"/>
+                <a:cs typeface="+mn-cs"/>
+              </a:defRPr>
+            </a:lvl4pPr>
+            <a:lvl5pPr marL="1280160" indent="-182880" algn="r" defTabSz="914400" rtl="1" eaLnBrk="1" latinLnBrk="0" hangingPunct="1">
+              <a:lnSpc>
+                <a:spcPct val="150000"/>
+              </a:lnSpc>
+              <a:spcBef>
+                <a:spcPts val="200"/>
+              </a:spcBef>
+              <a:spcAft>
+                <a:spcPts val="400"/>
+              </a:spcAft>
+              <a:buClr>
+                <a:srgbClr val="777777"/>
+              </a:buClr>
+              <a:buSzPct val="80000"/>
+              <a:buFont typeface="Wingdings" panose="05000000000000000000" pitchFamily="2" charset="2"/>
+              <a:buChar char="§"/>
+              <a:defRPr sz="1600" kern="1200">
+                <a:solidFill>
+                  <a:srgbClr val="333333"/>
+                </a:solidFill>
+                <a:latin typeface="+mn-lt"/>
+                <a:ea typeface="+mn-ea"/>
+                <a:cs typeface="+mn-cs"/>
+              </a:defRPr>
+            </a:lvl5pPr>
+            <a:lvl6pPr marL="1600000" indent="-228600" algn="l" defTabSz="914400" rtl="0" eaLnBrk="1" latinLnBrk="0" hangingPunct="1">
+              <a:lnSpc>
+                <a:spcPct val="90000"/>
+              </a:lnSpc>
+              <a:spcBef>
+                <a:spcPts val="200"/>
+              </a:spcBef>
+              <a:spcAft>
+                <a:spcPts val="400"/>
+              </a:spcAft>
+              <a:buClr>
+                <a:schemeClr val="accent1"/>
+              </a:buClr>
+              <a:buSzPct val="80000"/>
+              <a:buFont typeface="Corbel" pitchFamily="34" charset="0"/>
+              <a:buChar char="•"/>
+              <a:defRPr sz="1600" kern="1200">
+                <a:solidFill>
+                  <a:schemeClr val="accent1"/>
+                </a:solidFill>
+                <a:latin typeface="+mn-lt"/>
+                <a:ea typeface="+mn-ea"/>
+                <a:cs typeface="+mn-cs"/>
+              </a:defRPr>
+            </a:lvl6pPr>
+            <a:lvl7pPr marL="1900000" indent="-228600" algn="l" defTabSz="914400" rtl="0" eaLnBrk="1" latinLnBrk="0" hangingPunct="1">
+              <a:lnSpc>
+                <a:spcPct val="90000"/>
+              </a:lnSpc>
+              <a:spcBef>
+                <a:spcPts val="200"/>
+              </a:spcBef>
+              <a:spcAft>
+                <a:spcPts val="400"/>
+              </a:spcAft>
+              <a:buClr>
+                <a:schemeClr val="accent1"/>
+              </a:buClr>
+              <a:buSzPct val="80000"/>
+              <a:buFont typeface="Corbel" pitchFamily="34" charset="0"/>
+              <a:buChar char="•"/>
+              <a:defRPr sz="1600" kern="1200">
+                <a:solidFill>
+                  <a:schemeClr val="accent1"/>
+                </a:solidFill>
+                <a:latin typeface="+mn-lt"/>
+                <a:ea typeface="+mn-ea"/>
+                <a:cs typeface="+mn-cs"/>
+              </a:defRPr>
+            </a:lvl7pPr>
+            <a:lvl8pPr marL="2200000" indent="-228600" algn="l" defTabSz="914400" rtl="0" eaLnBrk="1" latinLnBrk="0" hangingPunct="1">
+              <a:lnSpc>
+                <a:spcPct val="90000"/>
+              </a:lnSpc>
+              <a:spcBef>
+                <a:spcPts val="200"/>
+              </a:spcBef>
+              <a:spcAft>
+                <a:spcPts val="400"/>
+              </a:spcAft>
+              <a:buClr>
+                <a:schemeClr val="accent1"/>
+              </a:buClr>
+              <a:buSzPct val="80000"/>
+              <a:buFont typeface="Corbel" pitchFamily="34" charset="0"/>
+              <a:buChar char="•"/>
+              <a:defRPr sz="1600" kern="1200">
+                <a:solidFill>
+                  <a:schemeClr val="accent1"/>
+                </a:solidFill>
+                <a:latin typeface="+mn-lt"/>
+                <a:ea typeface="+mn-ea"/>
+                <a:cs typeface="+mn-cs"/>
+              </a:defRPr>
+            </a:lvl8pPr>
+            <a:lvl9pPr marL="2500000" indent="-228600" algn="l" defTabSz="914400" rtl="0" eaLnBrk="1" latinLnBrk="0" hangingPunct="1">
+              <a:lnSpc>
+                <a:spcPct val="90000"/>
+              </a:lnSpc>
+              <a:spcBef>
+                <a:spcPts val="200"/>
+              </a:spcBef>
+              <a:spcAft>
+                <a:spcPts val="400"/>
+              </a:spcAft>
+              <a:buClr>
+                <a:schemeClr val="accent1"/>
+              </a:buClr>
+              <a:buSzPct val="80000"/>
+              <a:buFont typeface="Corbel" pitchFamily="34" charset="0"/>
+              <a:buChar char="•"/>
+              <a:defRPr sz="1600" kern="1200">
+                <a:solidFill>
+                  <a:schemeClr val="accent1"/>
+                </a:solidFill>
+                <a:latin typeface="+mn-lt"/>
+                <a:ea typeface="+mn-ea"/>
+                <a:cs typeface="+mn-cs"/>
+              </a:defRPr>
+            </a:lvl9pPr>
+          </a:lstStyle>
+          <a:p>
+            <a:pPr marL="45720" indent="0">
+              <a:buFont typeface="Wingdings" panose="05000000000000000000" pitchFamily="2" charset="2"/>
+              <a:buNone/>
+            </a:pPr>
+            <a:r>
+              <a:rPr lang="fa-IR" sz="1600" dirty="0">
+                <a:solidFill>
+                  <a:schemeClr val="tx1"/>
+                </a:solidFill>
+                <a:cs typeface="+mj-cs"/>
+              </a:rPr>
+              <a:t>اهداف کوتاه‌مدت</a:t>
+            </a:r>
+          </a:p>
+          <a:p>
+            <a:pPr marL="45720" indent="0">
+              <a:buFont typeface="Wingdings" panose="05000000000000000000" pitchFamily="2" charset="2"/>
+              <a:buNone/>
+            </a:pPr>
+            <a:endParaRPr lang="en-US" sz="1800" dirty="0">
+              <a:solidFill>
+                <a:schemeClr val="tx1"/>
+              </a:solidFill>
+            </a:endParaRPr>
+          </a:p>
+        </p:txBody>
+      </p:sp>
+      <p:sp>
+        <p:nvSpPr>
+          <p:cNvPr id="10" name="Content Placeholder 2">
+            <a:extLst>
+              <a:ext uri="{FF2B5EF4-FFF2-40B4-BE49-F238E27FC236}">
+                <a16:creationId xmlns:a16="http://schemas.microsoft.com/office/drawing/2014/main" id="{0D890AA6-BC59-4CA8-85B5-099E71C3711D}"/>
+              </a:ext>
+            </a:extLst>
+          </p:cNvPr>
+          <p:cNvSpPr txBox="1">
+            <a:spLocks/>
+          </p:cNvSpPr>
+          <p:nvPr/>
+        </p:nvSpPr>
+        <p:spPr>
+          <a:xfrm>
+            <a:off x="4855208" y="4946261"/>
+            <a:ext cx="2318380" cy="566958"/>
+          </a:xfrm>
+          <a:prstGeom prst="rect">
+            <a:avLst/>
+          </a:prstGeom>
+        </p:spPr>
+        <p:txBody>
+          <a:bodyPr vert="horz" lIns="91440" tIns="45720" rIns="91440" bIns="45720" rtlCol="0">
+            <a:normAutofit/>
+          </a:bodyPr>
+          <a:lstStyle>
+            <a:lvl1pPr marL="228600" indent="-182880" algn="r" defTabSz="914400" rtl="1" eaLnBrk="1" latinLnBrk="0" hangingPunct="1">
+              <a:lnSpc>
+                <a:spcPct val="150000"/>
+              </a:lnSpc>
+              <a:spcBef>
+                <a:spcPts val="1400"/>
+              </a:spcBef>
+              <a:buClr>
+                <a:srgbClr val="777777"/>
+              </a:buClr>
+              <a:buSzPct val="80000"/>
+              <a:buFont typeface="Wingdings" panose="05000000000000000000" pitchFamily="2" charset="2"/>
+              <a:buChar char="§"/>
+              <a:defRPr sz="2200" kern="1200">
+                <a:solidFill>
+                  <a:srgbClr val="333333"/>
+                </a:solidFill>
+                <a:latin typeface="+mn-lt"/>
+                <a:ea typeface="+mn-ea"/>
+                <a:cs typeface="+mn-cs"/>
+              </a:defRPr>
+            </a:lvl1pPr>
+            <a:lvl2pPr marL="457200" indent="-182880" algn="r" defTabSz="914400" rtl="1" eaLnBrk="1" latinLnBrk="0" hangingPunct="1">
+              <a:lnSpc>
+                <a:spcPct val="150000"/>
+              </a:lnSpc>
+              <a:spcBef>
+                <a:spcPts val="200"/>
+              </a:spcBef>
+              <a:spcAft>
+                <a:spcPts val="400"/>
+              </a:spcAft>
+              <a:buClr>
+                <a:srgbClr val="777777"/>
+              </a:buClr>
+              <a:buSzPct val="80000"/>
+              <a:buFont typeface="Wingdings" panose="05000000000000000000" pitchFamily="2" charset="2"/>
+              <a:buChar char="§"/>
+              <a:defRPr sz="2000" kern="1200">
+                <a:solidFill>
+                  <a:srgbClr val="333333"/>
+                </a:solidFill>
+                <a:latin typeface="+mn-lt"/>
+                <a:ea typeface="+mn-ea"/>
+                <a:cs typeface="+mn-cs"/>
+              </a:defRPr>
+            </a:lvl2pPr>
+            <a:lvl3pPr marL="731520" indent="-182880" algn="r" defTabSz="914400" rtl="1" eaLnBrk="1" latinLnBrk="0" hangingPunct="1">
+              <a:lnSpc>
+                <a:spcPct val="150000"/>
+              </a:lnSpc>
+              <a:spcBef>
+                <a:spcPts val="200"/>
+              </a:spcBef>
+              <a:spcAft>
+                <a:spcPts val="400"/>
+              </a:spcAft>
+              <a:buClr>
+                <a:srgbClr val="777777"/>
+              </a:buClr>
+              <a:buSzPct val="80000"/>
+              <a:buFont typeface="Wingdings" panose="05000000000000000000" pitchFamily="2" charset="2"/>
+              <a:buChar char="§"/>
+              <a:defRPr sz="1800" kern="1200">
+                <a:solidFill>
+                  <a:srgbClr val="333333"/>
+                </a:solidFill>
+                <a:latin typeface="+mn-lt"/>
+                <a:ea typeface="+mn-ea"/>
+                <a:cs typeface="+mn-cs"/>
+              </a:defRPr>
+            </a:lvl3pPr>
+            <a:lvl4pPr marL="1005840" indent="-182880" algn="r" defTabSz="914400" rtl="1" eaLnBrk="1" latinLnBrk="0" hangingPunct="1">
+              <a:lnSpc>
+                <a:spcPct val="150000"/>
+              </a:lnSpc>
+              <a:spcBef>
+                <a:spcPts val="200"/>
+              </a:spcBef>
+              <a:spcAft>
+                <a:spcPts val="400"/>
+              </a:spcAft>
+              <a:buClr>
+                <a:srgbClr val="777777"/>
+              </a:buClr>
+              <a:buSzPct val="80000"/>
+              <a:buFont typeface="Wingdings" panose="05000000000000000000" pitchFamily="2" charset="2"/>
+              <a:buChar char="§"/>
+              <a:defRPr sz="1600" kern="1200">
+                <a:solidFill>
+                  <a:srgbClr val="333333"/>
+                </a:solidFill>
+                <a:latin typeface="+mn-lt"/>
+                <a:ea typeface="+mn-ea"/>
+                <a:cs typeface="+mn-cs"/>
+              </a:defRPr>
+            </a:lvl4pPr>
+            <a:lvl5pPr marL="1280160" indent="-182880" algn="r" defTabSz="914400" rtl="1" eaLnBrk="1" latinLnBrk="0" hangingPunct="1">
+              <a:lnSpc>
+                <a:spcPct val="150000"/>
+              </a:lnSpc>
+              <a:spcBef>
+                <a:spcPts val="200"/>
+              </a:spcBef>
+              <a:spcAft>
+                <a:spcPts val="400"/>
+              </a:spcAft>
+              <a:buClr>
+                <a:srgbClr val="777777"/>
+              </a:buClr>
+              <a:buSzPct val="80000"/>
+              <a:buFont typeface="Wingdings" panose="05000000000000000000" pitchFamily="2" charset="2"/>
+              <a:buChar char="§"/>
+              <a:defRPr sz="1600" kern="1200">
+                <a:solidFill>
+                  <a:srgbClr val="333333"/>
+                </a:solidFill>
+                <a:latin typeface="+mn-lt"/>
+                <a:ea typeface="+mn-ea"/>
+                <a:cs typeface="+mn-cs"/>
+              </a:defRPr>
+            </a:lvl5pPr>
+            <a:lvl6pPr marL="1600000" indent="-228600" algn="l" defTabSz="914400" rtl="0" eaLnBrk="1" latinLnBrk="0" hangingPunct="1">
+              <a:lnSpc>
+                <a:spcPct val="90000"/>
+              </a:lnSpc>
+              <a:spcBef>
+                <a:spcPts val="200"/>
+              </a:spcBef>
+              <a:spcAft>
+                <a:spcPts val="400"/>
+              </a:spcAft>
+              <a:buClr>
+                <a:schemeClr val="accent1"/>
+              </a:buClr>
+              <a:buSzPct val="80000"/>
+              <a:buFont typeface="Corbel" pitchFamily="34" charset="0"/>
+              <a:buChar char="•"/>
+              <a:defRPr sz="1600" kern="1200">
+                <a:solidFill>
+                  <a:schemeClr val="accent1"/>
+                </a:solidFill>
+                <a:latin typeface="+mn-lt"/>
+                <a:ea typeface="+mn-ea"/>
+                <a:cs typeface="+mn-cs"/>
+              </a:defRPr>
+            </a:lvl6pPr>
+            <a:lvl7pPr marL="1900000" indent="-228600" algn="l" defTabSz="914400" rtl="0" eaLnBrk="1" latinLnBrk="0" hangingPunct="1">
+              <a:lnSpc>
+                <a:spcPct val="90000"/>
+              </a:lnSpc>
+              <a:spcBef>
+                <a:spcPts val="200"/>
+              </a:spcBef>
+              <a:spcAft>
+                <a:spcPts val="400"/>
+              </a:spcAft>
+              <a:buClr>
+                <a:schemeClr val="accent1"/>
+              </a:buClr>
+              <a:buSzPct val="80000"/>
+              <a:buFont typeface="Corbel" pitchFamily="34" charset="0"/>
+              <a:buChar char="•"/>
+              <a:defRPr sz="1600" kern="1200">
+                <a:solidFill>
+                  <a:schemeClr val="accent1"/>
+                </a:solidFill>
+                <a:latin typeface="+mn-lt"/>
+                <a:ea typeface="+mn-ea"/>
+                <a:cs typeface="+mn-cs"/>
+              </a:defRPr>
+            </a:lvl7pPr>
+            <a:lvl8pPr marL="2200000" indent="-228600" algn="l" defTabSz="914400" rtl="0" eaLnBrk="1" latinLnBrk="0" hangingPunct="1">
+              <a:lnSpc>
+                <a:spcPct val="90000"/>
+              </a:lnSpc>
+              <a:spcBef>
+                <a:spcPts val="200"/>
+              </a:spcBef>
+              <a:spcAft>
+                <a:spcPts val="400"/>
+              </a:spcAft>
+              <a:buClr>
+                <a:schemeClr val="accent1"/>
+              </a:buClr>
+              <a:buSzPct val="80000"/>
+              <a:buFont typeface="Corbel" pitchFamily="34" charset="0"/>
+              <a:buChar char="•"/>
+              <a:defRPr sz="1600" kern="1200">
+                <a:solidFill>
+                  <a:schemeClr val="accent1"/>
+                </a:solidFill>
+                <a:latin typeface="+mn-lt"/>
+                <a:ea typeface="+mn-ea"/>
+                <a:cs typeface="+mn-cs"/>
+              </a:defRPr>
+            </a:lvl8pPr>
+            <a:lvl9pPr marL="2500000" indent="-228600" algn="l" defTabSz="914400" rtl="0" eaLnBrk="1" latinLnBrk="0" hangingPunct="1">
+              <a:lnSpc>
+                <a:spcPct val="90000"/>
+              </a:lnSpc>
+              <a:spcBef>
+                <a:spcPts val="200"/>
+              </a:spcBef>
+              <a:spcAft>
+                <a:spcPts val="400"/>
+              </a:spcAft>
+              <a:buClr>
+                <a:schemeClr val="accent1"/>
+              </a:buClr>
+              <a:buSzPct val="80000"/>
+              <a:buFont typeface="Corbel" pitchFamily="34" charset="0"/>
+              <a:buChar char="•"/>
+              <a:defRPr sz="1600" kern="1200">
+                <a:solidFill>
+                  <a:schemeClr val="accent1"/>
+                </a:solidFill>
+                <a:latin typeface="+mn-lt"/>
+                <a:ea typeface="+mn-ea"/>
+                <a:cs typeface="+mn-cs"/>
+              </a:defRPr>
+            </a:lvl9pPr>
+          </a:lstStyle>
+          <a:p>
+            <a:pPr marL="45720" indent="0">
+              <a:buFont typeface="Wingdings" panose="05000000000000000000" pitchFamily="2" charset="2"/>
+              <a:buNone/>
+            </a:pPr>
+            <a:r>
+              <a:rPr lang="fa-IR" sz="1600" dirty="0">
+                <a:solidFill>
+                  <a:schemeClr val="tx1"/>
+                </a:solidFill>
+                <a:cs typeface="+mj-cs"/>
+              </a:rPr>
+              <a:t>اهداف میان‌مدت</a:t>
+            </a:r>
+          </a:p>
+          <a:p>
+            <a:pPr marL="45720" indent="0">
+              <a:buFont typeface="Wingdings" panose="05000000000000000000" pitchFamily="2" charset="2"/>
+              <a:buNone/>
+            </a:pPr>
+            <a:endParaRPr lang="en-US" sz="1800" dirty="0">
+              <a:solidFill>
+                <a:schemeClr val="tx1"/>
+              </a:solidFill>
+            </a:endParaRPr>
+          </a:p>
+        </p:txBody>
+      </p:sp>
+      <p:sp>
+        <p:nvSpPr>
+          <p:cNvPr id="11" name="Content Placeholder 2">
+            <a:extLst>
+              <a:ext uri="{FF2B5EF4-FFF2-40B4-BE49-F238E27FC236}">
+                <a16:creationId xmlns:a16="http://schemas.microsoft.com/office/drawing/2014/main" id="{B5157B76-134C-4C7B-9D85-E7D94AC69A1D}"/>
+              </a:ext>
+            </a:extLst>
+          </p:cNvPr>
+          <p:cNvSpPr txBox="1">
+            <a:spLocks/>
+          </p:cNvSpPr>
+          <p:nvPr/>
+        </p:nvSpPr>
+        <p:spPr>
+          <a:xfrm>
+            <a:off x="1057904" y="4292248"/>
+            <a:ext cx="2318380" cy="566958"/>
+          </a:xfrm>
+          <a:prstGeom prst="rect">
+            <a:avLst/>
+          </a:prstGeom>
+        </p:spPr>
+        <p:txBody>
+          <a:bodyPr vert="horz" lIns="91440" tIns="45720" rIns="91440" bIns="45720" rtlCol="0">
+            <a:normAutofit/>
+          </a:bodyPr>
+          <a:lstStyle>
+            <a:lvl1pPr marL="228600" indent="-182880" algn="r" defTabSz="914400" rtl="1" eaLnBrk="1" latinLnBrk="0" hangingPunct="1">
+              <a:lnSpc>
+                <a:spcPct val="150000"/>
+              </a:lnSpc>
+              <a:spcBef>
+                <a:spcPts val="1400"/>
+              </a:spcBef>
+              <a:buClr>
+                <a:srgbClr val="777777"/>
+              </a:buClr>
+              <a:buSzPct val="80000"/>
+              <a:buFont typeface="Wingdings" panose="05000000000000000000" pitchFamily="2" charset="2"/>
+              <a:buChar char="§"/>
+              <a:defRPr sz="2200" kern="1200">
+                <a:solidFill>
+                  <a:srgbClr val="333333"/>
+                </a:solidFill>
+                <a:latin typeface="+mn-lt"/>
+                <a:ea typeface="+mn-ea"/>
+                <a:cs typeface="+mn-cs"/>
+              </a:defRPr>
+            </a:lvl1pPr>
+            <a:lvl2pPr marL="457200" indent="-182880" algn="r" defTabSz="914400" rtl="1" eaLnBrk="1" latinLnBrk="0" hangingPunct="1">
+              <a:lnSpc>
+                <a:spcPct val="150000"/>
+              </a:lnSpc>
+              <a:spcBef>
+                <a:spcPts val="200"/>
+              </a:spcBef>
+              <a:spcAft>
+                <a:spcPts val="400"/>
+              </a:spcAft>
+              <a:buClr>
+                <a:srgbClr val="777777"/>
+              </a:buClr>
+              <a:buSzPct val="80000"/>
+              <a:buFont typeface="Wingdings" panose="05000000000000000000" pitchFamily="2" charset="2"/>
+              <a:buChar char="§"/>
+              <a:defRPr sz="2000" kern="1200">
+                <a:solidFill>
+                  <a:srgbClr val="333333"/>
+                </a:solidFill>
+                <a:latin typeface="+mn-lt"/>
+                <a:ea typeface="+mn-ea"/>
+                <a:cs typeface="+mn-cs"/>
+              </a:defRPr>
+            </a:lvl2pPr>
+            <a:lvl3pPr marL="731520" indent="-182880" algn="r" defTabSz="914400" rtl="1" eaLnBrk="1" latinLnBrk="0" hangingPunct="1">
+              <a:lnSpc>
+                <a:spcPct val="150000"/>
+              </a:lnSpc>
+              <a:spcBef>
+                <a:spcPts val="200"/>
+              </a:spcBef>
+              <a:spcAft>
+                <a:spcPts val="400"/>
+              </a:spcAft>
+              <a:buClr>
+                <a:srgbClr val="777777"/>
+              </a:buClr>
+              <a:buSzPct val="80000"/>
+              <a:buFont typeface="Wingdings" panose="05000000000000000000" pitchFamily="2" charset="2"/>
+              <a:buChar char="§"/>
+              <a:defRPr sz="1800" kern="1200">
+                <a:solidFill>
+                  <a:srgbClr val="333333"/>
+                </a:solidFill>
+                <a:latin typeface="+mn-lt"/>
+                <a:ea typeface="+mn-ea"/>
+                <a:cs typeface="+mn-cs"/>
+              </a:defRPr>
+            </a:lvl3pPr>
+            <a:lvl4pPr marL="1005840" indent="-182880" algn="r" defTabSz="914400" rtl="1" eaLnBrk="1" latinLnBrk="0" hangingPunct="1">
+              <a:lnSpc>
+                <a:spcPct val="150000"/>
+              </a:lnSpc>
+              <a:spcBef>
+                <a:spcPts val="200"/>
+              </a:spcBef>
+              <a:spcAft>
+                <a:spcPts val="400"/>
+              </a:spcAft>
+              <a:buClr>
+                <a:srgbClr val="777777"/>
+              </a:buClr>
+              <a:buSzPct val="80000"/>
+              <a:buFont typeface="Wingdings" panose="05000000000000000000" pitchFamily="2" charset="2"/>
+              <a:buChar char="§"/>
+              <a:defRPr sz="1600" kern="1200">
+                <a:solidFill>
+                  <a:srgbClr val="333333"/>
+                </a:solidFill>
+                <a:latin typeface="+mn-lt"/>
+                <a:ea typeface="+mn-ea"/>
+                <a:cs typeface="+mn-cs"/>
+              </a:defRPr>
+            </a:lvl4pPr>
+            <a:lvl5pPr marL="1280160" indent="-182880" algn="r" defTabSz="914400" rtl="1" eaLnBrk="1" latinLnBrk="0" hangingPunct="1">
+              <a:lnSpc>
+                <a:spcPct val="150000"/>
+              </a:lnSpc>
+              <a:spcBef>
+                <a:spcPts val="200"/>
+              </a:spcBef>
+              <a:spcAft>
+                <a:spcPts val="400"/>
+              </a:spcAft>
+              <a:buClr>
+                <a:srgbClr val="777777"/>
+              </a:buClr>
+              <a:buSzPct val="80000"/>
+              <a:buFont typeface="Wingdings" panose="05000000000000000000" pitchFamily="2" charset="2"/>
+              <a:buChar char="§"/>
+              <a:defRPr sz="1600" kern="1200">
+                <a:solidFill>
+                  <a:srgbClr val="333333"/>
+                </a:solidFill>
+                <a:latin typeface="+mn-lt"/>
+                <a:ea typeface="+mn-ea"/>
+                <a:cs typeface="+mn-cs"/>
+              </a:defRPr>
+            </a:lvl5pPr>
+            <a:lvl6pPr marL="1600000" indent="-228600" algn="l" defTabSz="914400" rtl="0" eaLnBrk="1" latinLnBrk="0" hangingPunct="1">
+              <a:lnSpc>
+                <a:spcPct val="90000"/>
+              </a:lnSpc>
+              <a:spcBef>
+                <a:spcPts val="200"/>
+              </a:spcBef>
+              <a:spcAft>
+                <a:spcPts val="400"/>
+              </a:spcAft>
+              <a:buClr>
+                <a:schemeClr val="accent1"/>
+              </a:buClr>
+              <a:buSzPct val="80000"/>
+              <a:buFont typeface="Corbel" pitchFamily="34" charset="0"/>
+              <a:buChar char="•"/>
+              <a:defRPr sz="1600" kern="1200">
+                <a:solidFill>
+                  <a:schemeClr val="accent1"/>
+                </a:solidFill>
+                <a:latin typeface="+mn-lt"/>
+                <a:ea typeface="+mn-ea"/>
+                <a:cs typeface="+mn-cs"/>
+              </a:defRPr>
+            </a:lvl6pPr>
+            <a:lvl7pPr marL="1900000" indent="-228600" algn="l" defTabSz="914400" rtl="0" eaLnBrk="1" latinLnBrk="0" hangingPunct="1">
+              <a:lnSpc>
+                <a:spcPct val="90000"/>
+              </a:lnSpc>
+              <a:spcBef>
+                <a:spcPts val="200"/>
+              </a:spcBef>
+              <a:spcAft>
+                <a:spcPts val="400"/>
+              </a:spcAft>
+              <a:buClr>
+                <a:schemeClr val="accent1"/>
+              </a:buClr>
+              <a:buSzPct val="80000"/>
+              <a:buFont typeface="Corbel" pitchFamily="34" charset="0"/>
+              <a:buChar char="•"/>
+              <a:defRPr sz="1600" kern="1200">
+                <a:solidFill>
+                  <a:schemeClr val="accent1"/>
+                </a:solidFill>
+                <a:latin typeface="+mn-lt"/>
+                <a:ea typeface="+mn-ea"/>
+                <a:cs typeface="+mn-cs"/>
+              </a:defRPr>
+            </a:lvl7pPr>
+            <a:lvl8pPr marL="2200000" indent="-228600" algn="l" defTabSz="914400" rtl="0" eaLnBrk="1" latinLnBrk="0" hangingPunct="1">
+              <a:lnSpc>
+                <a:spcPct val="90000"/>
+              </a:lnSpc>
+              <a:spcBef>
+                <a:spcPts val="200"/>
+              </a:spcBef>
+              <a:spcAft>
+                <a:spcPts val="400"/>
+              </a:spcAft>
+              <a:buClr>
+                <a:schemeClr val="accent1"/>
+              </a:buClr>
+              <a:buSzPct val="80000"/>
+              <a:buFont typeface="Corbel" pitchFamily="34" charset="0"/>
+              <a:buChar char="•"/>
+              <a:defRPr sz="1600" kern="1200">
+                <a:solidFill>
+                  <a:schemeClr val="accent1"/>
+                </a:solidFill>
+                <a:latin typeface="+mn-lt"/>
+                <a:ea typeface="+mn-ea"/>
+                <a:cs typeface="+mn-cs"/>
+              </a:defRPr>
+            </a:lvl8pPr>
+            <a:lvl9pPr marL="2500000" indent="-228600" algn="l" defTabSz="914400" rtl="0" eaLnBrk="1" latinLnBrk="0" hangingPunct="1">
+              <a:lnSpc>
+                <a:spcPct val="90000"/>
+              </a:lnSpc>
+              <a:spcBef>
+                <a:spcPts val="200"/>
+              </a:spcBef>
+              <a:spcAft>
+                <a:spcPts val="400"/>
+              </a:spcAft>
+              <a:buClr>
+                <a:schemeClr val="accent1"/>
+              </a:buClr>
+              <a:buSzPct val="80000"/>
+              <a:buFont typeface="Corbel" pitchFamily="34" charset="0"/>
+              <a:buChar char="•"/>
+              <a:defRPr sz="1600" kern="1200">
+                <a:solidFill>
+                  <a:schemeClr val="accent1"/>
+                </a:solidFill>
+                <a:latin typeface="+mn-lt"/>
+                <a:ea typeface="+mn-ea"/>
+                <a:cs typeface="+mn-cs"/>
+              </a:defRPr>
+            </a:lvl9pPr>
+          </a:lstStyle>
+          <a:p>
+            <a:pPr marL="45720" indent="0">
+              <a:buFont typeface="Wingdings" panose="05000000000000000000" pitchFamily="2" charset="2"/>
+              <a:buNone/>
+            </a:pPr>
+            <a:r>
+              <a:rPr lang="fa-IR" sz="1600" dirty="0">
+                <a:solidFill>
+                  <a:schemeClr val="tx1"/>
+                </a:solidFill>
+                <a:cs typeface="+mj-cs"/>
+              </a:rPr>
+              <a:t>اهداف بلند‌مدت</a:t>
+            </a:r>
+          </a:p>
+          <a:p>
+            <a:pPr marL="45720" indent="0">
+              <a:buFont typeface="Wingdings" panose="05000000000000000000" pitchFamily="2" charset="2"/>
+              <a:buNone/>
+            </a:pPr>
+            <a:endParaRPr lang="en-US" sz="1800" dirty="0">
+              <a:solidFill>
+                <a:schemeClr val="tx1"/>
+              </a:solidFill>
+            </a:endParaRPr>
           </a:p>
         </p:txBody>
       </p:sp>
@@ -25195,7 +28139,7 @@
 </p:sld>
 </file>
 
-<file path=ppt/slides/slide12.xml><?xml version="1.0" encoding="utf-8"?>
+<file path=ppt/slides/slide13.xml><?xml version="1.0" encoding="utf-8"?>
 <p:sld xmlns:a="http://schemas.openxmlformats.org/drawingml/2006/main" xmlns:r="http://schemas.openxmlformats.org/officeDocument/2006/relationships" xmlns:p="http://schemas.openxmlformats.org/presentationml/2006/main">
   <p:cSld>
     <p:spTree>
@@ -25259,10 +28203,52 @@
         </p:nvSpPr>
         <p:spPr/>
         <p:txBody>
-          <a:bodyPr/>
+          <a:bodyPr>
+            <a:normAutofit fontScale="92500"/>
+          </a:bodyPr>
           <a:lstStyle/>
           <a:p>
-            <a:endParaRPr lang="en-US"/>
+            <a:r>
+              <a:rPr lang="fa-IR" dirty="0"/>
+              <a:t>دهان به دهان</a:t>
+            </a:r>
+          </a:p>
+          <a:p>
+            <a:r>
+              <a:rPr lang="fa-IR" dirty="0"/>
+              <a:t>بازاریابی موتورهای جستجو</a:t>
+            </a:r>
+          </a:p>
+          <a:p>
+            <a:r>
+              <a:rPr lang="fa-IR" dirty="0"/>
+              <a:t>تبلیغات دیجیتال</a:t>
+            </a:r>
+          </a:p>
+          <a:p>
+            <a:r>
+              <a:rPr lang="fa-IR" dirty="0"/>
+              <a:t>بازاریابی محتوا</a:t>
+            </a:r>
+          </a:p>
+          <a:p>
+            <a:r>
+              <a:rPr lang="fa-IR" dirty="0"/>
+              <a:t>شرکت در رویدادهای عمومی</a:t>
+            </a:r>
+          </a:p>
+          <a:p>
+            <a:r>
+              <a:rPr lang="fa-IR" dirty="0"/>
+              <a:t>شرکای تجاری</a:t>
+            </a:r>
+          </a:p>
+          <a:p>
+            <a:r>
+              <a:rPr lang="fa-IR" dirty="0"/>
+              <a:t>مشتریان سازمانی</a:t>
+            </a:r>
+            <a:endParaRPr lang="en-US" dirty="0"/>
           </a:p>
         </p:txBody>
       </p:sp>
@@ -25291,7 +28277,7 @@
 </p:sld>
 </file>
 
-<file path=ppt/slides/slide13.xml><?xml version="1.0" encoding="utf-8"?>
+<file path=ppt/slides/slide14.xml><?xml version="1.0" encoding="utf-8"?>
 <p:sld xmlns:a="http://schemas.openxmlformats.org/drawingml/2006/main" xmlns:r="http://schemas.openxmlformats.org/officeDocument/2006/relationships" xmlns:p="http://schemas.openxmlformats.org/presentationml/2006/main">
   <p:cSld>
     <p:spTree>
@@ -25387,7 +28373,7 @@
 </p:sld>
 </file>
 
-<file path=ppt/slides/slide14.xml><?xml version="1.0" encoding="utf-8"?>
+<file path=ppt/slides/slide15.xml><?xml version="1.0" encoding="utf-8"?>
 <p:sld xmlns:a="http://schemas.openxmlformats.org/drawingml/2006/main" xmlns:r="http://schemas.openxmlformats.org/officeDocument/2006/relationships" xmlns:p="http://schemas.openxmlformats.org/presentationml/2006/main">
   <p:cSld>
     <p:spTree>
@@ -25509,7 +28495,7 @@
 </p:sld>
 </file>
 
-<file path=ppt/slides/slide15.xml><?xml version="1.0" encoding="utf-8"?>
+<file path=ppt/slides/slide16.xml><?xml version="1.0" encoding="utf-8"?>
 <p:sld xmlns:a="http://schemas.openxmlformats.org/drawingml/2006/main" xmlns:r="http://schemas.openxmlformats.org/officeDocument/2006/relationships" xmlns:p="http://schemas.openxmlformats.org/presentationml/2006/main">
   <p:cSld>
     <p:spTree>
@@ -25605,7 +28591,7 @@
 </p:sld>
 </file>
 
-<file path=ppt/slides/slide16.xml><?xml version="1.0" encoding="utf-8"?>
+<file path=ppt/slides/slide17.xml><?xml version="1.0" encoding="utf-8"?>
 <p:sld xmlns:a="http://schemas.openxmlformats.org/drawingml/2006/main" xmlns:r="http://schemas.openxmlformats.org/officeDocument/2006/relationships" xmlns:p="http://schemas.openxmlformats.org/presentationml/2006/main">
   <p:cSld>
     <p:spTree>
@@ -25672,7 +28658,7 @@
           <a:bodyPr/>
           <a:lstStyle/>
           <a:p>
-            <a:endParaRPr lang="en-US"/>
+            <a:endParaRPr lang="en-US" dirty="0"/>
           </a:p>
         </p:txBody>
       </p:sp>
@@ -25701,7 +28687,7 @@
 </p:sld>
 </file>
 
-<file path=ppt/slides/slide17.xml><?xml version="1.0" encoding="utf-8"?>
+<file path=ppt/slides/slide18.xml><?xml version="1.0" encoding="utf-8"?>
 <p:sld xmlns:a="http://schemas.openxmlformats.org/drawingml/2006/main" xmlns:r="http://schemas.openxmlformats.org/officeDocument/2006/relationships" xmlns:p="http://schemas.openxmlformats.org/presentationml/2006/main">
   <p:cSld>
     <p:spTree>
@@ -25747,31 +28733,32 @@
           </a:p>
         </p:txBody>
       </p:sp>
-      <p:sp>
-        <p:nvSpPr>
-          <p:cNvPr id="3" name="Content Placeholder 2">
+      <p:graphicFrame>
+        <p:nvGraphicFramePr>
+          <p:cNvPr id="4" name="Content Placeholder 3">
             <a:extLst>
               <a:ext uri="{FF2B5EF4-FFF2-40B4-BE49-F238E27FC236}">
-                <a16:creationId xmlns:a16="http://schemas.microsoft.com/office/drawing/2014/main" id="{2754D455-BEBD-4CC9-A815-4C111FA323E9}"/>
+                <a16:creationId xmlns:a16="http://schemas.microsoft.com/office/drawing/2014/main" id="{6ABF2F81-5FB9-48B0-8CAA-8AB2DA95E0D2}"/>
               </a:ext>
             </a:extLst>
           </p:cNvPr>
-          <p:cNvSpPr>
-            <a:spLocks noGrp="1"/>
-          </p:cNvSpPr>
+          <p:cNvGraphicFramePr>
+            <a:graphicFrameLocks noGrp="1"/>
+          </p:cNvGraphicFramePr>
           <p:nvPr>
             <p:ph idx="1"/>
           </p:nvPr>
-        </p:nvSpPr>
-        <p:spPr/>
-        <p:txBody>
-          <a:bodyPr/>
-          <a:lstStyle/>
-          <a:p>
-            <a:endParaRPr lang="en-US"/>
-          </a:p>
-        </p:txBody>
-      </p:sp>
+        </p:nvGraphicFramePr>
+        <p:xfrm>
+          <a:off x="1055688" y="1563688"/>
+          <a:ext cx="10080625" cy="4371975"/>
+        </p:xfrm>
+        <a:graphic>
+          <a:graphicData uri="http://schemas.openxmlformats.org/drawingml/2006/chart">
+            <c:chart xmlns:c="http://schemas.openxmlformats.org/drawingml/2006/chart" xmlns:r="http://schemas.openxmlformats.org/officeDocument/2006/relationships" r:id="rId3"/>
+          </a:graphicData>
+        </a:graphic>
+      </p:graphicFrame>
     </p:spTree>
     <p:extLst>
       <p:ext uri="{BB962C8B-B14F-4D97-AF65-F5344CB8AC3E}">
@@ -25797,7 +28784,7 @@
 </p:sld>
 </file>
 
-<file path=ppt/slides/slide18.xml><?xml version="1.0" encoding="utf-8"?>
+<file path=ppt/slides/slide19.xml><?xml version="1.0" encoding="utf-8"?>
 <p:sld xmlns:a="http://schemas.openxmlformats.org/drawingml/2006/main" xmlns:r="http://schemas.openxmlformats.org/officeDocument/2006/relationships" xmlns:p="http://schemas.openxmlformats.org/presentationml/2006/main">
   <p:cSld>
     <p:spTree>
@@ -25908,7 +28895,156 @@
 </p:sld>
 </file>
 
-<file path=ppt/slides/slide19.xml><?xml version="1.0" encoding="utf-8"?>
+<file path=ppt/slides/slide2.xml><?xml version="1.0" encoding="utf-8"?>
+<p:sld xmlns:a="http://schemas.openxmlformats.org/drawingml/2006/main" xmlns:r="http://schemas.openxmlformats.org/officeDocument/2006/relationships" xmlns:p="http://schemas.openxmlformats.org/presentationml/2006/main">
+  <p:cSld>
+    <p:spTree>
+      <p:nvGrpSpPr>
+        <p:cNvPr id="1" name=""/>
+        <p:cNvGrpSpPr/>
+        <p:nvPr/>
+      </p:nvGrpSpPr>
+      <p:grpSpPr>
+        <a:xfrm>
+          <a:off x="0" y="0"/>
+          <a:ext cx="0" cy="0"/>
+          <a:chOff x="0" y="0"/>
+          <a:chExt cx="0" cy="0"/>
+        </a:xfrm>
+      </p:grpSpPr>
+      <p:sp>
+        <p:nvSpPr>
+          <p:cNvPr id="2" name="Title 1">
+            <a:extLst>
+              <a:ext uri="{FF2B5EF4-FFF2-40B4-BE49-F238E27FC236}">
+                <a16:creationId xmlns:a16="http://schemas.microsoft.com/office/drawing/2014/main" id="{8E5231F0-428F-47B9-9A12-B3A1374A2850}"/>
+              </a:ext>
+            </a:extLst>
+          </p:cNvPr>
+          <p:cNvSpPr>
+            <a:spLocks noGrp="1"/>
+          </p:cNvSpPr>
+          <p:nvPr>
+            <p:ph type="title"/>
+          </p:nvPr>
+        </p:nvSpPr>
+        <p:spPr/>
+        <p:txBody>
+          <a:bodyPr>
+            <a:normAutofit/>
+          </a:bodyPr>
+          <a:lstStyle/>
+          <a:p>
+            <a:r>
+              <a:rPr lang="fa-IR" dirty="0"/>
+              <a:t>مشکل</a:t>
+            </a:r>
+            <a:endParaRPr lang="en-US" dirty="0"/>
+          </a:p>
+        </p:txBody>
+      </p:sp>
+      <p:pic>
+        <p:nvPicPr>
+          <p:cNvPr id="8" name="Picture Placeholder 7">
+            <a:extLst>
+              <a:ext uri="{FF2B5EF4-FFF2-40B4-BE49-F238E27FC236}">
+                <a16:creationId xmlns:a16="http://schemas.microsoft.com/office/drawing/2014/main" id="{56D527AB-C05F-428A-A97F-B6DBE5B38FA7}"/>
+              </a:ext>
+            </a:extLst>
+          </p:cNvPr>
+          <p:cNvPicPr>
+            <a:picLocks noGrp="1" noChangeAspect="1"/>
+          </p:cNvPicPr>
+          <p:nvPr>
+            <p:ph idx="1"/>
+          </p:nvPr>
+        </p:nvPicPr>
+        <p:blipFill>
+          <a:blip r:embed="rId3">
+            <a:extLst>
+              <a:ext uri="{28A0092B-C50C-407E-A947-70E740481C1C}">
+                <a14:useLocalDpi xmlns:a14="http://schemas.microsoft.com/office/drawing/2010/main" val="0"/>
+              </a:ext>
+            </a:extLst>
+          </a:blip>
+          <a:stretch/>
+        </p:blipFill>
+        <p:spPr>
+          <a:xfrm>
+            <a:off x="1068388" y="1877294"/>
+            <a:ext cx="10080625" cy="4252763"/>
+          </a:xfrm>
+        </p:spPr>
+      </p:pic>
+      <p:sp>
+        <p:nvSpPr>
+          <p:cNvPr id="14" name="Text Placeholder 13">
+            <a:extLst>
+              <a:ext uri="{FF2B5EF4-FFF2-40B4-BE49-F238E27FC236}">
+                <a16:creationId xmlns:a16="http://schemas.microsoft.com/office/drawing/2014/main" id="{1504A111-FADF-4422-9205-36572D452820}"/>
+              </a:ext>
+            </a:extLst>
+          </p:cNvPr>
+          <p:cNvSpPr>
+            <a:spLocks noGrp="1"/>
+          </p:cNvSpPr>
+          <p:nvPr>
+            <p:ph type="body" sz="quarter" idx="12"/>
+          </p:nvPr>
+        </p:nvSpPr>
+        <p:spPr/>
+        <p:txBody>
+          <a:bodyPr/>
+          <a:lstStyle/>
+          <a:p>
+            <a:r>
+              <a:rPr lang="fa-IR" sz="2000" dirty="0"/>
+              <a:t>پلتفرم تجارت الکترونیک </a:t>
+            </a:r>
+            <a:r>
+              <a:rPr lang="fa-IR" sz="2000" dirty="0">
+                <a:solidFill>
+                  <a:srgbClr val="C80A5A"/>
+                </a:solidFill>
+                <a:cs typeface="+mj-cs"/>
+              </a:rPr>
+              <a:t>یکپارچه</a:t>
+            </a:r>
+            <a:endParaRPr lang="en-US" sz="2000" dirty="0">
+              <a:solidFill>
+                <a:srgbClr val="C80A5A"/>
+              </a:solidFill>
+              <a:cs typeface="+mj-cs"/>
+            </a:endParaRPr>
+          </a:p>
+        </p:txBody>
+      </p:sp>
+    </p:spTree>
+    <p:extLst>
+      <p:ext uri="{BB962C8B-B14F-4D97-AF65-F5344CB8AC3E}">
+        <p14:creationId xmlns:p14="http://schemas.microsoft.com/office/powerpoint/2010/main" val="794564716"/>
+      </p:ext>
+    </p:extLst>
+  </p:cSld>
+  <p:clrMapOvr>
+    <a:masterClrMapping/>
+  </p:clrMapOvr>
+  <mc:AlternateContent xmlns:mc="http://schemas.openxmlformats.org/markup-compatibility/2006" xmlns:p159="http://schemas.microsoft.com/office/powerpoint/2015/09/main">
+    <mc:Choice Requires="p159">
+      <p:transition>
+        <p159:morph option="byWord"/>
+      </p:transition>
+    </mc:Choice>
+    <mc:Fallback xmlns="">
+      <p:transition>
+        <p:fade/>
+      </p:transition>
+    </mc:Fallback>
+  </mc:AlternateContent>
+</p:sld>
+</file>
+
+<file path=ppt/slides/slide20.xml><?xml version="1.0" encoding="utf-8"?>
 <p:sld xmlns:a="http://schemas.openxmlformats.org/drawingml/2006/main" xmlns:r="http://schemas.openxmlformats.org/officeDocument/2006/relationships" xmlns:p="http://schemas.openxmlformats.org/presentationml/2006/main">
   <p:cSld>
     <p:spTree>
@@ -26920,156 +30056,7 @@
 </p:sld>
 </file>
 
-<file path=ppt/slides/slide2.xml><?xml version="1.0" encoding="utf-8"?>
-<p:sld xmlns:a="http://schemas.openxmlformats.org/drawingml/2006/main" xmlns:r="http://schemas.openxmlformats.org/officeDocument/2006/relationships" xmlns:p="http://schemas.openxmlformats.org/presentationml/2006/main">
-  <p:cSld>
-    <p:spTree>
-      <p:nvGrpSpPr>
-        <p:cNvPr id="1" name=""/>
-        <p:cNvGrpSpPr/>
-        <p:nvPr/>
-      </p:nvGrpSpPr>
-      <p:grpSpPr>
-        <a:xfrm>
-          <a:off x="0" y="0"/>
-          <a:ext cx="0" cy="0"/>
-          <a:chOff x="0" y="0"/>
-          <a:chExt cx="0" cy="0"/>
-        </a:xfrm>
-      </p:grpSpPr>
-      <p:sp>
-        <p:nvSpPr>
-          <p:cNvPr id="2" name="Title 1">
-            <a:extLst>
-              <a:ext uri="{FF2B5EF4-FFF2-40B4-BE49-F238E27FC236}">
-                <a16:creationId xmlns:a16="http://schemas.microsoft.com/office/drawing/2014/main" id="{8E5231F0-428F-47B9-9A12-B3A1374A2850}"/>
-              </a:ext>
-            </a:extLst>
-          </p:cNvPr>
-          <p:cNvSpPr>
-            <a:spLocks noGrp="1"/>
-          </p:cNvSpPr>
-          <p:nvPr>
-            <p:ph type="title"/>
-          </p:nvPr>
-        </p:nvSpPr>
-        <p:spPr/>
-        <p:txBody>
-          <a:bodyPr>
-            <a:normAutofit/>
-          </a:bodyPr>
-          <a:lstStyle/>
-          <a:p>
-            <a:r>
-              <a:rPr lang="fa-IR" dirty="0"/>
-              <a:t>مشکل</a:t>
-            </a:r>
-            <a:endParaRPr lang="en-US" dirty="0"/>
-          </a:p>
-        </p:txBody>
-      </p:sp>
-      <p:pic>
-        <p:nvPicPr>
-          <p:cNvPr id="8" name="Picture Placeholder 7">
-            <a:extLst>
-              <a:ext uri="{FF2B5EF4-FFF2-40B4-BE49-F238E27FC236}">
-                <a16:creationId xmlns:a16="http://schemas.microsoft.com/office/drawing/2014/main" id="{56D527AB-C05F-428A-A97F-B6DBE5B38FA7}"/>
-              </a:ext>
-            </a:extLst>
-          </p:cNvPr>
-          <p:cNvPicPr>
-            <a:picLocks noGrp="1" noChangeAspect="1"/>
-          </p:cNvPicPr>
-          <p:nvPr>
-            <p:ph idx="1"/>
-          </p:nvPr>
-        </p:nvPicPr>
-        <p:blipFill>
-          <a:blip r:embed="rId3">
-            <a:extLst>
-              <a:ext uri="{28A0092B-C50C-407E-A947-70E740481C1C}">
-                <a14:useLocalDpi xmlns:a14="http://schemas.microsoft.com/office/drawing/2010/main" val="0"/>
-              </a:ext>
-            </a:extLst>
-          </a:blip>
-          <a:stretch/>
-        </p:blipFill>
-        <p:spPr>
-          <a:xfrm>
-            <a:off x="1068388" y="1877294"/>
-            <a:ext cx="10080625" cy="4252763"/>
-          </a:xfrm>
-        </p:spPr>
-      </p:pic>
-      <p:sp>
-        <p:nvSpPr>
-          <p:cNvPr id="14" name="Text Placeholder 13">
-            <a:extLst>
-              <a:ext uri="{FF2B5EF4-FFF2-40B4-BE49-F238E27FC236}">
-                <a16:creationId xmlns:a16="http://schemas.microsoft.com/office/drawing/2014/main" id="{1504A111-FADF-4422-9205-36572D452820}"/>
-              </a:ext>
-            </a:extLst>
-          </p:cNvPr>
-          <p:cNvSpPr>
-            <a:spLocks noGrp="1"/>
-          </p:cNvSpPr>
-          <p:nvPr>
-            <p:ph type="body" sz="quarter" idx="12"/>
-          </p:nvPr>
-        </p:nvSpPr>
-        <p:spPr/>
-        <p:txBody>
-          <a:bodyPr/>
-          <a:lstStyle/>
-          <a:p>
-            <a:r>
-              <a:rPr lang="fa-IR" sz="2000" dirty="0"/>
-              <a:t>پلتفرم تجارت الکترونیک </a:t>
-            </a:r>
-            <a:r>
-              <a:rPr lang="fa-IR" sz="2000" dirty="0">
-                <a:solidFill>
-                  <a:srgbClr val="C80A5A"/>
-                </a:solidFill>
-                <a:cs typeface="+mj-cs"/>
-              </a:rPr>
-              <a:t>یکپارچه</a:t>
-            </a:r>
-            <a:endParaRPr lang="en-US" sz="2000" dirty="0">
-              <a:solidFill>
-                <a:srgbClr val="C80A5A"/>
-              </a:solidFill>
-              <a:cs typeface="+mj-cs"/>
-            </a:endParaRPr>
-          </a:p>
-        </p:txBody>
-      </p:sp>
-    </p:spTree>
-    <p:extLst>
-      <p:ext uri="{BB962C8B-B14F-4D97-AF65-F5344CB8AC3E}">
-        <p14:creationId xmlns:p14="http://schemas.microsoft.com/office/powerpoint/2010/main" val="794564716"/>
-      </p:ext>
-    </p:extLst>
-  </p:cSld>
-  <p:clrMapOvr>
-    <a:masterClrMapping/>
-  </p:clrMapOvr>
-  <mc:AlternateContent xmlns:mc="http://schemas.openxmlformats.org/markup-compatibility/2006" xmlns:p159="http://schemas.microsoft.com/office/powerpoint/2015/09/main">
-    <mc:Choice Requires="p159">
-      <p:transition>
-        <p159:morph option="byWord"/>
-      </p:transition>
-    </mc:Choice>
-    <mc:Fallback xmlns="">
-      <p:transition>
-        <p:fade/>
-      </p:transition>
-    </mc:Fallback>
-  </mc:AlternateContent>
-</p:sld>
-</file>
-
-<file path=ppt/slides/slide20.xml><?xml version="1.0" encoding="utf-8"?>
+<file path=ppt/slides/slide21.xml><?xml version="1.0" encoding="utf-8"?>
 <p:sld xmlns:a="http://schemas.openxmlformats.org/drawingml/2006/main" xmlns:r="http://schemas.openxmlformats.org/officeDocument/2006/relationships" xmlns:p="http://schemas.openxmlformats.org/presentationml/2006/main">
   <p:cSld>
     <p:spTree>
@@ -27165,7 +30152,7 @@
 </p:sld>
 </file>
 
-<file path=ppt/slides/slide21.xml><?xml version="1.0" encoding="utf-8"?>
+<file path=ppt/slides/slide22.xml><?xml version="1.0" encoding="utf-8"?>
 <p:sld xmlns:a="http://schemas.openxmlformats.org/drawingml/2006/main" xmlns:r="http://schemas.openxmlformats.org/officeDocument/2006/relationships" xmlns:p="http://schemas.openxmlformats.org/presentationml/2006/main">
   <p:cSld>
     <p:spTree>
@@ -27257,7 +30244,7 @@
 </p:sld>
 </file>
 
-<file path=ppt/slides/slide22.xml><?xml version="1.0" encoding="utf-8"?>
+<file path=ppt/slides/slide23.xml><?xml version="1.0" encoding="utf-8"?>
 <p:sld xmlns:a="http://schemas.openxmlformats.org/drawingml/2006/main" xmlns:r="http://schemas.openxmlformats.org/officeDocument/2006/relationships" xmlns:p="http://schemas.openxmlformats.org/presentationml/2006/main">
   <p:cSld>
     <p:spTree>
@@ -27372,7 +30359,7 @@
 </p:sld>
 </file>
 
-<file path=ppt/slides/slide23.xml><?xml version="1.0" encoding="utf-8"?>
+<file path=ppt/slides/slide24.xml><?xml version="1.0" encoding="utf-8"?>
 <p:sld xmlns:a="http://schemas.openxmlformats.org/drawingml/2006/main" xmlns:r="http://schemas.openxmlformats.org/officeDocument/2006/relationships" xmlns:p="http://schemas.openxmlformats.org/presentationml/2006/main">
   <p:cSld>
     <p:spTree>
@@ -29136,14 +32123,14 @@
           <p:nvPr>
             <p:extLst>
               <p:ext uri="{D42A27DB-BD31-4B8C-83A1-F6EECF244321}">
-                <p14:modId xmlns:p14="http://schemas.microsoft.com/office/powerpoint/2010/main" val="566090218"/>
+                <p14:modId xmlns:p14="http://schemas.microsoft.com/office/powerpoint/2010/main" val="398636660"/>
               </p:ext>
             </p:extLst>
           </p:nvPr>
         </p:nvGraphicFramePr>
         <p:xfrm>
-          <a:off x="6705600" y="3884504"/>
-          <a:ext cx="4267201" cy="2047875"/>
+          <a:off x="6413500" y="3884504"/>
+          <a:ext cx="4584700" cy="2047875"/>
         </p:xfrm>
         <a:graphic>
           <a:graphicData uri="http://schemas.openxmlformats.org/drawingml/2006/diagram">

</xml_diff>

<commit_message>
add business Model page
</commit_message>
<xml_diff>
--- a/business/PitchDeck/JIbres-PitchDeck-v1.pptx
+++ b/business/PitchDeck/JIbres-PitchDeck-v1.pptx
@@ -17415,7 +17415,7 @@
           <a:p>
             <a:fld id="{4BCE15A7-A56F-4E25-873C-50B597AA8420}" type="datetimeFigureOut">
               <a:rPr lang="en-US" smtClean="0"/>
-              <a:t>2021-05-10</a:t>
+              <a:t>2021-05-11</a:t>
             </a:fld>
             <a:endParaRPr lang="en-US"/>
           </a:p>
@@ -17592,7 +17592,7 @@
           <a:p>
             <a:fld id="{62C1A832-66EE-44A0-BEBE-A62E02B5B452}" type="datetimeFigureOut">
               <a:rPr lang="en-US" smtClean="0"/>
-              <a:t>2021-05-10</a:t>
+              <a:t>2021-05-11</a:t>
             </a:fld>
             <a:endParaRPr lang="en-US"/>
           </a:p>
@@ -17955,6 +17955,127 @@
 </file>
 
 <file path=ppt/notesSlides/notesSlide10.xml><?xml version="1.0" encoding="utf-8"?>
+<p:notes xmlns:a="http://schemas.openxmlformats.org/drawingml/2006/main" xmlns:r="http://schemas.openxmlformats.org/officeDocument/2006/relationships" xmlns:p="http://schemas.openxmlformats.org/presentationml/2006/main">
+  <p:cSld>
+    <p:spTree>
+      <p:nvGrpSpPr>
+        <p:cNvPr id="1" name=""/>
+        <p:cNvGrpSpPr/>
+        <p:nvPr/>
+      </p:nvGrpSpPr>
+      <p:grpSpPr>
+        <a:xfrm>
+          <a:off x="0" y="0"/>
+          <a:ext cx="0" cy="0"/>
+          <a:chOff x="0" y="0"/>
+          <a:chExt cx="0" cy="0"/>
+        </a:xfrm>
+      </p:grpSpPr>
+      <p:sp>
+        <p:nvSpPr>
+          <p:cNvPr id="2" name="Slide Image Placeholder 1"/>
+          <p:cNvSpPr>
+            <a:spLocks noGrp="1" noRot="1" noChangeAspect="1"/>
+          </p:cNvSpPr>
+          <p:nvPr>
+            <p:ph type="sldImg"/>
+          </p:nvPr>
+        </p:nvSpPr>
+        <p:spPr/>
+      </p:sp>
+      <p:sp>
+        <p:nvSpPr>
+          <p:cNvPr id="3" name="Notes Placeholder 2"/>
+          <p:cNvSpPr>
+            <a:spLocks noGrp="1"/>
+          </p:cNvSpPr>
+          <p:nvPr>
+            <p:ph type="body" idx="1"/>
+          </p:nvPr>
+        </p:nvSpPr>
+        <p:spPr/>
+        <p:txBody>
+          <a:bodyPr/>
+          <a:lstStyle/>
+          <a:p>
+            <a:r>
+              <a:rPr lang="en-US" sz="1200" b="0" i="0" kern="1200" dirty="0">
+                <a:solidFill>
+                  <a:schemeClr val="tx1"/>
+                </a:solidFill>
+                <a:effectLst/>
+                <a:latin typeface="+mn-lt"/>
+                <a:ea typeface="+mn-ea"/>
+                <a:cs typeface="+mn-cs"/>
+              </a:rPr>
+              <a:t>The financials slide is one that investors will spend the most time on. It’s one of the three most important slides in your pitch deck, according to the data in this </a:t>
+            </a:r>
+            <a:r>
+              <a:rPr lang="en-US" sz="1200" b="0" i="0" u="none" strike="noStrike" kern="1200" dirty="0">
+                <a:solidFill>
+                  <a:schemeClr val="tx1"/>
+                </a:solidFill>
+                <a:effectLst/>
+                <a:latin typeface="+mn-lt"/>
+                <a:ea typeface="+mn-ea"/>
+                <a:cs typeface="+mn-cs"/>
+                <a:hlinkClick r:id="rId3"/>
+              </a:rPr>
+              <a:t>Forbes article</a:t>
+            </a:r>
+            <a:r>
+              <a:rPr lang="en-US" sz="1200" b="0" i="0" kern="1200" dirty="0">
+                <a:solidFill>
+                  <a:schemeClr val="tx1"/>
+                </a:solidFill>
+                <a:effectLst/>
+                <a:latin typeface="+mn-lt"/>
+                <a:ea typeface="+mn-ea"/>
+                <a:cs typeface="+mn-cs"/>
+              </a:rPr>
+              <a:t>. Key points include your burn rate, break even point and how many users you need to make a profit.</a:t>
+            </a:r>
+            <a:endParaRPr lang="en-US" dirty="0"/>
+          </a:p>
+        </p:txBody>
+      </p:sp>
+      <p:sp>
+        <p:nvSpPr>
+          <p:cNvPr id="4" name="Slide Number Placeholder 3"/>
+          <p:cNvSpPr>
+            <a:spLocks noGrp="1"/>
+          </p:cNvSpPr>
+          <p:nvPr>
+            <p:ph type="sldNum" sz="quarter" idx="5"/>
+          </p:nvPr>
+        </p:nvSpPr>
+        <p:spPr/>
+        <p:txBody>
+          <a:bodyPr/>
+          <a:lstStyle/>
+          <a:p>
+            <a:fld id="{EC29E1AC-3210-4C03-93DF-294BFDB0FAF7}" type="slidenum">
+              <a:rPr lang="en-US" smtClean="0"/>
+              <a:t>16</a:t>
+            </a:fld>
+            <a:endParaRPr lang="en-US"/>
+          </a:p>
+        </p:txBody>
+      </p:sp>
+    </p:spTree>
+    <p:extLst>
+      <p:ext uri="{BB962C8B-B14F-4D97-AF65-F5344CB8AC3E}">
+        <p14:creationId xmlns:p14="http://schemas.microsoft.com/office/powerpoint/2010/main" val="1515327474"/>
+      </p:ext>
+    </p:extLst>
+  </p:cSld>
+  <p:clrMapOvr>
+    <a:masterClrMapping/>
+  </p:clrMapOvr>
+</p:notes>
+</file>
+
+<file path=ppt/notesSlides/notesSlide11.xml><?xml version="1.0" encoding="utf-8"?>
 <p:notes xmlns:a="http://schemas.openxmlformats.org/drawingml/2006/main" xmlns:r="http://schemas.openxmlformats.org/officeDocument/2006/relationships" xmlns:p="http://schemas.openxmlformats.org/presentationml/2006/main">
   <p:cSld>
     <p:spTree>
@@ -19102,12 +19223,198 @@
           <a:bodyPr/>
           <a:lstStyle/>
           <a:p>
-            <a:pPr algn="r" rtl="1"/>
             <a:r>
-              <a:rPr lang="fa-IR" dirty="0"/>
-              <a:t>نمایش هدف برای ادامه جلب توجه در روز ارائه</a:t>
+              <a:rPr lang="en-US" dirty="0" err="1"/>
+              <a:t>Linkedin</a:t>
             </a:r>
-            <a:endParaRPr lang="en-US" dirty="0"/>
+            <a:r>
+              <a:rPr lang="en-US" dirty="0"/>
+              <a:t>,, Cloudflare, Skype, </a:t>
+            </a:r>
+            <a:r>
+              <a:rPr lang="en-US" b="0" i="0" dirty="0">
+                <a:solidFill>
+                  <a:srgbClr val="111111"/>
+                </a:solidFill>
+                <a:effectLst/>
+                <a:latin typeface="SourceSansPro"/>
+              </a:rPr>
+              <a:t>Candy Crush Saga, Slack, Asana, Trello, </a:t>
+            </a:r>
+            <a:r>
+              <a:rPr lang="en-US" b="0" i="0" dirty="0">
+                <a:solidFill>
+                  <a:srgbClr val="212121"/>
+                </a:solidFill>
+                <a:effectLst/>
+                <a:latin typeface="PT Serif"/>
+              </a:rPr>
+              <a:t>Pandora, Evernote</a:t>
+            </a:r>
+            <a:endParaRPr lang="fa-IR" dirty="0"/>
+          </a:p>
+          <a:p>
+            <a:pPr marL="0" marR="0" lvl="0" indent="0" algn="l" defTabSz="914400" rtl="0" eaLnBrk="1" fontAlgn="auto" latinLnBrk="0" hangingPunct="1">
+              <a:lnSpc>
+                <a:spcPct val="100000"/>
+              </a:lnSpc>
+              <a:spcBef>
+                <a:spcPts val="0"/>
+              </a:spcBef>
+              <a:spcAft>
+                <a:spcPts val="0"/>
+              </a:spcAft>
+              <a:buClrTx/>
+              <a:buSzTx/>
+              <a:buFontTx/>
+              <a:buNone/>
+              <a:tabLst/>
+              <a:defRPr/>
+            </a:pPr>
+            <a:r>
+              <a:rPr lang="en-US" b="1" i="0" dirty="0">
+                <a:solidFill>
+                  <a:srgbClr val="282828"/>
+                </a:solidFill>
+                <a:effectLst/>
+                <a:latin typeface="GT America"/>
+              </a:rPr>
+              <a:t>Conversion rate ~ 2-5%</a:t>
+            </a:r>
+          </a:p>
+          <a:p>
+            <a:pPr marL="0" marR="0" lvl="0" indent="0" algn="l" defTabSz="914400" rtl="0" eaLnBrk="1" fontAlgn="auto" latinLnBrk="0" hangingPunct="1">
+              <a:lnSpc>
+                <a:spcPct val="100000"/>
+              </a:lnSpc>
+              <a:spcBef>
+                <a:spcPts val="0"/>
+              </a:spcBef>
+              <a:spcAft>
+                <a:spcPts val="0"/>
+              </a:spcAft>
+              <a:buClrTx/>
+              <a:buSzTx/>
+              <a:buFontTx/>
+              <a:buNone/>
+              <a:tabLst/>
+              <a:defRPr/>
+            </a:pPr>
+            <a:r>
+              <a:rPr lang="en-US" dirty="0"/>
+              <a:t>Dropbox</a:t>
+            </a:r>
+            <a:r>
+              <a:rPr lang="en-US" b="1" i="0" dirty="0">
+                <a:solidFill>
+                  <a:srgbClr val="282828"/>
+                </a:solidFill>
+                <a:effectLst/>
+                <a:latin typeface="GT America"/>
+              </a:rPr>
+              <a:t> 4%</a:t>
+            </a:r>
+          </a:p>
+          <a:p>
+            <a:pPr marL="0" marR="0" lvl="0" indent="0" algn="l" defTabSz="914400" rtl="0" eaLnBrk="1" fontAlgn="auto" latinLnBrk="0" hangingPunct="1">
+              <a:lnSpc>
+                <a:spcPct val="100000"/>
+              </a:lnSpc>
+              <a:spcBef>
+                <a:spcPts val="0"/>
+              </a:spcBef>
+              <a:spcAft>
+                <a:spcPts val="0"/>
+              </a:spcAft>
+              <a:buClrTx/>
+              <a:buSzTx/>
+              <a:buFontTx/>
+              <a:buNone/>
+              <a:tabLst/>
+              <a:defRPr/>
+            </a:pPr>
+            <a:r>
+              <a:rPr lang="en-US" dirty="0"/>
+              <a:t>Spotify</a:t>
+            </a:r>
+            <a:r>
+              <a:rPr lang="en-US" b="1" i="0" dirty="0">
+                <a:solidFill>
+                  <a:srgbClr val="282828"/>
+                </a:solidFill>
+                <a:effectLst/>
+                <a:latin typeface="GT America"/>
+              </a:rPr>
+              <a:t> 45%</a:t>
+            </a:r>
+          </a:p>
+          <a:p>
+            <a:pPr algn="l"/>
+            <a:r>
+              <a:rPr lang="en-US" b="0" i="0" dirty="0">
+                <a:solidFill>
+                  <a:srgbClr val="111111"/>
+                </a:solidFill>
+                <a:effectLst/>
+                <a:latin typeface="SourceSansPro"/>
+              </a:rPr>
+              <a:t>Freemium business models date back to the 1980s, though the term was coined in 2006</a:t>
+            </a:r>
+            <a:br>
+              <a:rPr lang="en-US" b="0" i="0" dirty="0">
+                <a:solidFill>
+                  <a:srgbClr val="282828"/>
+                </a:solidFill>
+                <a:effectLst/>
+                <a:latin typeface="Lava Std"/>
+              </a:rPr>
+            </a:br>
+            <a:endParaRPr lang="en-US" b="0" i="0" dirty="0">
+              <a:solidFill>
+                <a:srgbClr val="282828"/>
+              </a:solidFill>
+              <a:effectLst/>
+              <a:latin typeface="Lava Std"/>
+            </a:endParaRPr>
+          </a:p>
+          <a:p>
+            <a:pPr algn="l"/>
+            <a:r>
+              <a:rPr lang="en-US" b="1" i="0" dirty="0">
+                <a:solidFill>
+                  <a:srgbClr val="282828"/>
+                </a:solidFill>
+                <a:effectLst/>
+                <a:latin typeface="Lava Std"/>
+              </a:rPr>
+              <a:t>Free Trial covert rate ~ 30%</a:t>
+            </a:r>
+            <a:br>
+              <a:rPr lang="en-US" b="1" i="0" dirty="0">
+                <a:solidFill>
+                  <a:srgbClr val="282828"/>
+                </a:solidFill>
+                <a:effectLst/>
+                <a:latin typeface="Lava Std"/>
+              </a:rPr>
+            </a:br>
+            <a:r>
+              <a:rPr lang="en-US" b="0" i="0" dirty="0">
+                <a:solidFill>
+                  <a:srgbClr val="282828"/>
+                </a:solidFill>
+                <a:effectLst/>
+                <a:latin typeface="Lava Std"/>
+              </a:rPr>
+              <a:t>https://www.reforge.com/blog/the-hidden-fremium-advantage</a:t>
+            </a:r>
+            <a:endParaRPr lang="en-US" b="1" i="0" dirty="0">
+              <a:solidFill>
+                <a:srgbClr val="282828"/>
+              </a:solidFill>
+              <a:effectLst/>
+              <a:latin typeface="GT America"/>
+            </a:endParaRPr>
           </a:p>
         </p:txBody>
       </p:sp>
@@ -19128,7 +19435,7 @@
           <a:p>
             <a:fld id="{EC29E1AC-3210-4C03-93DF-294BFDB0FAF7}" type="slidenum">
               <a:rPr lang="en-US" smtClean="0"/>
-              <a:t>15</a:t>
+              <a:t>8</a:t>
             </a:fld>
             <a:endParaRPr lang="en-US"/>
           </a:p>
@@ -19137,7 +19444,7 @@
     </p:spTree>
     <p:extLst>
       <p:ext uri="{BB962C8B-B14F-4D97-AF65-F5344CB8AC3E}">
-        <p14:creationId xmlns:p14="http://schemas.microsoft.com/office/powerpoint/2010/main" val="2773812234"/>
+        <p14:creationId xmlns:p14="http://schemas.microsoft.com/office/powerpoint/2010/main" val="256107301"/>
       </p:ext>
     </p:extLst>
   </p:cSld>
@@ -19191,42 +19498,10 @@
           <a:bodyPr/>
           <a:lstStyle/>
           <a:p>
+            <a:pPr algn="r" rtl="1"/>
             <a:r>
-              <a:rPr lang="en-US" sz="1200" b="0" i="0" kern="1200" dirty="0">
-                <a:solidFill>
-                  <a:schemeClr val="tx1"/>
-                </a:solidFill>
-                <a:effectLst/>
-                <a:latin typeface="+mn-lt"/>
-                <a:ea typeface="+mn-ea"/>
-                <a:cs typeface="+mn-cs"/>
-              </a:rPr>
-              <a:t>The financials slide is one that investors will spend the most time on. It’s one of the three most important slides in your pitch deck, according to the data in this </a:t>
-            </a:r>
-            <a:r>
-              <a:rPr lang="en-US" sz="1200" b="0" i="0" u="none" strike="noStrike" kern="1200" dirty="0">
-                <a:solidFill>
-                  <a:schemeClr val="tx1"/>
-                </a:solidFill>
-                <a:effectLst/>
-                <a:latin typeface="+mn-lt"/>
-                <a:ea typeface="+mn-ea"/>
-                <a:cs typeface="+mn-cs"/>
-                <a:hlinkClick r:id="rId3"/>
-              </a:rPr>
-              <a:t>Forbes article</a:t>
-            </a:r>
-            <a:r>
-              <a:rPr lang="en-US" sz="1200" b="0" i="0" kern="1200" dirty="0">
-                <a:solidFill>
-                  <a:schemeClr val="tx1"/>
-                </a:solidFill>
-                <a:effectLst/>
-                <a:latin typeface="+mn-lt"/>
-                <a:ea typeface="+mn-ea"/>
-                <a:cs typeface="+mn-cs"/>
-              </a:rPr>
-              <a:t>. Key points include your burn rate, break even point and how many users you need to make a profit.</a:t>
+              <a:rPr lang="fa-IR" dirty="0"/>
+              <a:t>نمایش هدف برای ادامه جلب توجه در روز ارائه</a:t>
             </a:r>
             <a:endParaRPr lang="en-US" dirty="0"/>
           </a:p>
@@ -19249,7 +19524,7 @@
           <a:p>
             <a:fld id="{EC29E1AC-3210-4C03-93DF-294BFDB0FAF7}" type="slidenum">
               <a:rPr lang="en-US" smtClean="0"/>
-              <a:t>16</a:t>
+              <a:t>15</a:t>
             </a:fld>
             <a:endParaRPr lang="en-US"/>
           </a:p>
@@ -19258,7 +19533,7 @@
     </p:spTree>
     <p:extLst>
       <p:ext uri="{BB962C8B-B14F-4D97-AF65-F5344CB8AC3E}">
-        <p14:creationId xmlns:p14="http://schemas.microsoft.com/office/powerpoint/2010/main" val="1515327474"/>
+        <p14:creationId xmlns:p14="http://schemas.microsoft.com/office/powerpoint/2010/main" val="2773812234"/>
       </p:ext>
     </p:extLst>
   </p:cSld>
@@ -32056,7 +32331,7 @@
         <p:spPr>
           <a:xfrm>
             <a:off x="2095500" y="6218130"/>
-            <a:ext cx="9039448" cy="246221"/>
+            <a:ext cx="9039448" cy="400110"/>
           </a:xfrm>
           <a:prstGeom prst="rect">
             <a:avLst/>
@@ -32073,6 +32348,13 @@
             <a:r>
               <a:rPr lang="en-US" sz="1000" dirty="0"/>
               <a:t>*Gross Merchandise Volume, or GMV, represents the total value of orders facilitated on the Jibres platform.</a:t>
+            </a:r>
+          </a:p>
+          <a:p>
+            <a:pPr algn="l"/>
+            <a:r>
+              <a:rPr lang="en-US" sz="1000" dirty="0"/>
+              <a:t>* Jibres v1 released at 29 Mar 2021</a:t>
             </a:r>
           </a:p>
         </p:txBody>
@@ -33697,7 +33979,7 @@
           <a:p>
             <a:r>
               <a:rPr lang="fa-IR" dirty="0"/>
-              <a:t>بیزینس مدل فری‌میوم</a:t>
+              <a:t>بیزینس مدل</a:t>
             </a:r>
             <a:endParaRPr lang="en-US" dirty="0"/>
           </a:p>
@@ -33719,12 +34001,320 @@
             <p:ph idx="1"/>
           </p:nvPr>
         </p:nvSpPr>
-        <p:spPr/>
+        <p:spPr>
+          <a:xfrm>
+            <a:off x="1056004" y="1563880"/>
+            <a:ext cx="10080000" cy="2818549"/>
+          </a:xfrm>
+        </p:spPr>
         <p:txBody>
-          <a:bodyPr/>
+          <a:bodyPr anchor="t">
+            <a:normAutofit/>
+          </a:bodyPr>
           <a:lstStyle/>
           <a:p>
-            <a:endParaRPr lang="en-US" dirty="0"/>
+            <a:pPr marL="45720" indent="0" algn="ctr">
+              <a:buNone/>
+            </a:pPr>
+            <a:r>
+              <a:rPr lang="en-US" sz="13800" dirty="0">
+                <a:latin typeface="+mj-lt"/>
+              </a:rPr>
+              <a:t>Free</a:t>
+            </a:r>
+            <a:r>
+              <a:rPr lang="en-US" sz="13800" dirty="0">
+                <a:solidFill>
+                  <a:schemeClr val="tx1">
+                    <a:lumMod val="50000"/>
+                    <a:lumOff val="50000"/>
+                  </a:schemeClr>
+                </a:solidFill>
+                <a:latin typeface="+mj-lt"/>
+              </a:rPr>
+              <a:t>mium</a:t>
+            </a:r>
+          </a:p>
+        </p:txBody>
+      </p:sp>
+      <p:sp>
+        <p:nvSpPr>
+          <p:cNvPr id="5" name="Text Placeholder 7">
+            <a:extLst>
+              <a:ext uri="{FF2B5EF4-FFF2-40B4-BE49-F238E27FC236}">
+                <a16:creationId xmlns:a16="http://schemas.microsoft.com/office/drawing/2014/main" id="{D41FA18E-2492-4451-8264-C5048CE085E3}"/>
+              </a:ext>
+            </a:extLst>
+          </p:cNvPr>
+          <p:cNvSpPr txBox="1">
+            <a:spLocks/>
+          </p:cNvSpPr>
+          <p:nvPr/>
+        </p:nvSpPr>
+        <p:spPr>
+          <a:xfrm>
+            <a:off x="2056245" y="4070191"/>
+            <a:ext cx="8069062" cy="802890"/>
+          </a:xfrm>
+          <a:prstGeom prst="rect">
+            <a:avLst/>
+          </a:prstGeom>
+        </p:spPr>
+        <p:txBody>
+          <a:bodyPr>
+            <a:noAutofit/>
+          </a:bodyPr>
+          <a:lstStyle>
+            <a:lvl1pPr marL="228600" indent="-182880" algn="r" defTabSz="914400" rtl="1" eaLnBrk="1" latinLnBrk="0" hangingPunct="1">
+              <a:lnSpc>
+                <a:spcPct val="150000"/>
+              </a:lnSpc>
+              <a:spcBef>
+                <a:spcPts val="1400"/>
+              </a:spcBef>
+              <a:buClr>
+                <a:schemeClr val="accent1"/>
+              </a:buClr>
+              <a:buSzPct val="80000"/>
+              <a:buFont typeface="Corbel" pitchFamily="34" charset="0"/>
+              <a:buChar char="•"/>
+              <a:defRPr sz="2200" kern="1200">
+                <a:solidFill>
+                  <a:srgbClr val="333333"/>
+                </a:solidFill>
+                <a:latin typeface="+mn-lt"/>
+                <a:ea typeface="+mn-ea"/>
+                <a:cs typeface="+mn-cs"/>
+              </a:defRPr>
+            </a:lvl1pPr>
+            <a:lvl2pPr marL="457200" indent="-182880" algn="r" defTabSz="914400" rtl="1" eaLnBrk="1" latinLnBrk="0" hangingPunct="1">
+              <a:lnSpc>
+                <a:spcPct val="150000"/>
+              </a:lnSpc>
+              <a:spcBef>
+                <a:spcPts val="200"/>
+              </a:spcBef>
+              <a:spcAft>
+                <a:spcPts val="400"/>
+              </a:spcAft>
+              <a:buClr>
+                <a:schemeClr val="accent1"/>
+              </a:buClr>
+              <a:buSzPct val="80000"/>
+              <a:buFont typeface="Corbel" pitchFamily="34" charset="0"/>
+              <a:buChar char="•"/>
+              <a:defRPr sz="2000" kern="1200">
+                <a:solidFill>
+                  <a:srgbClr val="333333"/>
+                </a:solidFill>
+                <a:latin typeface="+mn-lt"/>
+                <a:ea typeface="+mn-ea"/>
+                <a:cs typeface="+mn-cs"/>
+              </a:defRPr>
+            </a:lvl2pPr>
+            <a:lvl3pPr marL="731520" indent="-182880" algn="r" defTabSz="914400" rtl="1" eaLnBrk="1" latinLnBrk="0" hangingPunct="1">
+              <a:lnSpc>
+                <a:spcPct val="150000"/>
+              </a:lnSpc>
+              <a:spcBef>
+                <a:spcPts val="200"/>
+              </a:spcBef>
+              <a:spcAft>
+                <a:spcPts val="400"/>
+              </a:spcAft>
+              <a:buClr>
+                <a:schemeClr val="accent1"/>
+              </a:buClr>
+              <a:buSzPct val="80000"/>
+              <a:buFont typeface="Corbel" pitchFamily="34" charset="0"/>
+              <a:buChar char="•"/>
+              <a:defRPr sz="1800" kern="1200">
+                <a:solidFill>
+                  <a:srgbClr val="333333"/>
+                </a:solidFill>
+                <a:latin typeface="+mn-lt"/>
+                <a:ea typeface="+mn-ea"/>
+                <a:cs typeface="+mn-cs"/>
+              </a:defRPr>
+            </a:lvl3pPr>
+            <a:lvl4pPr marL="1005840" indent="-182880" algn="r" defTabSz="914400" rtl="1" eaLnBrk="1" latinLnBrk="0" hangingPunct="1">
+              <a:lnSpc>
+                <a:spcPct val="150000"/>
+              </a:lnSpc>
+              <a:spcBef>
+                <a:spcPts val="200"/>
+              </a:spcBef>
+              <a:spcAft>
+                <a:spcPts val="400"/>
+              </a:spcAft>
+              <a:buClr>
+                <a:schemeClr val="accent1"/>
+              </a:buClr>
+              <a:buSzPct val="80000"/>
+              <a:buFont typeface="Corbel" pitchFamily="34" charset="0"/>
+              <a:buChar char="•"/>
+              <a:defRPr sz="1600" kern="1200">
+                <a:solidFill>
+                  <a:srgbClr val="333333"/>
+                </a:solidFill>
+                <a:latin typeface="+mn-lt"/>
+                <a:ea typeface="+mn-ea"/>
+                <a:cs typeface="+mn-cs"/>
+              </a:defRPr>
+            </a:lvl4pPr>
+            <a:lvl5pPr marL="1280160" indent="-182880" algn="r" defTabSz="914400" rtl="1" eaLnBrk="1" latinLnBrk="0" hangingPunct="1">
+              <a:lnSpc>
+                <a:spcPct val="150000"/>
+              </a:lnSpc>
+              <a:spcBef>
+                <a:spcPts val="200"/>
+              </a:spcBef>
+              <a:spcAft>
+                <a:spcPts val="400"/>
+              </a:spcAft>
+              <a:buClr>
+                <a:schemeClr val="accent1"/>
+              </a:buClr>
+              <a:buSzPct val="80000"/>
+              <a:buFont typeface="Corbel" pitchFamily="34" charset="0"/>
+              <a:buChar char="•"/>
+              <a:defRPr sz="1600" kern="1200">
+                <a:solidFill>
+                  <a:srgbClr val="333333"/>
+                </a:solidFill>
+                <a:latin typeface="+mn-lt"/>
+                <a:ea typeface="+mn-ea"/>
+                <a:cs typeface="+mn-cs"/>
+              </a:defRPr>
+            </a:lvl5pPr>
+            <a:lvl6pPr marL="1600000" indent="-228600" algn="l" defTabSz="914400" rtl="0" eaLnBrk="1" latinLnBrk="0" hangingPunct="1">
+              <a:lnSpc>
+                <a:spcPct val="90000"/>
+              </a:lnSpc>
+              <a:spcBef>
+                <a:spcPts val="200"/>
+              </a:spcBef>
+              <a:spcAft>
+                <a:spcPts val="400"/>
+              </a:spcAft>
+              <a:buClr>
+                <a:schemeClr val="accent1"/>
+              </a:buClr>
+              <a:buSzPct val="80000"/>
+              <a:buFont typeface="Corbel" pitchFamily="34" charset="0"/>
+              <a:buChar char="•"/>
+              <a:defRPr sz="1600" kern="1200">
+                <a:solidFill>
+                  <a:schemeClr val="accent1"/>
+                </a:solidFill>
+                <a:latin typeface="+mn-lt"/>
+                <a:ea typeface="+mn-ea"/>
+                <a:cs typeface="+mn-cs"/>
+              </a:defRPr>
+            </a:lvl6pPr>
+            <a:lvl7pPr marL="1900000" indent="-228600" algn="l" defTabSz="914400" rtl="0" eaLnBrk="1" latinLnBrk="0" hangingPunct="1">
+              <a:lnSpc>
+                <a:spcPct val="90000"/>
+              </a:lnSpc>
+              <a:spcBef>
+                <a:spcPts val="200"/>
+              </a:spcBef>
+              <a:spcAft>
+                <a:spcPts val="400"/>
+              </a:spcAft>
+              <a:buClr>
+                <a:schemeClr val="accent1"/>
+              </a:buClr>
+              <a:buSzPct val="80000"/>
+              <a:buFont typeface="Corbel" pitchFamily="34" charset="0"/>
+              <a:buChar char="•"/>
+              <a:defRPr sz="1600" kern="1200">
+                <a:solidFill>
+                  <a:schemeClr val="accent1"/>
+                </a:solidFill>
+                <a:latin typeface="+mn-lt"/>
+                <a:ea typeface="+mn-ea"/>
+                <a:cs typeface="+mn-cs"/>
+              </a:defRPr>
+            </a:lvl7pPr>
+            <a:lvl8pPr marL="2200000" indent="-228600" algn="l" defTabSz="914400" rtl="0" eaLnBrk="1" latinLnBrk="0" hangingPunct="1">
+              <a:lnSpc>
+                <a:spcPct val="90000"/>
+              </a:lnSpc>
+              <a:spcBef>
+                <a:spcPts val="200"/>
+              </a:spcBef>
+              <a:spcAft>
+                <a:spcPts val="400"/>
+              </a:spcAft>
+              <a:buClr>
+                <a:schemeClr val="accent1"/>
+              </a:buClr>
+              <a:buSzPct val="80000"/>
+              <a:buFont typeface="Corbel" pitchFamily="34" charset="0"/>
+              <a:buChar char="•"/>
+              <a:defRPr sz="1600" kern="1200">
+                <a:solidFill>
+                  <a:schemeClr val="accent1"/>
+                </a:solidFill>
+                <a:latin typeface="+mn-lt"/>
+                <a:ea typeface="+mn-ea"/>
+                <a:cs typeface="+mn-cs"/>
+              </a:defRPr>
+            </a:lvl8pPr>
+            <a:lvl9pPr marL="2500000" indent="-228600" algn="l" defTabSz="914400" rtl="0" eaLnBrk="1" latinLnBrk="0" hangingPunct="1">
+              <a:lnSpc>
+                <a:spcPct val="90000"/>
+              </a:lnSpc>
+              <a:spcBef>
+                <a:spcPts val="200"/>
+              </a:spcBef>
+              <a:spcAft>
+                <a:spcPts val="400"/>
+              </a:spcAft>
+              <a:buClr>
+                <a:schemeClr val="accent1"/>
+              </a:buClr>
+              <a:buSzPct val="80000"/>
+              <a:buFont typeface="Corbel" pitchFamily="34" charset="0"/>
+              <a:buChar char="•"/>
+              <a:defRPr sz="1600" kern="1200">
+                <a:solidFill>
+                  <a:schemeClr val="accent1"/>
+                </a:solidFill>
+                <a:latin typeface="+mn-lt"/>
+                <a:ea typeface="+mn-ea"/>
+                <a:cs typeface="+mn-cs"/>
+              </a:defRPr>
+            </a:lvl9pPr>
+          </a:lstStyle>
+          <a:p>
+            <a:pPr marL="45720" indent="0" algn="l" rtl="0">
+              <a:buNone/>
+            </a:pPr>
+            <a:r>
+              <a:rPr lang="en-US" sz="2800" i="0" dirty="0">
+                <a:solidFill>
+                  <a:srgbClr val="33475B"/>
+                </a:solidFill>
+                <a:effectLst/>
+                <a:latin typeface="+mj-lt"/>
+              </a:rPr>
+              <a:t>Feature limitation - </a:t>
+            </a:r>
+            <a:r>
+              <a:rPr lang="en-US" sz="2800" i="0" dirty="0">
+                <a:solidFill>
+                  <a:srgbClr val="33475B"/>
+                </a:solidFill>
+                <a:effectLst/>
+                <a:latin typeface="AvenirNext"/>
+              </a:rPr>
+              <a:t>Usage quotas - Limited support</a:t>
+            </a:r>
+            <a:endParaRPr lang="fa-IR" sz="3600" dirty="0">
+              <a:latin typeface="+mj-lt"/>
+            </a:endParaRPr>
           </a:p>
         </p:txBody>
       </p:sp>

</xml_diff>